<commit_message>
Draft for DG for TimeTable part
</commit_message>
<xml_diff>
--- a/docs/diagrams/ModelComponentClassDiagram.pptx
+++ b/docs/diagrams/ModelComponentClassDiagram.pptx
@@ -208,7 +208,7 @@
           <a:p>
             <a:fld id="{F5CC4B3F-88C1-4FFA-B1B6-F41C21DC6924}" type="datetimeFigureOut">
               <a:rPr lang="en-US" smtClean="0"/>
-              <a:t>6/27/2018</a:t>
+              <a:t>10/16/2018</a:t>
             </a:fld>
             <a:endParaRPr lang="en-US"/>
           </a:p>
@@ -654,7 +654,7 @@
           <a:p>
             <a:fld id="{78C97017-6FC3-485B-9764-EAC9E56C1D49}" type="datetimeFigureOut">
               <a:rPr lang="en-US" smtClean="0"/>
-              <a:t>6/27/2018</a:t>
+              <a:t>10/16/2018</a:t>
             </a:fld>
             <a:endParaRPr lang="en-US"/>
           </a:p>
@@ -822,7 +822,7 @@
           <a:p>
             <a:fld id="{78C97017-6FC3-485B-9764-EAC9E56C1D49}" type="datetimeFigureOut">
               <a:rPr lang="en-US" smtClean="0"/>
-              <a:t>6/27/2018</a:t>
+              <a:t>10/16/2018</a:t>
             </a:fld>
             <a:endParaRPr lang="en-US"/>
           </a:p>
@@ -1000,7 +1000,7 @@
           <a:p>
             <a:fld id="{78C97017-6FC3-485B-9764-EAC9E56C1D49}" type="datetimeFigureOut">
               <a:rPr lang="en-US" smtClean="0"/>
-              <a:t>6/27/2018</a:t>
+              <a:t>10/16/2018</a:t>
             </a:fld>
             <a:endParaRPr lang="en-US"/>
           </a:p>
@@ -1168,7 +1168,7 @@
           <a:p>
             <a:fld id="{78C97017-6FC3-485B-9764-EAC9E56C1D49}" type="datetimeFigureOut">
               <a:rPr lang="en-US" smtClean="0"/>
-              <a:t>6/27/2018</a:t>
+              <a:t>10/16/2018</a:t>
             </a:fld>
             <a:endParaRPr lang="en-US"/>
           </a:p>
@@ -1413,7 +1413,7 @@
           <a:p>
             <a:fld id="{78C97017-6FC3-485B-9764-EAC9E56C1D49}" type="datetimeFigureOut">
               <a:rPr lang="en-US" smtClean="0"/>
-              <a:t>6/27/2018</a:t>
+              <a:t>10/16/2018</a:t>
             </a:fld>
             <a:endParaRPr lang="en-US"/>
           </a:p>
@@ -1698,7 +1698,7 @@
           <a:p>
             <a:fld id="{78C97017-6FC3-485B-9764-EAC9E56C1D49}" type="datetimeFigureOut">
               <a:rPr lang="en-US" smtClean="0"/>
-              <a:t>6/27/2018</a:t>
+              <a:t>10/16/2018</a:t>
             </a:fld>
             <a:endParaRPr lang="en-US"/>
           </a:p>
@@ -2117,7 +2117,7 @@
           <a:p>
             <a:fld id="{78C97017-6FC3-485B-9764-EAC9E56C1D49}" type="datetimeFigureOut">
               <a:rPr lang="en-US" smtClean="0"/>
-              <a:t>6/27/2018</a:t>
+              <a:t>10/16/2018</a:t>
             </a:fld>
             <a:endParaRPr lang="en-US"/>
           </a:p>
@@ -2234,7 +2234,7 @@
           <a:p>
             <a:fld id="{78C97017-6FC3-485B-9764-EAC9E56C1D49}" type="datetimeFigureOut">
               <a:rPr lang="en-US" smtClean="0"/>
-              <a:t>6/27/2018</a:t>
+              <a:t>10/16/2018</a:t>
             </a:fld>
             <a:endParaRPr lang="en-US"/>
           </a:p>
@@ -2329,7 +2329,7 @@
           <a:p>
             <a:fld id="{78C97017-6FC3-485B-9764-EAC9E56C1D49}" type="datetimeFigureOut">
               <a:rPr lang="en-US" smtClean="0"/>
-              <a:t>6/27/2018</a:t>
+              <a:t>10/16/2018</a:t>
             </a:fld>
             <a:endParaRPr lang="en-US"/>
           </a:p>
@@ -2604,7 +2604,7 @@
           <a:p>
             <a:fld id="{78C97017-6FC3-485B-9764-EAC9E56C1D49}" type="datetimeFigureOut">
               <a:rPr lang="en-US" smtClean="0"/>
-              <a:t>6/27/2018</a:t>
+              <a:t>10/16/2018</a:t>
             </a:fld>
             <a:endParaRPr lang="en-US"/>
           </a:p>
@@ -2856,7 +2856,7 @@
           <a:p>
             <a:fld id="{78C97017-6FC3-485B-9764-EAC9E56C1D49}" type="datetimeFigureOut">
               <a:rPr lang="en-US" smtClean="0"/>
-              <a:t>6/27/2018</a:t>
+              <a:t>10/16/2018</a:t>
             </a:fld>
             <a:endParaRPr lang="en-US"/>
           </a:p>
@@ -3067,7 +3067,7 @@
           <a:p>
             <a:fld id="{78C97017-6FC3-485B-9764-EAC9E56C1D49}" type="datetimeFigureOut">
               <a:rPr lang="en-US" smtClean="0"/>
-              <a:t>6/27/2018</a:t>
+              <a:t>10/16/2018</a:t>
             </a:fld>
             <a:endParaRPr lang="en-US"/>
           </a:p>
@@ -3451,7 +3451,7 @@
         <p:spPr>
           <a:xfrm>
             <a:off x="1119865" y="1600200"/>
-            <a:ext cx="7490735" cy="3124200"/>
+            <a:ext cx="7566935" cy="3124200"/>
           </a:xfrm>
           <a:prstGeom prst="roundRect">
             <a:avLst>
@@ -4348,8 +4348,8 @@
         </p:nvSpPr>
         <p:spPr>
           <a:xfrm>
-            <a:off x="7712397" y="2564238"/>
-            <a:ext cx="708186" cy="285783"/>
+            <a:off x="7712396" y="2564238"/>
+            <a:ext cx="822003" cy="285783"/>
           </a:xfrm>
           <a:prstGeom prst="rect">
             <a:avLst/>
@@ -4491,8 +4491,8 @@
         </p:nvSpPr>
         <p:spPr>
           <a:xfrm>
-            <a:off x="7712397" y="2887216"/>
-            <a:ext cx="708186" cy="285783"/>
+            <a:off x="7712396" y="2887216"/>
+            <a:ext cx="822003" cy="285783"/>
           </a:xfrm>
           <a:prstGeom prst="rect">
             <a:avLst/>
@@ -4551,7 +4551,7 @@
         <p:spPr>
           <a:xfrm flipV="1">
             <a:off x="7277995" y="3030108"/>
-            <a:ext cx="434402" cy="4783"/>
+            <a:ext cx="434401" cy="4783"/>
           </a:xfrm>
           <a:prstGeom prst="bentConnector3">
             <a:avLst/>
@@ -4588,8 +4588,8 @@
         </p:nvSpPr>
         <p:spPr>
           <a:xfrm>
-            <a:off x="7712397" y="3210194"/>
-            <a:ext cx="708186" cy="285783"/>
+            <a:off x="7712396" y="3210194"/>
+            <a:ext cx="822003" cy="285783"/>
           </a:xfrm>
           <a:prstGeom prst="rect">
             <a:avLst/>
@@ -4648,7 +4648,7 @@
         <p:spPr>
           <a:xfrm>
             <a:off x="7277995" y="3034891"/>
-            <a:ext cx="434402" cy="318195"/>
+            <a:ext cx="434401" cy="318195"/>
           </a:xfrm>
           <a:prstGeom prst="bentConnector3">
             <a:avLst/>
@@ -4685,8 +4685,8 @@
         </p:nvSpPr>
         <p:spPr>
           <a:xfrm>
-            <a:off x="7712397" y="3533171"/>
-            <a:ext cx="708186" cy="285783"/>
+            <a:off x="7712396" y="3533171"/>
+            <a:ext cx="822003" cy="285783"/>
           </a:xfrm>
           <a:prstGeom prst="rect">
             <a:avLst/>
@@ -4745,7 +4745,7 @@
         <p:spPr>
           <a:xfrm>
             <a:off x="7277995" y="3034891"/>
-            <a:ext cx="434402" cy="641172"/>
+            <a:ext cx="434401" cy="641172"/>
           </a:xfrm>
           <a:prstGeom prst="bentConnector3">
             <a:avLst/>
@@ -5296,7 +5296,7 @@
           <p:cNvPr id="52" name="Rectangle 8">
             <a:extLst>
               <a:ext uri="{FF2B5EF4-FFF2-40B4-BE49-F238E27FC236}">
-                <a16:creationId xmlns:a16="http://schemas.microsoft.com/office/drawing/2014/main" id="{ABDCDBD2-131A-4B66-A2F2-43BBEE82C773}"/>
+                <a16:creationId xmlns:a16="http://schemas.microsoft.com/office/drawing/2014/main" xmlns="" id="{ABDCDBD2-131A-4B66-A2F2-43BBEE82C773}"/>
               </a:ext>
             </a:extLst>
           </p:cNvPr>
@@ -5305,8 +5305,8 @@
         </p:nvSpPr>
         <p:spPr>
           <a:xfrm>
-            <a:off x="7712397" y="2228817"/>
-            <a:ext cx="708186" cy="285783"/>
+            <a:off x="7712396" y="2228817"/>
+            <a:ext cx="822003" cy="285783"/>
           </a:xfrm>
           <a:prstGeom prst="rect">
             <a:avLst/>
@@ -5358,7 +5358,7 @@
           <p:cNvPr id="53" name="Elbow Connector 78">
             <a:extLst>
               <a:ext uri="{FF2B5EF4-FFF2-40B4-BE49-F238E27FC236}">
-                <a16:creationId xmlns:a16="http://schemas.microsoft.com/office/drawing/2014/main" id="{B97967F8-618A-448B-81FD-CDFD4AF0EC64}"/>
+                <a16:creationId xmlns:a16="http://schemas.microsoft.com/office/drawing/2014/main" xmlns="" id="{B97967F8-618A-448B-81FD-CDFD4AF0EC64}"/>
               </a:ext>
             </a:extLst>
           </p:cNvPr>
@@ -5372,7 +5372,7 @@
         <p:spPr>
           <a:xfrm flipV="1">
             <a:off x="7277995" y="2371709"/>
-            <a:ext cx="434402" cy="663182"/>
+            <a:ext cx="434401" cy="663182"/>
           </a:xfrm>
           <a:prstGeom prst="bentConnector3">
             <a:avLst>
@@ -5408,7 +5408,7 @@
           <p:cNvPr id="50" name="TextBox 49">
             <a:extLst>
               <a:ext uri="{FF2B5EF4-FFF2-40B4-BE49-F238E27FC236}">
-                <a16:creationId xmlns:a16="http://schemas.microsoft.com/office/drawing/2014/main" id="{B3FA9D57-880F-49C4-AD0B-A64E30D6F403}"/>
+                <a16:creationId xmlns:a16="http://schemas.microsoft.com/office/drawing/2014/main" xmlns="" id="{B3FA9D57-880F-49C4-AD0B-A64E30D6F403}"/>
               </a:ext>
             </a:extLst>
           </p:cNvPr>
@@ -5623,6 +5623,102 @@
             <a:prstDash val="sysDot"/>
             <a:headEnd type="none" w="med" len="med"/>
             <a:tailEnd type="none" w="med" len="med"/>
+          </a:ln>
+          <a:effectLst/>
+        </p:spPr>
+        <p:style>
+          <a:lnRef idx="1">
+            <a:schemeClr val="accent2"/>
+          </a:lnRef>
+          <a:fillRef idx="2">
+            <a:schemeClr val="accent2"/>
+          </a:fillRef>
+          <a:effectRef idx="1">
+            <a:schemeClr val="accent2"/>
+          </a:effectRef>
+          <a:fontRef idx="minor">
+            <a:schemeClr val="dk1"/>
+          </a:fontRef>
+        </p:style>
+      </p:cxnSp>
+      <p:sp>
+        <p:nvSpPr>
+          <p:cNvPr id="56" name="Rectangle 8"/>
+          <p:cNvSpPr/>
+          <p:nvPr/>
+        </p:nvSpPr>
+        <p:spPr>
+          <a:xfrm>
+            <a:off x="7712147" y="3853455"/>
+            <a:ext cx="822003" cy="285783"/>
+          </a:xfrm>
+          <a:prstGeom prst="rect">
+            <a:avLst/>
+          </a:prstGeom>
+          <a:ln w="19050">
+            <a:solidFill>
+              <a:srgbClr val="7030A0"/>
+            </a:solidFill>
+          </a:ln>
+          <a:effectLst/>
+        </p:spPr>
+        <p:style>
+          <a:lnRef idx="1">
+            <a:schemeClr val="accent4"/>
+          </a:lnRef>
+          <a:fillRef idx="2">
+            <a:schemeClr val="accent4"/>
+          </a:fillRef>
+          <a:effectRef idx="1">
+            <a:schemeClr val="accent4"/>
+          </a:effectRef>
+          <a:fontRef idx="minor">
+            <a:schemeClr val="dk1"/>
+          </a:fontRef>
+        </p:style>
+        <p:txBody>
+          <a:bodyPr rtlCol="0" anchor="ctr"/>
+          <a:lstStyle/>
+          <a:p>
+            <a:pPr algn="ctr"/>
+            <a:r>
+              <a:rPr lang="en-US" sz="1050" dirty="0" err="1" smtClean="0">
+                <a:solidFill>
+                  <a:srgbClr val="7030A0"/>
+                </a:solidFill>
+              </a:rPr>
+              <a:t>TimeTable</a:t>
+            </a:r>
+            <a:endParaRPr lang="en-SG" sz="1050" dirty="0">
+              <a:solidFill>
+                <a:srgbClr val="7030A0"/>
+              </a:solidFill>
+            </a:endParaRPr>
+          </a:p>
+        </p:txBody>
+      </p:sp>
+      <p:cxnSp>
+        <p:nvCxnSpPr>
+          <p:cNvPr id="57" name="Elbow Connector 56"/>
+          <p:cNvCxnSpPr>
+            <a:endCxn id="56" idx="1"/>
+          </p:cNvCxnSpPr>
+          <p:nvPr/>
+        </p:nvCxnSpPr>
+        <p:spPr>
+          <a:xfrm rot="16200000" flipH="1">
+            <a:off x="7118940" y="3403140"/>
+            <a:ext cx="968292" cy="218122"/>
+          </a:xfrm>
+          <a:prstGeom prst="bentConnector2">
+            <a:avLst/>
+          </a:prstGeom>
+          <a:ln w="19050">
+            <a:solidFill>
+              <a:srgbClr val="7030A0"/>
+            </a:solidFill>
+            <a:headEnd type="none" w="med" len="med"/>
+            <a:tailEnd type="arrow" w="med" len="med"/>
           </a:ln>
           <a:effectLst/>
         </p:spPr>

</xml_diff>

<commit_message>
Add TimeTable class diagram
</commit_message>
<xml_diff>
--- a/docs/diagrams/ModelComponentClassDiagram.pptx
+++ b/docs/diagrams/ModelComponentClassDiagram.pptx
@@ -5296,7 +5296,7 @@
           <p:cNvPr id="52" name="Rectangle 8">
             <a:extLst>
               <a:ext uri="{FF2B5EF4-FFF2-40B4-BE49-F238E27FC236}">
-                <a16:creationId xmlns:a16="http://schemas.microsoft.com/office/drawing/2014/main" xmlns="" id="{ABDCDBD2-131A-4B66-A2F2-43BBEE82C773}"/>
+                <a16:creationId xmlns="" xmlns:a16="http://schemas.microsoft.com/office/drawing/2014/main" id="{ABDCDBD2-131A-4B66-A2F2-43BBEE82C773}"/>
               </a:ext>
             </a:extLst>
           </p:cNvPr>
@@ -5358,7 +5358,7 @@
           <p:cNvPr id="53" name="Elbow Connector 78">
             <a:extLst>
               <a:ext uri="{FF2B5EF4-FFF2-40B4-BE49-F238E27FC236}">
-                <a16:creationId xmlns:a16="http://schemas.microsoft.com/office/drawing/2014/main" xmlns="" id="{B97967F8-618A-448B-81FD-CDFD4AF0EC64}"/>
+                <a16:creationId xmlns="" xmlns:a16="http://schemas.microsoft.com/office/drawing/2014/main" id="{B97967F8-618A-448B-81FD-CDFD4AF0EC64}"/>
               </a:ext>
             </a:extLst>
           </p:cNvPr>
@@ -5408,7 +5408,7 @@
           <p:cNvPr id="50" name="TextBox 49">
             <a:extLst>
               <a:ext uri="{FF2B5EF4-FFF2-40B4-BE49-F238E27FC236}">
-                <a16:creationId xmlns:a16="http://schemas.microsoft.com/office/drawing/2014/main" xmlns="" id="{B3FA9D57-880F-49C4-AD0B-A64E30D6F403}"/>
+                <a16:creationId xmlns="" xmlns:a16="http://schemas.microsoft.com/office/drawing/2014/main" id="{B3FA9D57-880F-49C4-AD0B-A64E30D6F403}"/>
               </a:ext>
             </a:extLst>
           </p:cNvPr>

</xml_diff>

<commit_message>
Removed redundant LoginDialogBox class and updated class diagrams
</commit_message>
<xml_diff>
--- a/docs/diagrams/ModelComponentClassDiagram.pptx
+++ b/docs/diagrams/ModelComponentClassDiagram.pptx
@@ -208,7 +208,7 @@
           <a:p>
             <a:fld id="{F5CC4B3F-88C1-4FFA-B1B6-F41C21DC6924}" type="datetimeFigureOut">
               <a:rPr lang="en-US" smtClean="0"/>
-              <a:t>6/27/2018</a:t>
+              <a:t>10/16/2018</a:t>
             </a:fld>
             <a:endParaRPr lang="en-US"/>
           </a:p>
@@ -654,7 +654,7 @@
           <a:p>
             <a:fld id="{78C97017-6FC3-485B-9764-EAC9E56C1D49}" type="datetimeFigureOut">
               <a:rPr lang="en-US" smtClean="0"/>
-              <a:t>6/27/2018</a:t>
+              <a:t>10/16/2018</a:t>
             </a:fld>
             <a:endParaRPr lang="en-US"/>
           </a:p>
@@ -822,7 +822,7 @@
           <a:p>
             <a:fld id="{78C97017-6FC3-485B-9764-EAC9E56C1D49}" type="datetimeFigureOut">
               <a:rPr lang="en-US" smtClean="0"/>
-              <a:t>6/27/2018</a:t>
+              <a:t>10/16/2018</a:t>
             </a:fld>
             <a:endParaRPr lang="en-US"/>
           </a:p>
@@ -1000,7 +1000,7 @@
           <a:p>
             <a:fld id="{78C97017-6FC3-485B-9764-EAC9E56C1D49}" type="datetimeFigureOut">
               <a:rPr lang="en-US" smtClean="0"/>
-              <a:t>6/27/2018</a:t>
+              <a:t>10/16/2018</a:t>
             </a:fld>
             <a:endParaRPr lang="en-US"/>
           </a:p>
@@ -1168,7 +1168,7 @@
           <a:p>
             <a:fld id="{78C97017-6FC3-485B-9764-EAC9E56C1D49}" type="datetimeFigureOut">
               <a:rPr lang="en-US" smtClean="0"/>
-              <a:t>6/27/2018</a:t>
+              <a:t>10/16/2018</a:t>
             </a:fld>
             <a:endParaRPr lang="en-US"/>
           </a:p>
@@ -1413,7 +1413,7 @@
           <a:p>
             <a:fld id="{78C97017-6FC3-485B-9764-EAC9E56C1D49}" type="datetimeFigureOut">
               <a:rPr lang="en-US" smtClean="0"/>
-              <a:t>6/27/2018</a:t>
+              <a:t>10/16/2018</a:t>
             </a:fld>
             <a:endParaRPr lang="en-US"/>
           </a:p>
@@ -1698,7 +1698,7 @@
           <a:p>
             <a:fld id="{78C97017-6FC3-485B-9764-EAC9E56C1D49}" type="datetimeFigureOut">
               <a:rPr lang="en-US" smtClean="0"/>
-              <a:t>6/27/2018</a:t>
+              <a:t>10/16/2018</a:t>
             </a:fld>
             <a:endParaRPr lang="en-US"/>
           </a:p>
@@ -2117,7 +2117,7 @@
           <a:p>
             <a:fld id="{78C97017-6FC3-485B-9764-EAC9E56C1D49}" type="datetimeFigureOut">
               <a:rPr lang="en-US" smtClean="0"/>
-              <a:t>6/27/2018</a:t>
+              <a:t>10/16/2018</a:t>
             </a:fld>
             <a:endParaRPr lang="en-US"/>
           </a:p>
@@ -2234,7 +2234,7 @@
           <a:p>
             <a:fld id="{78C97017-6FC3-485B-9764-EAC9E56C1D49}" type="datetimeFigureOut">
               <a:rPr lang="en-US" smtClean="0"/>
-              <a:t>6/27/2018</a:t>
+              <a:t>10/16/2018</a:t>
             </a:fld>
             <a:endParaRPr lang="en-US"/>
           </a:p>
@@ -2329,7 +2329,7 @@
           <a:p>
             <a:fld id="{78C97017-6FC3-485B-9764-EAC9E56C1D49}" type="datetimeFigureOut">
               <a:rPr lang="en-US" smtClean="0"/>
-              <a:t>6/27/2018</a:t>
+              <a:t>10/16/2018</a:t>
             </a:fld>
             <a:endParaRPr lang="en-US"/>
           </a:p>
@@ -2604,7 +2604,7 @@
           <a:p>
             <a:fld id="{78C97017-6FC3-485B-9764-EAC9E56C1D49}" type="datetimeFigureOut">
               <a:rPr lang="en-US" smtClean="0"/>
-              <a:t>6/27/2018</a:t>
+              <a:t>10/16/2018</a:t>
             </a:fld>
             <a:endParaRPr lang="en-US"/>
           </a:p>
@@ -2856,7 +2856,7 @@
           <a:p>
             <a:fld id="{78C97017-6FC3-485B-9764-EAC9E56C1D49}" type="datetimeFigureOut">
               <a:rPr lang="en-US" smtClean="0"/>
-              <a:t>6/27/2018</a:t>
+              <a:t>10/16/2018</a:t>
             </a:fld>
             <a:endParaRPr lang="en-US"/>
           </a:p>
@@ -3067,7 +3067,7 @@
           <a:p>
             <a:fld id="{78C97017-6FC3-485B-9764-EAC9E56C1D49}" type="datetimeFigureOut">
               <a:rPr lang="en-US" smtClean="0"/>
-              <a:t>6/27/2018</a:t>
+              <a:t>10/16/2018</a:t>
             </a:fld>
             <a:endParaRPr lang="en-US"/>
           </a:p>
@@ -3450,8 +3450,8 @@
         </p:nvSpPr>
         <p:spPr>
           <a:xfrm>
-            <a:off x="1119865" y="1600200"/>
-            <a:ext cx="7490735" cy="3124200"/>
+            <a:off x="381000" y="354623"/>
+            <a:ext cx="8024135" cy="4554840"/>
           </a:xfrm>
           <a:prstGeom prst="roundRect">
             <a:avLst>
@@ -3511,7 +3511,7 @@
         </p:nvSpPr>
         <p:spPr>
           <a:xfrm>
-            <a:off x="2877180" y="3463240"/>
+            <a:off x="2671715" y="2124526"/>
             <a:ext cx="1093635" cy="346760"/>
           </a:xfrm>
           <a:prstGeom prst="rect">
@@ -3570,8 +3570,8 @@
         </p:nvSpPr>
         <p:spPr>
           <a:xfrm rot="16200000">
-            <a:off x="1661548" y="3097750"/>
-            <a:ext cx="1093635" cy="346760"/>
+            <a:off x="1133600" y="2081519"/>
+            <a:ext cx="1738601" cy="346760"/>
           </a:xfrm>
           <a:prstGeom prst="rect">
             <a:avLst/>
@@ -3633,12 +3633,12 @@
         </p:nvCxnSpPr>
         <p:spPr>
           <a:xfrm rot="5400000" flipH="1" flipV="1">
-            <a:off x="4131507" y="1281685"/>
-            <a:ext cx="613122" cy="4459404"/>
+            <a:off x="3603559" y="265454"/>
+            <a:ext cx="1258088" cy="4459404"/>
           </a:xfrm>
           <a:prstGeom prst="bentConnector3">
             <a:avLst>
-              <a:gd name="adj1" fmla="val -26668"/>
+              <a:gd name="adj1" fmla="val 37145"/>
             </a:avLst>
           </a:prstGeom>
           <a:ln w="19050">
@@ -3674,7 +3674,7 @@
         </p:nvSpPr>
         <p:spPr>
           <a:xfrm rot="16200000">
-            <a:off x="956202" y="2861202"/>
+            <a:off x="750737" y="1522488"/>
             <a:ext cx="1093635" cy="346760"/>
           </a:xfrm>
           <a:prstGeom prst="rect">
@@ -3744,7 +3744,7 @@
         </p:nvSpPr>
         <p:spPr>
           <a:xfrm rot="16200000">
-            <a:off x="1626910" y="2952291"/>
+            <a:off x="1421445" y="1613577"/>
             <a:ext cx="270504" cy="175523"/>
           </a:xfrm>
           <a:prstGeom prst="triangle">
@@ -3787,14 +3787,13 @@
         <p:nvCxnSpPr>
           <p:cNvPr id="58" name="Straight Arrow Connector 57"/>
           <p:cNvCxnSpPr>
-            <a:stCxn id="42" idx="3"/>
-            <a:endCxn id="2" idx="1"/>
+            <a:cxnSpLocks/>
           </p:cNvCxnSpPr>
           <p:nvPr/>
         </p:nvCxnSpPr>
         <p:spPr>
           <a:xfrm>
-            <a:off x="2609828" y="3636620"/>
+            <a:off x="2404363" y="2324283"/>
             <a:ext cx="267352" cy="0"/>
           </a:xfrm>
           <a:prstGeom prst="straightConnector1">
@@ -3827,13 +3826,15 @@
       <p:cxnSp>
         <p:nvCxnSpPr>
           <p:cNvPr id="75" name="Elbow Connector 122"/>
-          <p:cNvCxnSpPr/>
+          <p:cNvCxnSpPr>
+            <a:cxnSpLocks/>
+          </p:cNvCxnSpPr>
           <p:nvPr/>
         </p:nvCxnSpPr>
         <p:spPr>
           <a:xfrm>
-            <a:off x="910091" y="3040053"/>
-            <a:ext cx="419548" cy="2860"/>
+            <a:off x="180080" y="1696177"/>
+            <a:ext cx="944094" cy="8022"/>
           </a:xfrm>
           <a:prstGeom prst="bentConnector3">
             <a:avLst>
@@ -3877,7 +3878,7 @@
         </p:nvCxnSpPr>
         <p:spPr>
           <a:xfrm flipV="1">
-            <a:off x="1849924" y="3040052"/>
+            <a:off x="1644459" y="1701338"/>
             <a:ext cx="216105" cy="1"/>
           </a:xfrm>
           <a:prstGeom prst="line">
@@ -3916,7 +3917,7 @@
         </p:nvSpPr>
         <p:spPr>
           <a:xfrm>
-            <a:off x="2373780" y="3549930"/>
+            <a:off x="2168315" y="2211216"/>
             <a:ext cx="236048" cy="173380"/>
           </a:xfrm>
           <a:prstGeom prst="flowChartDecision">
@@ -3961,7 +3962,7 @@
         </p:nvSpPr>
         <p:spPr>
           <a:xfrm>
-            <a:off x="2825280" y="2846162"/>
+            <a:off x="2619815" y="1507448"/>
             <a:ext cx="1490560" cy="334856"/>
           </a:xfrm>
           <a:prstGeom prst="rect">
@@ -3994,7 +3995,7 @@
           <a:p>
             <a:pPr algn="ctr"/>
             <a:r>
-              <a:rPr lang="en-US" sz="1050" dirty="0" err="1" smtClean="0">
+              <a:rPr lang="en-US" sz="1050" dirty="0" err="1">
                 <a:solidFill>
                   <a:srgbClr val="7030A0"/>
                 </a:solidFill>
@@ -4020,7 +4021,7 @@
         </p:nvCxnSpPr>
         <p:spPr>
           <a:xfrm>
-            <a:off x="2624360" y="3003033"/>
+            <a:off x="2418895" y="1664319"/>
             <a:ext cx="200920" cy="10557"/>
           </a:xfrm>
           <a:prstGeom prst="straightConnector1">
@@ -4058,7 +4059,7 @@
         </p:nvSpPr>
         <p:spPr>
           <a:xfrm>
-            <a:off x="2388312" y="2916343"/>
+            <a:off x="2182847" y="1577629"/>
             <a:ext cx="236048" cy="173380"/>
           </a:xfrm>
           <a:prstGeom prst="flowChartDecision">
@@ -4103,7 +4104,7 @@
         </p:nvSpPr>
         <p:spPr>
           <a:xfrm>
-            <a:off x="4692650" y="2846162"/>
+            <a:off x="4487185" y="1507448"/>
             <a:ext cx="1156969" cy="346760"/>
           </a:xfrm>
           <a:prstGeom prst="rect">
@@ -4159,7 +4160,7 @@
         </p:nvSpPr>
         <p:spPr>
           <a:xfrm>
-            <a:off x="4324972" y="2920532"/>
+            <a:off x="4119507" y="1581818"/>
             <a:ext cx="236048" cy="173380"/>
           </a:xfrm>
           <a:prstGeom prst="flowChartDecision">
@@ -4206,7 +4207,7 @@
         </p:nvSpPr>
         <p:spPr>
           <a:xfrm>
-            <a:off x="6313677" y="2858066"/>
+            <a:off x="6108212" y="1519352"/>
             <a:ext cx="708186" cy="346760"/>
           </a:xfrm>
           <a:prstGeom prst="rect">
@@ -4262,7 +4263,7 @@
         </p:nvSpPr>
         <p:spPr>
           <a:xfrm>
-            <a:off x="5858751" y="2941676"/>
+            <a:off x="5653286" y="1602962"/>
             <a:ext cx="236048" cy="173380"/>
           </a:xfrm>
           <a:prstGeom prst="flowChartDecision">
@@ -4310,7 +4311,7 @@
         </p:nvCxnSpPr>
         <p:spPr>
           <a:xfrm>
-            <a:off x="6094799" y="3028366"/>
+            <a:off x="5889334" y="1689652"/>
             <a:ext cx="218878" cy="3080"/>
           </a:xfrm>
           <a:prstGeom prst="bentConnector3">
@@ -4348,7 +4349,7 @@
         </p:nvSpPr>
         <p:spPr>
           <a:xfrm>
-            <a:off x="7712397" y="2564238"/>
+            <a:off x="7506932" y="1225524"/>
             <a:ext cx="708186" cy="285783"/>
           </a:xfrm>
           <a:prstGeom prst="rect">
@@ -4404,7 +4405,7 @@
         </p:nvSpPr>
         <p:spPr>
           <a:xfrm>
-            <a:off x="7041947" y="2948201"/>
+            <a:off x="6836482" y="1609487"/>
             <a:ext cx="236048" cy="173380"/>
           </a:xfrm>
           <a:prstGeom prst="flowChartDecision">
@@ -4453,7 +4454,7 @@
         </p:nvCxnSpPr>
         <p:spPr>
           <a:xfrm flipV="1">
-            <a:off x="7277995" y="2706821"/>
+            <a:off x="7072530" y="1368107"/>
             <a:ext cx="434402" cy="327761"/>
           </a:xfrm>
           <a:prstGeom prst="bentConnector3">
@@ -4491,7 +4492,7 @@
         </p:nvSpPr>
         <p:spPr>
           <a:xfrm>
-            <a:off x="7712397" y="2887216"/>
+            <a:off x="7506932" y="1548502"/>
             <a:ext cx="708186" cy="285783"/>
           </a:xfrm>
           <a:prstGeom prst="rect">
@@ -4550,7 +4551,7 @@
         </p:nvCxnSpPr>
         <p:spPr>
           <a:xfrm flipV="1">
-            <a:off x="7277995" y="3030108"/>
+            <a:off x="7072530" y="1691394"/>
             <a:ext cx="434402" cy="4783"/>
           </a:xfrm>
           <a:prstGeom prst="bentConnector3">
@@ -4588,7 +4589,7 @@
         </p:nvSpPr>
         <p:spPr>
           <a:xfrm>
-            <a:off x="7712397" y="3210194"/>
+            <a:off x="7506932" y="1871480"/>
             <a:ext cx="708186" cy="285783"/>
           </a:xfrm>
           <a:prstGeom prst="rect">
@@ -4647,7 +4648,7 @@
         </p:nvCxnSpPr>
         <p:spPr>
           <a:xfrm>
-            <a:off x="7277995" y="3034891"/>
+            <a:off x="7072530" y="1696177"/>
             <a:ext cx="434402" cy="318195"/>
           </a:xfrm>
           <a:prstGeom prst="bentConnector3">
@@ -4685,7 +4686,7 @@
         </p:nvSpPr>
         <p:spPr>
           <a:xfrm>
-            <a:off x="7712397" y="3533171"/>
+            <a:off x="7506932" y="2194457"/>
             <a:ext cx="708186" cy="285783"/>
           </a:xfrm>
           <a:prstGeom prst="rect">
@@ -4744,7 +4745,7 @@
         </p:nvCxnSpPr>
         <p:spPr>
           <a:xfrm>
-            <a:off x="7277995" y="3034891"/>
+            <a:off x="7072530" y="1696177"/>
             <a:ext cx="434402" cy="641172"/>
           </a:xfrm>
           <a:prstGeom prst="bentConnector3">
@@ -4784,7 +4785,7 @@
         </p:nvCxnSpPr>
         <p:spPr>
           <a:xfrm rot="5400000">
-            <a:off x="3553611" y="2687559"/>
+            <a:off x="3348146" y="1348845"/>
             <a:ext cx="293825" cy="5938"/>
           </a:xfrm>
           <a:prstGeom prst="bentConnector3">
@@ -4825,7 +4826,7 @@
         </p:nvSpPr>
         <p:spPr>
           <a:xfrm rot="10800000" flipV="1">
-            <a:off x="3562299" y="2386554"/>
+            <a:off x="3356834" y="1047840"/>
             <a:ext cx="282387" cy="157062"/>
           </a:xfrm>
           <a:prstGeom prst="triangle">
@@ -4873,7 +4874,7 @@
         </p:nvSpPr>
         <p:spPr>
           <a:xfrm>
-            <a:off x="1260922" y="1998350"/>
+            <a:off x="1055457" y="659636"/>
             <a:ext cx="1443661" cy="364396"/>
           </a:xfrm>
           <a:prstGeom prst="rect">
@@ -4944,7 +4945,7 @@
         </p:nvSpPr>
         <p:spPr>
           <a:xfrm rot="16200000">
-            <a:off x="6362886" y="3586305"/>
+            <a:off x="6157421" y="2247591"/>
             <a:ext cx="881018" cy="261610"/>
           </a:xfrm>
           <a:prstGeom prst="rect">
@@ -4983,7 +4984,7 @@
         </p:nvSpPr>
         <p:spPr>
           <a:xfrm>
-            <a:off x="2057401" y="4239491"/>
+            <a:off x="818695" y="3198127"/>
             <a:ext cx="1066800" cy="346760"/>
           </a:xfrm>
           <a:prstGeom prst="rect">
@@ -5023,16 +5024,8 @@
               </a:rPr>
               <a:t>&lt;&lt;interface&gt;&gt;</a:t>
             </a:r>
-            <a:r>
-              <a:rPr lang="en-US" sz="1050">
-                <a:solidFill>
-                  <a:srgbClr val="7030A0"/>
-                </a:solidFill>
-              </a:rPr>
-              <a:t/>
-            </a:r>
             <a:br>
-              <a:rPr lang="en-US" sz="1050">
+              <a:rPr lang="en-US" sz="1050" dirty="0">
                 <a:solidFill>
                   <a:srgbClr val="7030A0"/>
                 </a:solidFill>
@@ -5064,12 +5057,15 @@
           <p:nvPr/>
         </p:nvCxnSpPr>
         <p:spPr>
-          <a:xfrm rot="16200000" flipH="1">
-            <a:off x="1364475" y="3719944"/>
-            <a:ext cx="831471" cy="554381"/>
-          </a:xfrm>
-          <a:prstGeom prst="bentConnector2">
-            <a:avLst/>
+          <a:xfrm rot="5400000">
+            <a:off x="493715" y="2567666"/>
+            <a:ext cx="1128821" cy="478860"/>
+          </a:xfrm>
+          <a:prstGeom prst="bentConnector4">
+            <a:avLst>
+              <a:gd name="adj1" fmla="val 58861"/>
+              <a:gd name="adj2" fmla="val 147738"/>
+            </a:avLst>
           </a:prstGeom>
           <a:ln w="19050">
             <a:solidFill>
@@ -5104,7 +5100,7 @@
         </p:nvSpPr>
         <p:spPr>
           <a:xfrm>
-            <a:off x="4429979" y="3111479"/>
+            <a:off x="4224514" y="1772765"/>
             <a:ext cx="189257" cy="178683"/>
           </a:xfrm>
           <a:prstGeom prst="rect">
@@ -5143,7 +5139,7 @@
         </p:nvSpPr>
         <p:spPr>
           <a:xfrm>
-            <a:off x="6135256" y="3097917"/>
+            <a:off x="5929791" y="1759203"/>
             <a:ext cx="189257" cy="178683"/>
           </a:xfrm>
           <a:prstGeom prst="rect">
@@ -5182,7 +5178,7 @@
         </p:nvSpPr>
         <p:spPr>
           <a:xfrm>
-            <a:off x="2573394" y="2756715"/>
+            <a:off x="2367929" y="1418001"/>
             <a:ext cx="170110" cy="137542"/>
           </a:xfrm>
           <a:prstGeom prst="rect">
@@ -5221,7 +5217,7 @@
         </p:nvSpPr>
         <p:spPr>
           <a:xfrm>
-            <a:off x="2707070" y="3667737"/>
+            <a:off x="2501605" y="2329023"/>
             <a:ext cx="189257" cy="178683"/>
           </a:xfrm>
           <a:prstGeom prst="rect">
@@ -5260,7 +5256,7 @@
         </p:nvSpPr>
         <p:spPr>
           <a:xfrm>
-            <a:off x="6449896" y="3204826"/>
+            <a:off x="6244431" y="1866112"/>
             <a:ext cx="189257" cy="178683"/>
           </a:xfrm>
           <a:prstGeom prst="rect">
@@ -5305,7 +5301,7 @@
         </p:nvSpPr>
         <p:spPr>
           <a:xfrm>
-            <a:off x="7712397" y="2228817"/>
+            <a:off x="7506932" y="890103"/>
             <a:ext cx="708186" cy="285783"/>
           </a:xfrm>
           <a:prstGeom prst="rect">
@@ -5371,7 +5367,7 @@
         </p:nvCxnSpPr>
         <p:spPr>
           <a:xfrm flipV="1">
-            <a:off x="7277995" y="2371709"/>
+            <a:off x="7072530" y="1032995"/>
             <a:ext cx="434402" cy="663182"/>
           </a:xfrm>
           <a:prstGeom prst="bentConnector3">
@@ -5417,7 +5413,7 @@
         </p:nvSpPr>
         <p:spPr>
           <a:xfrm>
-            <a:off x="7466243" y="2255711"/>
+            <a:off x="7260778" y="916997"/>
             <a:ext cx="189257" cy="178683"/>
           </a:xfrm>
           <a:prstGeom prst="rect">
@@ -5456,7 +5452,7 @@
         </p:nvSpPr>
         <p:spPr>
           <a:xfrm>
-            <a:off x="3170181" y="1998350"/>
+            <a:off x="2964716" y="659636"/>
             <a:ext cx="1060683" cy="364396"/>
           </a:xfrm>
           <a:prstGeom prst="rect">
@@ -5515,7 +5511,7 @@
         </p:nvCxnSpPr>
         <p:spPr>
           <a:xfrm>
-            <a:off x="4324972" y="3007222"/>
+            <a:off x="4119507" y="1668508"/>
             <a:ext cx="367678" cy="12320"/>
           </a:xfrm>
           <a:prstGeom prst="straightConnector1">
@@ -5553,7 +5549,7 @@
         </p:nvSpPr>
         <p:spPr>
           <a:xfrm rot="16200000">
-            <a:off x="2669073" y="2069158"/>
+            <a:off x="2463608" y="730444"/>
             <a:ext cx="271014" cy="187417"/>
           </a:xfrm>
           <a:prstGeom prst="triangle">
@@ -5608,7 +5604,7 @@
         </p:nvCxnSpPr>
         <p:spPr>
           <a:xfrm>
-            <a:off x="2898289" y="2177727"/>
+            <a:off x="2692824" y="839013"/>
             <a:ext cx="271892" cy="2821"/>
           </a:xfrm>
           <a:prstGeom prst="bentConnector3">
@@ -5641,6 +5637,1419 @@
           </a:fontRef>
         </p:style>
       </p:cxnSp>
+      <p:cxnSp>
+        <p:nvCxnSpPr>
+          <p:cNvPr id="56" name="Elbow Connector 106">
+            <a:extLst>
+              <a:ext uri="{FF2B5EF4-FFF2-40B4-BE49-F238E27FC236}">
+                <a16:creationId xmlns:a16="http://schemas.microsoft.com/office/drawing/2014/main" id="{7D84E55C-EBD3-432F-9599-0D52D4EF426D}"/>
+              </a:ext>
+            </a:extLst>
+          </p:cNvPr>
+          <p:cNvCxnSpPr>
+            <a:cxnSpLocks/>
+            <a:stCxn id="9" idx="1"/>
+            <a:endCxn id="93" idx="2"/>
+          </p:cNvCxnSpPr>
+          <p:nvPr/>
+        </p:nvCxnSpPr>
+        <p:spPr>
+          <a:xfrm rot="5400000" flipH="1" flipV="1">
+            <a:off x="4324079" y="797718"/>
+            <a:ext cx="5303" cy="4647661"/>
+          </a:xfrm>
+          <a:prstGeom prst="bentConnector3">
+            <a:avLst>
+              <a:gd name="adj1" fmla="val -18966868"/>
+            </a:avLst>
+          </a:prstGeom>
+          <a:ln w="19050">
+            <a:solidFill>
+              <a:srgbClr val="7030A0"/>
+            </a:solidFill>
+            <a:prstDash val="solid"/>
+            <a:headEnd type="none" w="med" len="med"/>
+            <a:tailEnd type="arrow" w="med" len="med"/>
+          </a:ln>
+          <a:effectLst/>
+        </p:spPr>
+        <p:style>
+          <a:lnRef idx="1">
+            <a:schemeClr val="accent2"/>
+          </a:lnRef>
+          <a:fillRef idx="2">
+            <a:schemeClr val="accent2"/>
+          </a:fillRef>
+          <a:effectRef idx="1">
+            <a:schemeClr val="accent2"/>
+          </a:effectRef>
+          <a:fontRef idx="minor">
+            <a:schemeClr val="dk1"/>
+          </a:fontRef>
+        </p:style>
+      </p:cxnSp>
+      <p:sp>
+        <p:nvSpPr>
+          <p:cNvPr id="57" name="TextBox 56">
+            <a:extLst>
+              <a:ext uri="{FF2B5EF4-FFF2-40B4-BE49-F238E27FC236}">
+                <a16:creationId xmlns:a16="http://schemas.microsoft.com/office/drawing/2014/main" id="{797E99C8-7788-4037-8D90-4EC81F1CEDBD}"/>
+              </a:ext>
+            </a:extLst>
+          </p:cNvPr>
+          <p:cNvSpPr txBox="1"/>
+          <p:nvPr/>
+        </p:nvSpPr>
+        <p:spPr>
+          <a:xfrm>
+            <a:off x="5864877" y="3352712"/>
+            <a:ext cx="881018" cy="261610"/>
+          </a:xfrm>
+          <a:prstGeom prst="rect">
+            <a:avLst/>
+          </a:prstGeom>
+          <a:noFill/>
+        </p:spPr>
+        <p:txBody>
+          <a:bodyPr wrap="square" rtlCol="0">
+            <a:spAutoFit/>
+          </a:bodyPr>
+          <a:lstStyle/>
+          <a:p>
+            <a:pPr algn="r"/>
+            <a:r>
+              <a:rPr lang="en-US" sz="1100" dirty="0">
+                <a:solidFill>
+                  <a:srgbClr val="7030A0"/>
+                </a:solidFill>
+              </a:rPr>
+              <a:t>filtered list</a:t>
+            </a:r>
+            <a:endParaRPr lang="en-SG" sz="1100" dirty="0">
+              <a:solidFill>
+                <a:srgbClr val="7030A0"/>
+              </a:solidFill>
+            </a:endParaRPr>
+          </a:p>
+        </p:txBody>
+      </p:sp>
+      <p:sp>
+        <p:nvSpPr>
+          <p:cNvPr id="67" name="TextBox 66">
+            <a:extLst>
+              <a:ext uri="{FF2B5EF4-FFF2-40B4-BE49-F238E27FC236}">
+                <a16:creationId xmlns:a16="http://schemas.microsoft.com/office/drawing/2014/main" id="{8973446F-9443-463F-8C7C-798B9AD24D1D}"/>
+              </a:ext>
+            </a:extLst>
+          </p:cNvPr>
+          <p:cNvSpPr txBox="1"/>
+          <p:nvPr/>
+        </p:nvSpPr>
+        <p:spPr>
+          <a:xfrm>
+            <a:off x="6419009" y="3138513"/>
+            <a:ext cx="189257" cy="178683"/>
+          </a:xfrm>
+          <a:prstGeom prst="rect">
+            <a:avLst/>
+          </a:prstGeom>
+          <a:noFill/>
+        </p:spPr>
+        <p:txBody>
+          <a:bodyPr wrap="square" lIns="0" tIns="0" rIns="0" bIns="0" rtlCol="0">
+            <a:noAutofit/>
+          </a:bodyPr>
+          <a:lstStyle/>
+          <a:p>
+            <a:pPr algn="ctr"/>
+            <a:r>
+              <a:rPr lang="en-US" sz="1100" dirty="0">
+                <a:solidFill>
+                  <a:srgbClr val="7030A0"/>
+                </a:solidFill>
+              </a:rPr>
+              <a:t>1</a:t>
+            </a:r>
+            <a:endParaRPr lang="en-SG" sz="1100" dirty="0">
+              <a:solidFill>
+                <a:srgbClr val="7030A0"/>
+              </a:solidFill>
+            </a:endParaRPr>
+          </a:p>
+        </p:txBody>
+      </p:sp>
+      <p:sp>
+        <p:nvSpPr>
+          <p:cNvPr id="71" name="Flowchart: Decision 96">
+            <a:extLst>
+              <a:ext uri="{FF2B5EF4-FFF2-40B4-BE49-F238E27FC236}">
+                <a16:creationId xmlns:a16="http://schemas.microsoft.com/office/drawing/2014/main" id="{96B85B47-4ABF-4A1F-AF84-D9089AC793DF}"/>
+              </a:ext>
+            </a:extLst>
+          </p:cNvPr>
+          <p:cNvSpPr/>
+          <p:nvPr/>
+        </p:nvSpPr>
+        <p:spPr>
+          <a:xfrm>
+            <a:off x="2182847" y="2806193"/>
+            <a:ext cx="236048" cy="173380"/>
+          </a:xfrm>
+          <a:prstGeom prst="flowChartDecision">
+            <a:avLst/>
+          </a:prstGeom>
+          <a:noFill/>
+          <a:ln w="19050">
+            <a:solidFill>
+              <a:srgbClr val="7030A0"/>
+            </a:solidFill>
+          </a:ln>
+          <a:effectLst/>
+        </p:spPr>
+        <p:style>
+          <a:lnRef idx="1">
+            <a:schemeClr val="accent6"/>
+          </a:lnRef>
+          <a:fillRef idx="2">
+            <a:schemeClr val="accent6"/>
+          </a:fillRef>
+          <a:effectRef idx="1">
+            <a:schemeClr val="accent6"/>
+          </a:effectRef>
+          <a:fontRef idx="minor">
+            <a:schemeClr val="dk1"/>
+          </a:fontRef>
+        </p:style>
+        <p:txBody>
+          <a:bodyPr rtlCol="0" anchor="ctr"/>
+          <a:lstStyle/>
+          <a:p>
+            <a:pPr algn="ctr"/>
+            <a:endParaRPr lang="en-US" sz="1050"/>
+          </a:p>
+        </p:txBody>
+      </p:sp>
+      <p:cxnSp>
+        <p:nvCxnSpPr>
+          <p:cNvPr id="72" name="Straight Arrow Connector 71">
+            <a:extLst>
+              <a:ext uri="{FF2B5EF4-FFF2-40B4-BE49-F238E27FC236}">
+                <a16:creationId xmlns:a16="http://schemas.microsoft.com/office/drawing/2014/main" id="{72551120-FDA0-495F-9056-3767ACBEA029}"/>
+              </a:ext>
+            </a:extLst>
+          </p:cNvPr>
+          <p:cNvCxnSpPr>
+            <a:cxnSpLocks/>
+          </p:cNvCxnSpPr>
+          <p:nvPr/>
+        </p:nvCxnSpPr>
+        <p:spPr>
+          <a:xfrm>
+            <a:off x="2418895" y="2892883"/>
+            <a:ext cx="324997" cy="5397"/>
+          </a:xfrm>
+          <a:prstGeom prst="straightConnector1">
+            <a:avLst/>
+          </a:prstGeom>
+          <a:ln w="19050">
+            <a:solidFill>
+              <a:srgbClr val="7030A0"/>
+            </a:solidFill>
+            <a:headEnd type="none" w="med" len="med"/>
+            <a:tailEnd type="arrow" w="med" len="med"/>
+          </a:ln>
+          <a:effectLst/>
+        </p:spPr>
+        <p:style>
+          <a:lnRef idx="1">
+            <a:schemeClr val="accent2"/>
+          </a:lnRef>
+          <a:fillRef idx="2">
+            <a:schemeClr val="accent2"/>
+          </a:fillRef>
+          <a:effectRef idx="1">
+            <a:schemeClr val="accent2"/>
+          </a:effectRef>
+          <a:fontRef idx="minor">
+            <a:schemeClr val="dk1"/>
+          </a:fontRef>
+        </p:style>
+      </p:cxnSp>
+      <p:sp>
+        <p:nvSpPr>
+          <p:cNvPr id="74" name="TextBox 73">
+            <a:extLst>
+              <a:ext uri="{FF2B5EF4-FFF2-40B4-BE49-F238E27FC236}">
+                <a16:creationId xmlns:a16="http://schemas.microsoft.com/office/drawing/2014/main" id="{50AAC571-71D3-4D54-AC23-22D250ECDE1B}"/>
+              </a:ext>
+            </a:extLst>
+          </p:cNvPr>
+          <p:cNvSpPr txBox="1"/>
+          <p:nvPr/>
+        </p:nvSpPr>
+        <p:spPr>
+          <a:xfrm>
+            <a:off x="2515206" y="2945517"/>
+            <a:ext cx="189257" cy="178683"/>
+          </a:xfrm>
+          <a:prstGeom prst="rect">
+            <a:avLst/>
+          </a:prstGeom>
+          <a:noFill/>
+        </p:spPr>
+        <p:txBody>
+          <a:bodyPr wrap="square" lIns="0" tIns="0" rIns="0" bIns="0" rtlCol="0">
+            <a:noAutofit/>
+          </a:bodyPr>
+          <a:lstStyle/>
+          <a:p>
+            <a:pPr algn="ctr"/>
+            <a:r>
+              <a:rPr lang="en-US" sz="1100" dirty="0">
+                <a:solidFill>
+                  <a:srgbClr val="7030A0"/>
+                </a:solidFill>
+              </a:rPr>
+              <a:t>1</a:t>
+            </a:r>
+            <a:endParaRPr lang="en-SG" sz="1100" dirty="0">
+              <a:solidFill>
+                <a:srgbClr val="7030A0"/>
+              </a:solidFill>
+            </a:endParaRPr>
+          </a:p>
+        </p:txBody>
+      </p:sp>
+      <p:sp>
+        <p:nvSpPr>
+          <p:cNvPr id="77" name="Rectangle 8">
+            <a:extLst>
+              <a:ext uri="{FF2B5EF4-FFF2-40B4-BE49-F238E27FC236}">
+                <a16:creationId xmlns:a16="http://schemas.microsoft.com/office/drawing/2014/main" id="{208E5541-FDF5-4913-8C45-1703FF80A0D0}"/>
+              </a:ext>
+            </a:extLst>
+          </p:cNvPr>
+          <p:cNvSpPr/>
+          <p:nvPr/>
+        </p:nvSpPr>
+        <p:spPr>
+          <a:xfrm>
+            <a:off x="2733954" y="2742670"/>
+            <a:ext cx="1490560" cy="334856"/>
+          </a:xfrm>
+          <a:prstGeom prst="rect">
+            <a:avLst/>
+          </a:prstGeom>
+          <a:ln w="19050">
+            <a:solidFill>
+              <a:srgbClr val="7030A0"/>
+            </a:solidFill>
+          </a:ln>
+          <a:effectLst/>
+        </p:spPr>
+        <p:style>
+          <a:lnRef idx="1">
+            <a:schemeClr val="accent4"/>
+          </a:lnRef>
+          <a:fillRef idx="2">
+            <a:schemeClr val="accent4"/>
+          </a:fillRef>
+          <a:effectRef idx="1">
+            <a:schemeClr val="accent4"/>
+          </a:effectRef>
+          <a:fontRef idx="minor">
+            <a:schemeClr val="dk1"/>
+          </a:fontRef>
+        </p:style>
+        <p:txBody>
+          <a:bodyPr rtlCol="0" anchor="ctr"/>
+          <a:lstStyle/>
+          <a:p>
+            <a:pPr algn="ctr"/>
+            <a:r>
+              <a:rPr lang="en-US" sz="1050" dirty="0" err="1">
+                <a:solidFill>
+                  <a:srgbClr val="7030A0"/>
+                </a:solidFill>
+              </a:rPr>
+              <a:t>VersionedLoginBook</a:t>
+            </a:r>
+            <a:endParaRPr lang="en-SG" sz="1050" dirty="0">
+              <a:solidFill>
+                <a:srgbClr val="7030A0"/>
+              </a:solidFill>
+            </a:endParaRPr>
+          </a:p>
+        </p:txBody>
+      </p:sp>
+      <p:sp>
+        <p:nvSpPr>
+          <p:cNvPr id="82" name="TextBox 81">
+            <a:extLst>
+              <a:ext uri="{FF2B5EF4-FFF2-40B4-BE49-F238E27FC236}">
+                <a16:creationId xmlns:a16="http://schemas.microsoft.com/office/drawing/2014/main" id="{DEA766C1-87CE-4879-8605-14E87A6F21AB}"/>
+              </a:ext>
+            </a:extLst>
+          </p:cNvPr>
+          <p:cNvSpPr txBox="1"/>
+          <p:nvPr/>
+        </p:nvSpPr>
+        <p:spPr>
+          <a:xfrm>
+            <a:off x="4489927" y="2997561"/>
+            <a:ext cx="189257" cy="178683"/>
+          </a:xfrm>
+          <a:prstGeom prst="rect">
+            <a:avLst/>
+          </a:prstGeom>
+          <a:noFill/>
+        </p:spPr>
+        <p:txBody>
+          <a:bodyPr wrap="square" lIns="0" tIns="0" rIns="0" bIns="0" rtlCol="0">
+            <a:noAutofit/>
+          </a:bodyPr>
+          <a:lstStyle/>
+          <a:p>
+            <a:pPr algn="ctr"/>
+            <a:r>
+              <a:rPr lang="en-US" sz="1100" dirty="0">
+                <a:solidFill>
+                  <a:srgbClr val="7030A0"/>
+                </a:solidFill>
+              </a:rPr>
+              <a:t>1</a:t>
+            </a:r>
+            <a:endParaRPr lang="en-SG" sz="1100" dirty="0">
+              <a:solidFill>
+                <a:srgbClr val="7030A0"/>
+              </a:solidFill>
+            </a:endParaRPr>
+          </a:p>
+        </p:txBody>
+      </p:sp>
+      <p:cxnSp>
+        <p:nvCxnSpPr>
+          <p:cNvPr id="87" name="Straight Arrow Connector 86">
+            <a:extLst>
+              <a:ext uri="{FF2B5EF4-FFF2-40B4-BE49-F238E27FC236}">
+                <a16:creationId xmlns:a16="http://schemas.microsoft.com/office/drawing/2014/main" id="{9E3BBED0-4985-449E-BAE1-ED65DC70FA62}"/>
+              </a:ext>
+            </a:extLst>
+          </p:cNvPr>
+          <p:cNvCxnSpPr>
+            <a:cxnSpLocks/>
+          </p:cNvCxnSpPr>
+          <p:nvPr/>
+        </p:nvCxnSpPr>
+        <p:spPr>
+          <a:xfrm>
+            <a:off x="4428487" y="2910098"/>
+            <a:ext cx="250697" cy="0"/>
+          </a:xfrm>
+          <a:prstGeom prst="straightConnector1">
+            <a:avLst/>
+          </a:prstGeom>
+          <a:ln w="19050">
+            <a:solidFill>
+              <a:srgbClr val="7030A0"/>
+            </a:solidFill>
+            <a:headEnd type="none" w="med" len="med"/>
+            <a:tailEnd type="arrow" w="med" len="med"/>
+          </a:ln>
+          <a:effectLst/>
+        </p:spPr>
+        <p:style>
+          <a:lnRef idx="1">
+            <a:schemeClr val="accent2"/>
+          </a:lnRef>
+          <a:fillRef idx="2">
+            <a:schemeClr val="accent2"/>
+          </a:fillRef>
+          <a:effectRef idx="1">
+            <a:schemeClr val="accent2"/>
+          </a:effectRef>
+          <a:fontRef idx="minor">
+            <a:schemeClr val="dk1"/>
+          </a:fontRef>
+        </p:style>
+      </p:cxnSp>
+      <p:sp>
+        <p:nvSpPr>
+          <p:cNvPr id="88" name="Flowchart: Decision 96">
+            <a:extLst>
+              <a:ext uri="{FF2B5EF4-FFF2-40B4-BE49-F238E27FC236}">
+                <a16:creationId xmlns:a16="http://schemas.microsoft.com/office/drawing/2014/main" id="{BE9BEE43-1DED-4980-ACD9-FC943FC36F62}"/>
+              </a:ext>
+            </a:extLst>
+          </p:cNvPr>
+          <p:cNvSpPr/>
+          <p:nvPr/>
+        </p:nvSpPr>
+        <p:spPr>
+          <a:xfrm>
+            <a:off x="4227167" y="2824181"/>
+            <a:ext cx="236048" cy="173380"/>
+          </a:xfrm>
+          <a:prstGeom prst="flowChartDecision">
+            <a:avLst/>
+          </a:prstGeom>
+          <a:solidFill>
+            <a:srgbClr val="7030A0"/>
+          </a:solidFill>
+          <a:ln w="19050">
+            <a:solidFill>
+              <a:srgbClr val="7030A0"/>
+            </a:solidFill>
+          </a:ln>
+          <a:effectLst/>
+        </p:spPr>
+        <p:style>
+          <a:lnRef idx="1">
+            <a:schemeClr val="accent6"/>
+          </a:lnRef>
+          <a:fillRef idx="2">
+            <a:schemeClr val="accent6"/>
+          </a:fillRef>
+          <a:effectRef idx="1">
+            <a:schemeClr val="accent6"/>
+          </a:effectRef>
+          <a:fontRef idx="minor">
+            <a:schemeClr val="dk1"/>
+          </a:fontRef>
+        </p:style>
+        <p:txBody>
+          <a:bodyPr rtlCol="0" anchor="ctr"/>
+          <a:lstStyle/>
+          <a:p>
+            <a:pPr algn="ctr"/>
+            <a:endParaRPr lang="en-US" sz="1050"/>
+          </a:p>
+        </p:txBody>
+      </p:sp>
+      <p:sp>
+        <p:nvSpPr>
+          <p:cNvPr id="89" name="Rectangle 8">
+            <a:extLst>
+              <a:ext uri="{FF2B5EF4-FFF2-40B4-BE49-F238E27FC236}">
+                <a16:creationId xmlns:a16="http://schemas.microsoft.com/office/drawing/2014/main" id="{1A7C413D-9C8F-49A9-9D21-5032021F7B25}"/>
+              </a:ext>
+            </a:extLst>
+          </p:cNvPr>
+          <p:cNvSpPr/>
+          <p:nvPr/>
+        </p:nvSpPr>
+        <p:spPr>
+          <a:xfrm>
+            <a:off x="4679184" y="2749210"/>
+            <a:ext cx="1156969" cy="346760"/>
+          </a:xfrm>
+          <a:prstGeom prst="rect">
+            <a:avLst/>
+          </a:prstGeom>
+          <a:ln w="19050">
+            <a:solidFill>
+              <a:srgbClr val="7030A0"/>
+            </a:solidFill>
+          </a:ln>
+          <a:effectLst/>
+        </p:spPr>
+        <p:style>
+          <a:lnRef idx="1">
+            <a:schemeClr val="accent4"/>
+          </a:lnRef>
+          <a:fillRef idx="2">
+            <a:schemeClr val="accent4"/>
+          </a:fillRef>
+          <a:effectRef idx="1">
+            <a:schemeClr val="accent4"/>
+          </a:effectRef>
+          <a:fontRef idx="minor">
+            <a:schemeClr val="dk1"/>
+          </a:fontRef>
+        </p:style>
+        <p:txBody>
+          <a:bodyPr rtlCol="0" anchor="ctr"/>
+          <a:lstStyle/>
+          <a:p>
+            <a:pPr algn="ctr"/>
+            <a:r>
+              <a:rPr lang="en-US" sz="1050" dirty="0" err="1">
+                <a:solidFill>
+                  <a:srgbClr val="7030A0"/>
+                </a:solidFill>
+              </a:rPr>
+              <a:t>UniqueAccount</a:t>
+            </a:r>
+            <a:endParaRPr lang="en-US" sz="1050" dirty="0">
+              <a:solidFill>
+                <a:srgbClr val="7030A0"/>
+              </a:solidFill>
+            </a:endParaRPr>
+          </a:p>
+          <a:p>
+            <a:pPr algn="ctr"/>
+            <a:r>
+              <a:rPr lang="en-US" sz="1050" dirty="0">
+                <a:solidFill>
+                  <a:srgbClr val="7030A0"/>
+                </a:solidFill>
+              </a:rPr>
+              <a:t>List</a:t>
+            </a:r>
+            <a:endParaRPr lang="en-SG" sz="1050" dirty="0">
+              <a:solidFill>
+                <a:srgbClr val="7030A0"/>
+              </a:solidFill>
+            </a:endParaRPr>
+          </a:p>
+        </p:txBody>
+      </p:sp>
+      <p:sp>
+        <p:nvSpPr>
+          <p:cNvPr id="90" name="Flowchart: Decision 96">
+            <a:extLst>
+              <a:ext uri="{FF2B5EF4-FFF2-40B4-BE49-F238E27FC236}">
+                <a16:creationId xmlns:a16="http://schemas.microsoft.com/office/drawing/2014/main" id="{36FF33D8-420A-4FCA-B9D6-442ABFDEAEFC}"/>
+              </a:ext>
+            </a:extLst>
+          </p:cNvPr>
+          <p:cNvSpPr/>
+          <p:nvPr/>
+        </p:nvSpPr>
+        <p:spPr>
+          <a:xfrm>
+            <a:off x="5839624" y="2836559"/>
+            <a:ext cx="236048" cy="173380"/>
+          </a:xfrm>
+          <a:prstGeom prst="flowChartDecision">
+            <a:avLst/>
+          </a:prstGeom>
+          <a:noFill/>
+          <a:ln w="19050">
+            <a:solidFill>
+              <a:srgbClr val="7030A0"/>
+            </a:solidFill>
+          </a:ln>
+          <a:effectLst/>
+        </p:spPr>
+        <p:style>
+          <a:lnRef idx="1">
+            <a:schemeClr val="accent6"/>
+          </a:lnRef>
+          <a:fillRef idx="2">
+            <a:schemeClr val="accent6"/>
+          </a:fillRef>
+          <a:effectRef idx="1">
+            <a:schemeClr val="accent6"/>
+          </a:effectRef>
+          <a:fontRef idx="minor">
+            <a:schemeClr val="dk1"/>
+          </a:fontRef>
+        </p:style>
+        <p:txBody>
+          <a:bodyPr rtlCol="0" anchor="ctr"/>
+          <a:lstStyle/>
+          <a:p>
+            <a:pPr algn="ctr"/>
+            <a:endParaRPr lang="en-US" sz="1050"/>
+          </a:p>
+        </p:txBody>
+      </p:sp>
+      <p:cxnSp>
+        <p:nvCxnSpPr>
+          <p:cNvPr id="91" name="Elbow Connector 63">
+            <a:extLst>
+              <a:ext uri="{FF2B5EF4-FFF2-40B4-BE49-F238E27FC236}">
+                <a16:creationId xmlns:a16="http://schemas.microsoft.com/office/drawing/2014/main" id="{E9C1CB01-5B81-40D5-9DEC-3E28C0DE2477}"/>
+              </a:ext>
+            </a:extLst>
+          </p:cNvPr>
+          <p:cNvCxnSpPr>
+            <a:stCxn id="90" idx="3"/>
+          </p:cNvCxnSpPr>
+          <p:nvPr/>
+        </p:nvCxnSpPr>
+        <p:spPr>
+          <a:xfrm>
+            <a:off x="6075672" y="2923249"/>
+            <a:ext cx="218878" cy="3080"/>
+          </a:xfrm>
+          <a:prstGeom prst="bentConnector3">
+            <a:avLst/>
+          </a:prstGeom>
+          <a:ln w="19050">
+            <a:solidFill>
+              <a:srgbClr val="7030A0"/>
+            </a:solidFill>
+            <a:headEnd type="none" w="med" len="med"/>
+            <a:tailEnd type="arrow" w="med" len="med"/>
+          </a:ln>
+          <a:effectLst/>
+        </p:spPr>
+        <p:style>
+          <a:lnRef idx="1">
+            <a:schemeClr val="accent2"/>
+          </a:lnRef>
+          <a:fillRef idx="2">
+            <a:schemeClr val="accent2"/>
+          </a:fillRef>
+          <a:effectRef idx="1">
+            <a:schemeClr val="accent2"/>
+          </a:effectRef>
+          <a:fontRef idx="minor">
+            <a:schemeClr val="dk1"/>
+          </a:fontRef>
+        </p:style>
+      </p:cxnSp>
+      <p:sp>
+        <p:nvSpPr>
+          <p:cNvPr id="92" name="TextBox 91">
+            <a:extLst>
+              <a:ext uri="{FF2B5EF4-FFF2-40B4-BE49-F238E27FC236}">
+                <a16:creationId xmlns:a16="http://schemas.microsoft.com/office/drawing/2014/main" id="{F5EB3CFD-B411-468F-80E7-A061B51F896D}"/>
+              </a:ext>
+            </a:extLst>
+          </p:cNvPr>
+          <p:cNvSpPr txBox="1"/>
+          <p:nvPr/>
+        </p:nvSpPr>
+        <p:spPr>
+          <a:xfrm>
+            <a:off x="6116129" y="2992800"/>
+            <a:ext cx="189257" cy="178683"/>
+          </a:xfrm>
+          <a:prstGeom prst="rect">
+            <a:avLst/>
+          </a:prstGeom>
+          <a:noFill/>
+        </p:spPr>
+        <p:txBody>
+          <a:bodyPr wrap="square" lIns="0" tIns="0" rIns="0" bIns="0" rtlCol="0">
+            <a:noAutofit/>
+          </a:bodyPr>
+          <a:lstStyle/>
+          <a:p>
+            <a:pPr algn="ctr"/>
+            <a:r>
+              <a:rPr lang="en-US" sz="1100" dirty="0">
+                <a:solidFill>
+                  <a:srgbClr val="7030A0"/>
+                </a:solidFill>
+              </a:rPr>
+              <a:t>*</a:t>
+            </a:r>
+            <a:endParaRPr lang="en-SG" sz="1100" dirty="0">
+              <a:solidFill>
+                <a:srgbClr val="7030A0"/>
+              </a:solidFill>
+            </a:endParaRPr>
+          </a:p>
+        </p:txBody>
+      </p:sp>
+      <p:sp>
+        <p:nvSpPr>
+          <p:cNvPr id="93" name="Rectangle 8">
+            <a:extLst>
+              <a:ext uri="{FF2B5EF4-FFF2-40B4-BE49-F238E27FC236}">
+                <a16:creationId xmlns:a16="http://schemas.microsoft.com/office/drawing/2014/main" id="{7EC4E4B7-9DA3-4FA0-B4BD-5C83445026F3}"/>
+              </a:ext>
+            </a:extLst>
+          </p:cNvPr>
+          <p:cNvSpPr/>
+          <p:nvPr/>
+        </p:nvSpPr>
+        <p:spPr>
+          <a:xfrm>
+            <a:off x="6296469" y="2772137"/>
+            <a:ext cx="708186" cy="346760"/>
+          </a:xfrm>
+          <a:prstGeom prst="rect">
+            <a:avLst/>
+          </a:prstGeom>
+          <a:ln w="19050">
+            <a:solidFill>
+              <a:srgbClr val="7030A0"/>
+            </a:solidFill>
+          </a:ln>
+          <a:effectLst/>
+        </p:spPr>
+        <p:style>
+          <a:lnRef idx="1">
+            <a:schemeClr val="accent4"/>
+          </a:lnRef>
+          <a:fillRef idx="2">
+            <a:schemeClr val="accent4"/>
+          </a:fillRef>
+          <a:effectRef idx="1">
+            <a:schemeClr val="accent4"/>
+          </a:effectRef>
+          <a:fontRef idx="minor">
+            <a:schemeClr val="dk1"/>
+          </a:fontRef>
+        </p:style>
+        <p:txBody>
+          <a:bodyPr rtlCol="0" anchor="ctr"/>
+          <a:lstStyle/>
+          <a:p>
+            <a:pPr algn="ctr"/>
+            <a:r>
+              <a:rPr lang="en-US" sz="1050" dirty="0">
+                <a:solidFill>
+                  <a:srgbClr val="7030A0"/>
+                </a:solidFill>
+              </a:rPr>
+              <a:t>Login</a:t>
+            </a:r>
+          </a:p>
+          <a:p>
+            <a:pPr algn="ctr"/>
+            <a:r>
+              <a:rPr lang="en-US" sz="1050" dirty="0">
+                <a:solidFill>
+                  <a:srgbClr val="7030A0"/>
+                </a:solidFill>
+              </a:rPr>
+              <a:t>Details</a:t>
+            </a:r>
+            <a:endParaRPr lang="en-SG" sz="1050" dirty="0">
+              <a:solidFill>
+                <a:srgbClr val="7030A0"/>
+              </a:solidFill>
+            </a:endParaRPr>
+          </a:p>
+        </p:txBody>
+      </p:sp>
+      <p:sp>
+        <p:nvSpPr>
+          <p:cNvPr id="94" name="Flowchart: Decision 96">
+            <a:extLst>
+              <a:ext uri="{FF2B5EF4-FFF2-40B4-BE49-F238E27FC236}">
+                <a16:creationId xmlns:a16="http://schemas.microsoft.com/office/drawing/2014/main" id="{FAA52FF0-A9E5-49B4-9D6E-07F229414992}"/>
+              </a:ext>
+            </a:extLst>
+          </p:cNvPr>
+          <p:cNvSpPr/>
+          <p:nvPr/>
+        </p:nvSpPr>
+        <p:spPr>
+          <a:xfrm>
+            <a:off x="7017200" y="2858827"/>
+            <a:ext cx="236048" cy="173380"/>
+          </a:xfrm>
+          <a:prstGeom prst="flowChartDecision">
+            <a:avLst/>
+          </a:prstGeom>
+          <a:solidFill>
+            <a:srgbClr val="7030A0"/>
+          </a:solidFill>
+          <a:ln w="19050">
+            <a:solidFill>
+              <a:srgbClr val="7030A0"/>
+            </a:solidFill>
+          </a:ln>
+          <a:effectLst/>
+        </p:spPr>
+        <p:style>
+          <a:lnRef idx="1">
+            <a:schemeClr val="accent6"/>
+          </a:lnRef>
+          <a:fillRef idx="2">
+            <a:schemeClr val="accent6"/>
+          </a:fillRef>
+          <a:effectRef idx="1">
+            <a:schemeClr val="accent6"/>
+          </a:effectRef>
+          <a:fontRef idx="minor">
+            <a:schemeClr val="dk1"/>
+          </a:fontRef>
+        </p:style>
+        <p:txBody>
+          <a:bodyPr rtlCol="0" anchor="ctr"/>
+          <a:lstStyle/>
+          <a:p>
+            <a:pPr algn="ctr"/>
+            <a:endParaRPr lang="en-US" sz="1050"/>
+          </a:p>
+        </p:txBody>
+      </p:sp>
+      <p:cxnSp>
+        <p:nvCxnSpPr>
+          <p:cNvPr id="95" name="Elbow Connector 78">
+            <a:extLst>
+              <a:ext uri="{FF2B5EF4-FFF2-40B4-BE49-F238E27FC236}">
+                <a16:creationId xmlns:a16="http://schemas.microsoft.com/office/drawing/2014/main" id="{48DEA5A8-AF14-48AB-80C2-DFC6B6253258}"/>
+              </a:ext>
+            </a:extLst>
+          </p:cNvPr>
+          <p:cNvCxnSpPr>
+            <a:cxnSpLocks/>
+            <a:endCxn id="96" idx="1"/>
+          </p:cNvCxnSpPr>
+          <p:nvPr/>
+        </p:nvCxnSpPr>
+        <p:spPr>
+          <a:xfrm flipV="1">
+            <a:off x="7260778" y="2763620"/>
+            <a:ext cx="369518" cy="181898"/>
+          </a:xfrm>
+          <a:prstGeom prst="bentConnector3">
+            <a:avLst>
+              <a:gd name="adj1" fmla="val 50000"/>
+            </a:avLst>
+          </a:prstGeom>
+          <a:ln w="19050">
+            <a:solidFill>
+              <a:srgbClr val="7030A0"/>
+            </a:solidFill>
+            <a:headEnd type="none" w="med" len="med"/>
+            <a:tailEnd type="arrow" w="med" len="med"/>
+          </a:ln>
+          <a:effectLst/>
+        </p:spPr>
+        <p:style>
+          <a:lnRef idx="1">
+            <a:schemeClr val="accent2"/>
+          </a:lnRef>
+          <a:fillRef idx="2">
+            <a:schemeClr val="accent2"/>
+          </a:fillRef>
+          <a:effectRef idx="1">
+            <a:schemeClr val="accent2"/>
+          </a:effectRef>
+          <a:fontRef idx="minor">
+            <a:schemeClr val="dk1"/>
+          </a:fontRef>
+        </p:style>
+      </p:cxnSp>
+      <p:sp>
+        <p:nvSpPr>
+          <p:cNvPr id="96" name="Rectangle 8">
+            <a:extLst>
+              <a:ext uri="{FF2B5EF4-FFF2-40B4-BE49-F238E27FC236}">
+                <a16:creationId xmlns:a16="http://schemas.microsoft.com/office/drawing/2014/main" id="{27AC559B-CBE8-4F50-8332-F4B77159CBA4}"/>
+              </a:ext>
+            </a:extLst>
+          </p:cNvPr>
+          <p:cNvSpPr/>
+          <p:nvPr/>
+        </p:nvSpPr>
+        <p:spPr>
+          <a:xfrm>
+            <a:off x="7630296" y="2620728"/>
+            <a:ext cx="708186" cy="285783"/>
+          </a:xfrm>
+          <a:prstGeom prst="rect">
+            <a:avLst/>
+          </a:prstGeom>
+          <a:ln w="19050">
+            <a:solidFill>
+              <a:srgbClr val="7030A0"/>
+            </a:solidFill>
+          </a:ln>
+          <a:effectLst/>
+        </p:spPr>
+        <p:style>
+          <a:lnRef idx="1">
+            <a:schemeClr val="accent4"/>
+          </a:lnRef>
+          <a:fillRef idx="2">
+            <a:schemeClr val="accent4"/>
+          </a:fillRef>
+          <a:effectRef idx="1">
+            <a:schemeClr val="accent4"/>
+          </a:effectRef>
+          <a:fontRef idx="minor">
+            <a:schemeClr val="dk1"/>
+          </a:fontRef>
+        </p:style>
+        <p:txBody>
+          <a:bodyPr rtlCol="0" anchor="ctr"/>
+          <a:lstStyle/>
+          <a:p>
+            <a:pPr algn="ctr"/>
+            <a:r>
+              <a:rPr lang="en-US" sz="1050" dirty="0" err="1">
+                <a:solidFill>
+                  <a:srgbClr val="7030A0"/>
+                </a:solidFill>
+              </a:rPr>
+              <a:t>UserId</a:t>
+            </a:r>
+            <a:endParaRPr lang="en-SG" sz="1050" dirty="0">
+              <a:solidFill>
+                <a:srgbClr val="7030A0"/>
+              </a:solidFill>
+            </a:endParaRPr>
+          </a:p>
+        </p:txBody>
+      </p:sp>
+      <p:sp>
+        <p:nvSpPr>
+          <p:cNvPr id="98" name="Rectangle 8">
+            <a:extLst>
+              <a:ext uri="{FF2B5EF4-FFF2-40B4-BE49-F238E27FC236}">
+                <a16:creationId xmlns:a16="http://schemas.microsoft.com/office/drawing/2014/main" id="{4CF0505C-7E19-4123-8E24-55C089FD19A9}"/>
+              </a:ext>
+            </a:extLst>
+          </p:cNvPr>
+          <p:cNvSpPr/>
+          <p:nvPr/>
+        </p:nvSpPr>
+        <p:spPr>
+          <a:xfrm>
+            <a:off x="7625698" y="3046999"/>
+            <a:ext cx="708186" cy="346760"/>
+          </a:xfrm>
+          <a:prstGeom prst="rect">
+            <a:avLst/>
+          </a:prstGeom>
+          <a:ln w="19050">
+            <a:solidFill>
+              <a:srgbClr val="7030A0"/>
+            </a:solidFill>
+          </a:ln>
+          <a:effectLst/>
+        </p:spPr>
+        <p:style>
+          <a:lnRef idx="1">
+            <a:schemeClr val="accent4"/>
+          </a:lnRef>
+          <a:fillRef idx="2">
+            <a:schemeClr val="accent4"/>
+          </a:fillRef>
+          <a:effectRef idx="1">
+            <a:schemeClr val="accent4"/>
+          </a:effectRef>
+          <a:fontRef idx="minor">
+            <a:schemeClr val="dk1"/>
+          </a:fontRef>
+        </p:style>
+        <p:txBody>
+          <a:bodyPr rtlCol="0" anchor="ctr"/>
+          <a:lstStyle/>
+          <a:p>
+            <a:pPr algn="ctr"/>
+            <a:r>
+              <a:rPr lang="en-US" sz="1050" dirty="0">
+                <a:solidFill>
+                  <a:srgbClr val="7030A0"/>
+                </a:solidFill>
+              </a:rPr>
+              <a:t>User</a:t>
+            </a:r>
+          </a:p>
+          <a:p>
+            <a:pPr algn="ctr"/>
+            <a:r>
+              <a:rPr lang="en-US" sz="1050" dirty="0">
+                <a:solidFill>
+                  <a:srgbClr val="7030A0"/>
+                </a:solidFill>
+              </a:rPr>
+              <a:t>Password</a:t>
+            </a:r>
+            <a:endParaRPr lang="en-SG" sz="1050" dirty="0">
+              <a:solidFill>
+                <a:srgbClr val="7030A0"/>
+              </a:solidFill>
+            </a:endParaRPr>
+          </a:p>
+        </p:txBody>
+      </p:sp>
+      <p:cxnSp>
+        <p:nvCxnSpPr>
+          <p:cNvPr id="101" name="Elbow Connector 83">
+            <a:extLst>
+              <a:ext uri="{FF2B5EF4-FFF2-40B4-BE49-F238E27FC236}">
+                <a16:creationId xmlns:a16="http://schemas.microsoft.com/office/drawing/2014/main" id="{7B39F98F-B55C-4B15-AC29-B28043FB6ADC}"/>
+              </a:ext>
+            </a:extLst>
+          </p:cNvPr>
+          <p:cNvCxnSpPr>
+            <a:cxnSpLocks/>
+            <a:endCxn id="98" idx="1"/>
+          </p:cNvCxnSpPr>
+          <p:nvPr/>
+        </p:nvCxnSpPr>
+        <p:spPr>
+          <a:xfrm>
+            <a:off x="7225452" y="2948488"/>
+            <a:ext cx="400246" cy="271891"/>
+          </a:xfrm>
+          <a:prstGeom prst="bentConnector3">
+            <a:avLst/>
+          </a:prstGeom>
+          <a:ln w="19050">
+            <a:solidFill>
+              <a:srgbClr val="7030A0"/>
+            </a:solidFill>
+            <a:headEnd type="none" w="med" len="med"/>
+            <a:tailEnd type="arrow" w="med" len="med"/>
+          </a:ln>
+          <a:effectLst/>
+        </p:spPr>
+        <p:style>
+          <a:lnRef idx="1">
+            <a:schemeClr val="accent2"/>
+          </a:lnRef>
+          <a:fillRef idx="2">
+            <a:schemeClr val="accent2"/>
+          </a:fillRef>
+          <a:effectRef idx="1">
+            <a:schemeClr val="accent2"/>
+          </a:effectRef>
+          <a:fontRef idx="minor">
+            <a:schemeClr val="dk1"/>
+          </a:fontRef>
+        </p:style>
+      </p:cxnSp>
+      <p:cxnSp>
+        <p:nvCxnSpPr>
+          <p:cNvPr id="103" name="Elbow Connector 63">
+            <a:extLst>
+              <a:ext uri="{FF2B5EF4-FFF2-40B4-BE49-F238E27FC236}">
+                <a16:creationId xmlns:a16="http://schemas.microsoft.com/office/drawing/2014/main" id="{7E46E0B8-F55F-4904-A145-30AF5B5752D5}"/>
+              </a:ext>
+            </a:extLst>
+          </p:cNvPr>
+          <p:cNvCxnSpPr>
+            <a:cxnSpLocks/>
+          </p:cNvCxnSpPr>
+          <p:nvPr/>
+        </p:nvCxnSpPr>
+        <p:spPr>
+          <a:xfrm rot="5400000">
+            <a:off x="3219531" y="3224885"/>
+            <a:ext cx="293825" cy="5938"/>
+          </a:xfrm>
+          <a:prstGeom prst="bentConnector3">
+            <a:avLst>
+              <a:gd name="adj1" fmla="val 50000"/>
+            </a:avLst>
+          </a:prstGeom>
+          <a:ln w="19050">
+            <a:solidFill>
+              <a:srgbClr val="7030A0"/>
+            </a:solidFill>
+            <a:prstDash val="sysDot"/>
+            <a:headEnd type="none" w="med" len="med"/>
+            <a:tailEnd type="none" w="med" len="med"/>
+          </a:ln>
+          <a:effectLst/>
+        </p:spPr>
+        <p:style>
+          <a:lnRef idx="1">
+            <a:schemeClr val="accent2"/>
+          </a:lnRef>
+          <a:fillRef idx="2">
+            <a:schemeClr val="accent2"/>
+          </a:fillRef>
+          <a:effectRef idx="1">
+            <a:schemeClr val="accent2"/>
+          </a:effectRef>
+          <a:fontRef idx="minor">
+            <a:schemeClr val="dk1"/>
+          </a:fontRef>
+        </p:style>
+      </p:cxnSp>
+      <p:sp>
+        <p:nvSpPr>
+          <p:cNvPr id="104" name="Isosceles Triangle 102">
+            <a:extLst>
+              <a:ext uri="{FF2B5EF4-FFF2-40B4-BE49-F238E27FC236}">
+                <a16:creationId xmlns:a16="http://schemas.microsoft.com/office/drawing/2014/main" id="{4F85C52D-CE4A-4509-9F3B-0F067FE8AFE9}"/>
+              </a:ext>
+            </a:extLst>
+          </p:cNvPr>
+          <p:cNvSpPr/>
+          <p:nvPr/>
+        </p:nvSpPr>
+        <p:spPr>
+          <a:xfrm flipV="1">
+            <a:off x="3225497" y="3401628"/>
+            <a:ext cx="282387" cy="157062"/>
+          </a:xfrm>
+          <a:prstGeom prst="triangle">
+            <a:avLst/>
+          </a:prstGeom>
+          <a:ln w="19050">
+            <a:solidFill>
+              <a:srgbClr val="7030A0"/>
+            </a:solidFill>
+          </a:ln>
+          <a:effectLst/>
+        </p:spPr>
+        <p:style>
+          <a:lnRef idx="1">
+            <a:schemeClr val="accent4"/>
+          </a:lnRef>
+          <a:fillRef idx="2">
+            <a:schemeClr val="accent4"/>
+          </a:fillRef>
+          <a:effectRef idx="1">
+            <a:schemeClr val="accent4"/>
+          </a:effectRef>
+          <a:fontRef idx="minor">
+            <a:schemeClr val="dk1"/>
+          </a:fontRef>
+        </p:style>
+        <p:txBody>
+          <a:bodyPr rtlCol="0" anchor="ctr"/>
+          <a:lstStyle/>
+          <a:p>
+            <a:pPr algn="ctr"/>
+            <a:endParaRPr lang="en-SG" sz="1050" b="1">
+              <a:solidFill>
+                <a:srgbClr val="92D050"/>
+              </a:solidFill>
+            </a:endParaRPr>
+          </a:p>
+        </p:txBody>
+      </p:sp>
+      <p:sp>
+        <p:nvSpPr>
+          <p:cNvPr id="105" name="Rectangle 8">
+            <a:extLst>
+              <a:ext uri="{FF2B5EF4-FFF2-40B4-BE49-F238E27FC236}">
+                <a16:creationId xmlns:a16="http://schemas.microsoft.com/office/drawing/2014/main" id="{025A3FCA-D9C8-46B6-9976-3E38E0A2AA53}"/>
+              </a:ext>
+            </a:extLst>
+          </p:cNvPr>
+          <p:cNvSpPr/>
+          <p:nvPr/>
+        </p:nvSpPr>
+        <p:spPr>
+          <a:xfrm>
+            <a:off x="2833132" y="3583565"/>
+            <a:ext cx="1060683" cy="364396"/>
+          </a:xfrm>
+          <a:prstGeom prst="rect">
+            <a:avLst/>
+          </a:prstGeom>
+          <a:ln w="19050">
+            <a:solidFill>
+              <a:srgbClr val="7030A0"/>
+            </a:solidFill>
+          </a:ln>
+          <a:effectLst/>
+        </p:spPr>
+        <p:style>
+          <a:lnRef idx="1">
+            <a:schemeClr val="accent4"/>
+          </a:lnRef>
+          <a:fillRef idx="2">
+            <a:schemeClr val="accent4"/>
+          </a:fillRef>
+          <a:effectRef idx="1">
+            <a:schemeClr val="accent4"/>
+          </a:effectRef>
+          <a:fontRef idx="minor">
+            <a:schemeClr val="dk1"/>
+          </a:fontRef>
+        </p:style>
+        <p:txBody>
+          <a:bodyPr rtlCol="0" anchor="ctr"/>
+          <a:lstStyle/>
+          <a:p>
+            <a:pPr algn="ctr"/>
+            <a:r>
+              <a:rPr lang="en-US" sz="1050" dirty="0" err="1">
+                <a:solidFill>
+                  <a:srgbClr val="7030A0"/>
+                </a:solidFill>
+              </a:rPr>
+              <a:t>LoginBook</a:t>
+            </a:r>
+            <a:endParaRPr lang="en-SG" sz="1050" dirty="0">
+              <a:solidFill>
+                <a:srgbClr val="7030A0"/>
+              </a:solidFill>
+            </a:endParaRPr>
+          </a:p>
+        </p:txBody>
+      </p:sp>
+      <p:sp>
+        <p:nvSpPr>
+          <p:cNvPr id="106" name="Isosceles Triangle 102">
+            <a:extLst>
+              <a:ext uri="{FF2B5EF4-FFF2-40B4-BE49-F238E27FC236}">
+                <a16:creationId xmlns:a16="http://schemas.microsoft.com/office/drawing/2014/main" id="{A6122181-94AD-4C61-BAEB-134CB4D5B7F5}"/>
+              </a:ext>
+            </a:extLst>
+          </p:cNvPr>
+          <p:cNvSpPr/>
+          <p:nvPr/>
+        </p:nvSpPr>
+        <p:spPr>
+          <a:xfrm rot="5400000">
+            <a:off x="4131790" y="3672055"/>
+            <a:ext cx="271014" cy="187417"/>
+          </a:xfrm>
+          <a:prstGeom prst="triangle">
+            <a:avLst>
+              <a:gd name="adj" fmla="val 44517"/>
+            </a:avLst>
+          </a:prstGeom>
+          <a:solidFill>
+            <a:schemeClr val="accent4">
+              <a:lumMod val="20000"/>
+              <a:lumOff val="80000"/>
+            </a:schemeClr>
+          </a:solidFill>
+          <a:ln w="19050">
+            <a:solidFill>
+              <a:srgbClr val="7030A0"/>
+            </a:solidFill>
+          </a:ln>
+          <a:effectLst/>
+        </p:spPr>
+        <p:style>
+          <a:lnRef idx="1">
+            <a:schemeClr val="accent6"/>
+          </a:lnRef>
+          <a:fillRef idx="2">
+            <a:schemeClr val="accent6"/>
+          </a:fillRef>
+          <a:effectRef idx="1">
+            <a:schemeClr val="accent6"/>
+          </a:effectRef>
+          <a:fontRef idx="minor">
+            <a:schemeClr val="dk1"/>
+          </a:fontRef>
+        </p:style>
+        <p:txBody>
+          <a:bodyPr rtlCol="0" anchor="ctr"/>
+          <a:lstStyle/>
+          <a:p>
+            <a:pPr algn="ctr"/>
+            <a:endParaRPr lang="en-SG" sz="1050"/>
+          </a:p>
+        </p:txBody>
+      </p:sp>
+      <p:cxnSp>
+        <p:nvCxnSpPr>
+          <p:cNvPr id="109" name="Elbow Connector 63">
+            <a:extLst>
+              <a:ext uri="{FF2B5EF4-FFF2-40B4-BE49-F238E27FC236}">
+                <a16:creationId xmlns:a16="http://schemas.microsoft.com/office/drawing/2014/main" id="{09A3BAFC-F9BC-4C6A-B42F-7CD2333ACE48}"/>
+              </a:ext>
+            </a:extLst>
+          </p:cNvPr>
+          <p:cNvCxnSpPr/>
+          <p:nvPr/>
+        </p:nvCxnSpPr>
+        <p:spPr>
+          <a:xfrm>
+            <a:off x="3905177" y="3780089"/>
+            <a:ext cx="271892" cy="2821"/>
+          </a:xfrm>
+          <a:prstGeom prst="bentConnector3">
+            <a:avLst>
+              <a:gd name="adj1" fmla="val 50000"/>
+            </a:avLst>
+          </a:prstGeom>
+          <a:ln w="19050">
+            <a:solidFill>
+              <a:srgbClr val="7030A0"/>
+            </a:solidFill>
+            <a:prstDash val="sysDot"/>
+            <a:headEnd type="none" w="med" len="med"/>
+            <a:tailEnd type="none" w="med" len="med"/>
+          </a:ln>
+          <a:effectLst/>
+        </p:spPr>
+        <p:style>
+          <a:lnRef idx="1">
+            <a:schemeClr val="accent2"/>
+          </a:lnRef>
+          <a:fillRef idx="2">
+            <a:schemeClr val="accent2"/>
+          </a:fillRef>
+          <a:effectRef idx="1">
+            <a:schemeClr val="accent2"/>
+          </a:effectRef>
+          <a:fontRef idx="minor">
+            <a:schemeClr val="dk1"/>
+          </a:fontRef>
+        </p:style>
+      </p:cxnSp>
+      <p:sp>
+        <p:nvSpPr>
+          <p:cNvPr id="110" name="Rectangle 8">
+            <a:extLst>
+              <a:ext uri="{FF2B5EF4-FFF2-40B4-BE49-F238E27FC236}">
+                <a16:creationId xmlns:a16="http://schemas.microsoft.com/office/drawing/2014/main" id="{4B4381BF-0F63-4F2B-BE33-15844B18492D}"/>
+              </a:ext>
+            </a:extLst>
+          </p:cNvPr>
+          <p:cNvSpPr/>
+          <p:nvPr/>
+        </p:nvSpPr>
+        <p:spPr>
+          <a:xfrm>
+            <a:off x="4377989" y="3597891"/>
+            <a:ext cx="1443661" cy="364396"/>
+          </a:xfrm>
+          <a:prstGeom prst="rect">
+            <a:avLst/>
+          </a:prstGeom>
+          <a:ln w="19050">
+            <a:solidFill>
+              <a:srgbClr val="7030A0"/>
+            </a:solidFill>
+          </a:ln>
+          <a:effectLst/>
+        </p:spPr>
+        <p:style>
+          <a:lnRef idx="1">
+            <a:schemeClr val="accent4"/>
+          </a:lnRef>
+          <a:fillRef idx="2">
+            <a:schemeClr val="accent4"/>
+          </a:fillRef>
+          <a:effectRef idx="1">
+            <a:schemeClr val="accent4"/>
+          </a:effectRef>
+          <a:fontRef idx="minor">
+            <a:schemeClr val="dk1"/>
+          </a:fontRef>
+        </p:style>
+        <p:txBody>
+          <a:bodyPr rtlCol="0" anchor="ctr"/>
+          <a:lstStyle/>
+          <a:p>
+            <a:pPr algn="ctr"/>
+            <a:r>
+              <a:rPr lang="en-US" sz="1050" dirty="0">
+                <a:solidFill>
+                  <a:srgbClr val="7030A0"/>
+                </a:solidFill>
+              </a:rPr>
+              <a:t>&lt;&lt;interface&gt;&gt;</a:t>
+            </a:r>
+            <a:br>
+              <a:rPr lang="en-US" sz="1050" dirty="0">
+                <a:solidFill>
+                  <a:srgbClr val="7030A0"/>
+                </a:solidFill>
+              </a:rPr>
+            </a:br>
+            <a:r>
+              <a:rPr lang="en-US" sz="1050" dirty="0" err="1">
+                <a:solidFill>
+                  <a:srgbClr val="7030A0"/>
+                </a:solidFill>
+              </a:rPr>
+              <a:t>ReadOnlyLoginBook</a:t>
+            </a:r>
+            <a:endParaRPr lang="en-SG" sz="1050" dirty="0">
+              <a:solidFill>
+                <a:srgbClr val="7030A0"/>
+              </a:solidFill>
+            </a:endParaRPr>
+          </a:p>
+        </p:txBody>
+      </p:sp>
     </p:spTree>
     <p:extLst>
       <p:ext uri="{BB962C8B-B14F-4D97-AF65-F5344CB8AC3E}">

</xml_diff>

<commit_message>
updated storage and model class diagrams
</commit_message>
<xml_diff>
--- a/docs/diagrams/ModelComponentClassDiagram.pptx
+++ b/docs/diagrams/ModelComponentClassDiagram.pptx
@@ -208,7 +208,7 @@
           <a:p>
             <a:fld id="{F5CC4B3F-88C1-4FFA-B1B6-F41C21DC6924}" type="datetimeFigureOut">
               <a:rPr lang="en-US" smtClean="0"/>
-              <a:t>10/15/2018</a:t>
+              <a:t>10/24/2018</a:t>
             </a:fld>
             <a:endParaRPr lang="en-US" dirty="0"/>
           </a:p>
@@ -738,7 +738,7 @@
           <a:p>
             <a:fld id="{78C97017-6FC3-485B-9764-EAC9E56C1D49}" type="datetimeFigureOut">
               <a:rPr lang="en-US" smtClean="0"/>
-              <a:t>10/15/2018</a:t>
+              <a:t>10/24/2018</a:t>
             </a:fld>
             <a:endParaRPr lang="en-US" dirty="0"/>
           </a:p>
@@ -906,7 +906,7 @@
           <a:p>
             <a:fld id="{78C97017-6FC3-485B-9764-EAC9E56C1D49}" type="datetimeFigureOut">
               <a:rPr lang="en-US" smtClean="0"/>
-              <a:t>10/15/2018</a:t>
+              <a:t>10/24/2018</a:t>
             </a:fld>
             <a:endParaRPr lang="en-US" dirty="0"/>
           </a:p>
@@ -1084,7 +1084,7 @@
           <a:p>
             <a:fld id="{78C97017-6FC3-485B-9764-EAC9E56C1D49}" type="datetimeFigureOut">
               <a:rPr lang="en-US" smtClean="0"/>
-              <a:t>10/15/2018</a:t>
+              <a:t>10/24/2018</a:t>
             </a:fld>
             <a:endParaRPr lang="en-US" dirty="0"/>
           </a:p>
@@ -1252,7 +1252,7 @@
           <a:p>
             <a:fld id="{78C97017-6FC3-485B-9764-EAC9E56C1D49}" type="datetimeFigureOut">
               <a:rPr lang="en-US" smtClean="0"/>
-              <a:t>10/15/2018</a:t>
+              <a:t>10/24/2018</a:t>
             </a:fld>
             <a:endParaRPr lang="en-US" dirty="0"/>
           </a:p>
@@ -1497,7 +1497,7 @@
           <a:p>
             <a:fld id="{78C97017-6FC3-485B-9764-EAC9E56C1D49}" type="datetimeFigureOut">
               <a:rPr lang="en-US" smtClean="0"/>
-              <a:t>10/15/2018</a:t>
+              <a:t>10/24/2018</a:t>
             </a:fld>
             <a:endParaRPr lang="en-US" dirty="0"/>
           </a:p>
@@ -1782,7 +1782,7 @@
           <a:p>
             <a:fld id="{78C97017-6FC3-485B-9764-EAC9E56C1D49}" type="datetimeFigureOut">
               <a:rPr lang="en-US" smtClean="0"/>
-              <a:t>10/15/2018</a:t>
+              <a:t>10/24/2018</a:t>
             </a:fld>
             <a:endParaRPr lang="en-US" dirty="0"/>
           </a:p>
@@ -2201,7 +2201,7 @@
           <a:p>
             <a:fld id="{78C97017-6FC3-485B-9764-EAC9E56C1D49}" type="datetimeFigureOut">
               <a:rPr lang="en-US" smtClean="0"/>
-              <a:t>10/15/2018</a:t>
+              <a:t>10/24/2018</a:t>
             </a:fld>
             <a:endParaRPr lang="en-US" dirty="0"/>
           </a:p>
@@ -2318,7 +2318,7 @@
           <a:p>
             <a:fld id="{78C97017-6FC3-485B-9764-EAC9E56C1D49}" type="datetimeFigureOut">
               <a:rPr lang="en-US" smtClean="0"/>
-              <a:t>10/15/2018</a:t>
+              <a:t>10/24/2018</a:t>
             </a:fld>
             <a:endParaRPr lang="en-US" dirty="0"/>
           </a:p>
@@ -2413,7 +2413,7 @@
           <a:p>
             <a:fld id="{78C97017-6FC3-485B-9764-EAC9E56C1D49}" type="datetimeFigureOut">
               <a:rPr lang="en-US" smtClean="0"/>
-              <a:t>10/15/2018</a:t>
+              <a:t>10/24/2018</a:t>
             </a:fld>
             <a:endParaRPr lang="en-US" dirty="0"/>
           </a:p>
@@ -2688,7 +2688,7 @@
           <a:p>
             <a:fld id="{78C97017-6FC3-485B-9764-EAC9E56C1D49}" type="datetimeFigureOut">
               <a:rPr lang="en-US" smtClean="0"/>
-              <a:t>10/15/2018</a:t>
+              <a:t>10/24/2018</a:t>
             </a:fld>
             <a:endParaRPr lang="en-US" dirty="0"/>
           </a:p>
@@ -2940,7 +2940,7 @@
           <a:p>
             <a:fld id="{78C97017-6FC3-485B-9764-EAC9E56C1D49}" type="datetimeFigureOut">
               <a:rPr lang="en-US" smtClean="0"/>
-              <a:t>10/15/2018</a:t>
+              <a:t>10/24/2018</a:t>
             </a:fld>
             <a:endParaRPr lang="en-US" dirty="0"/>
           </a:p>
@@ -3151,7 +3151,7 @@
           <a:p>
             <a:fld id="{78C97017-6FC3-485B-9764-EAC9E56C1D49}" type="datetimeFigureOut">
               <a:rPr lang="en-US" smtClean="0"/>
-              <a:t>10/15/2018</a:t>
+              <a:t>10/24/2018</a:t>
             </a:fld>
             <a:endParaRPr lang="en-US" dirty="0"/>
           </a:p>
@@ -3534,7 +3534,7 @@
         </p:nvSpPr>
         <p:spPr>
           <a:xfrm>
-            <a:off x="707524" y="1517007"/>
+            <a:off x="651290" y="1442046"/>
             <a:ext cx="8284076" cy="4878072"/>
           </a:xfrm>
           <a:prstGeom prst="roundRect">
@@ -4076,7 +4076,7 @@
           <a:p>
             <a:pPr algn="ctr"/>
             <a:r>
-              <a:rPr lang="en-US" sz="1050" dirty="0" err="1">
+              <a:rPr lang="en-US" sz="1050" dirty="0">
                 <a:solidFill>
                   <a:srgbClr val="7030A0"/>
                 </a:solidFill>
@@ -4219,7 +4219,7 @@
           <a:p>
             <a:pPr algn="ctr"/>
             <a:r>
-              <a:rPr lang="en-US" sz="1050" dirty="0" err="1">
+              <a:rPr lang="en-US" sz="1050" dirty="0">
                 <a:solidFill>
                   <a:srgbClr val="7030A0"/>
                 </a:solidFill>
@@ -4465,7 +4465,7 @@
           <a:p>
             <a:pPr algn="ctr"/>
             <a:r>
-              <a:rPr lang="en-US" sz="1050" dirty="0" err="1">
+              <a:rPr lang="en-US" sz="1050" dirty="0">
                 <a:solidFill>
                   <a:srgbClr val="7030A0"/>
                 </a:solidFill>
@@ -4612,7 +4612,7 @@
           <a:p>
             <a:pPr algn="ctr"/>
             <a:r>
-              <a:rPr lang="en-US" sz="1050" dirty="0" err="1">
+              <a:rPr lang="en-US" sz="1050" dirty="0">
                 <a:solidFill>
                   <a:srgbClr val="7030A0"/>
                 </a:solidFill>
@@ -4710,7 +4710,7 @@
           <a:p>
             <a:pPr algn="ctr"/>
             <a:r>
-              <a:rPr lang="en-US" sz="1050" dirty="0" err="1">
+              <a:rPr lang="en-US" sz="1050" dirty="0">
                 <a:solidFill>
                   <a:srgbClr val="7030A0"/>
                 </a:solidFill>
@@ -4808,7 +4808,7 @@
           <a:p>
             <a:pPr algn="ctr"/>
             <a:r>
-              <a:rPr lang="en-US" sz="1050" dirty="0" err="1">
+              <a:rPr lang="en-US" sz="1050" dirty="0">
                 <a:solidFill>
                   <a:srgbClr val="7030A0"/>
                 </a:solidFill>
@@ -5014,7 +5014,7 @@
               </a:rPr>
             </a:br>
             <a:r>
-              <a:rPr lang="en-US" sz="1050" dirty="0" err="1">
+              <a:rPr lang="en-US" sz="1050" dirty="0">
                 <a:solidFill>
                   <a:srgbClr val="7030A0"/>
                 </a:solidFill>
@@ -5417,7 +5417,7 @@
           <a:p>
             <a:pPr algn="ctr"/>
             <a:r>
-              <a:rPr lang="en-US" sz="1050" dirty="0" err="1">
+              <a:rPr lang="en-US" sz="1050" dirty="0">
                 <a:solidFill>
                   <a:srgbClr val="7030A0"/>
                 </a:solidFill>
@@ -5618,7 +5618,7 @@
           <a:p>
             <a:pPr algn="ctr"/>
             <a:r>
-              <a:rPr lang="en-US" sz="1050" dirty="0" err="1">
+              <a:rPr lang="en-US" sz="1050" dirty="0">
                 <a:solidFill>
                   <a:srgbClr val="7030A0"/>
                 </a:solidFill>
@@ -5728,7 +5728,7 @@
           <a:p>
             <a:pPr algn="ctr"/>
             <a:r>
-              <a:rPr lang="en-US" sz="1050" dirty="0" err="1">
+              <a:rPr lang="en-US" sz="1050" dirty="0">
                 <a:solidFill>
                   <a:srgbClr val="7030A0"/>
                 </a:solidFill>
@@ -6195,7 +6195,7 @@
           <a:p>
             <a:pPr algn="ctr"/>
             <a:r>
-              <a:rPr lang="en-US" sz="1050" dirty="0" err="1">
+              <a:rPr lang="en-US" sz="1050" dirty="0">
                 <a:solidFill>
                   <a:srgbClr val="7030A0"/>
                 </a:solidFill>
@@ -6323,7 +6323,7 @@
               </a:rPr>
             </a:br>
             <a:r>
-              <a:rPr lang="en-US" sz="1050" dirty="0" err="1">
+              <a:rPr lang="en-US" sz="1050" dirty="0">
                 <a:solidFill>
                   <a:srgbClr val="7030A0"/>
                 </a:solidFill>
@@ -6515,7 +6515,7 @@
         </p:nvSpPr>
         <p:spPr>
           <a:xfrm>
-            <a:off x="7825080" y="4180935"/>
+            <a:off x="7828038" y="4014494"/>
             <a:ext cx="889446" cy="285783"/>
           </a:xfrm>
           <a:prstGeom prst="rect">
@@ -6553,7 +6553,7 @@
                   <a:srgbClr val="7030A0"/>
                 </a:solidFill>
               </a:rPr>
-              <a:t>Date</a:t>
+              <a:t>Description</a:t>
             </a:r>
             <a:endParaRPr lang="en-SG" sz="1050" dirty="0">
               <a:solidFill>
@@ -6581,8 +6581,8 @@
         </p:nvCxnSpPr>
         <p:spPr>
           <a:xfrm flipV="1">
-            <a:off x="7376137" y="4323827"/>
-            <a:ext cx="448943" cy="314668"/>
+            <a:off x="7376137" y="4157386"/>
+            <a:ext cx="451901" cy="481109"/>
           </a:xfrm>
           <a:prstGeom prst="bentConnector3">
             <a:avLst/>
@@ -6625,7 +6625,7 @@
         </p:nvSpPr>
         <p:spPr>
           <a:xfrm>
-            <a:off x="7825080" y="4503913"/>
+            <a:off x="7825080" y="4337689"/>
             <a:ext cx="889446" cy="285783"/>
           </a:xfrm>
           <a:prstGeom prst="rect">
@@ -6663,7 +6663,7 @@
                   <a:srgbClr val="7030A0"/>
                 </a:solidFill>
               </a:rPr>
-              <a:t>Money</a:t>
+              <a:t>Date</a:t>
             </a:r>
             <a:endParaRPr lang="en-SG" sz="1050" dirty="0">
               <a:solidFill>
@@ -6690,9 +6690,9 @@
           <p:nvPr/>
         </p:nvCxnSpPr>
         <p:spPr>
-          <a:xfrm>
-            <a:off x="7376137" y="4638495"/>
-            <a:ext cx="448943" cy="8310"/>
+          <a:xfrm flipV="1">
+            <a:off x="7376137" y="4480581"/>
+            <a:ext cx="448943" cy="157914"/>
           </a:xfrm>
           <a:prstGeom prst="bentConnector3">
             <a:avLst/>
@@ -6735,7 +6735,7 @@
         </p:nvSpPr>
         <p:spPr>
           <a:xfrm>
-            <a:off x="7825079" y="4826890"/>
+            <a:off x="7825079" y="4660666"/>
             <a:ext cx="889447" cy="285783"/>
           </a:xfrm>
           <a:prstGeom prst="rect">
@@ -6773,7 +6773,7 @@
                   <a:srgbClr val="7030A0"/>
                 </a:solidFill>
               </a:rPr>
-              <a:t>Category</a:t>
+              <a:t>Money</a:t>
             </a:r>
             <a:endParaRPr lang="en-SG" sz="1050" dirty="0">
               <a:solidFill>
@@ -6802,7 +6802,7 @@
         <p:spPr>
           <a:xfrm>
             <a:off x="7376137" y="4638495"/>
-            <a:ext cx="448942" cy="331287"/>
+            <a:ext cx="448942" cy="165063"/>
           </a:xfrm>
           <a:prstGeom prst="bentConnector3">
             <a:avLst/>
@@ -7065,6 +7065,118 @@
           </a:p>
         </p:txBody>
       </p:sp>
+      <p:sp>
+        <p:nvSpPr>
+          <p:cNvPr id="74" name="Rectangle 8">
+            <a:extLst>
+              <a:ext uri="{FF2B5EF4-FFF2-40B4-BE49-F238E27FC236}">
+                <a16:creationId xmlns:a16="http://schemas.microsoft.com/office/drawing/2014/main" id="{4F6B2738-96D0-478A-962E-26A411C38361}"/>
+              </a:ext>
+            </a:extLst>
+          </p:cNvPr>
+          <p:cNvSpPr/>
+          <p:nvPr/>
+        </p:nvSpPr>
+        <p:spPr>
+          <a:xfrm>
+            <a:off x="7825079" y="4985179"/>
+            <a:ext cx="889447" cy="285783"/>
+          </a:xfrm>
+          <a:prstGeom prst="rect">
+            <a:avLst/>
+          </a:prstGeom>
+          <a:ln w="19050">
+            <a:solidFill>
+              <a:srgbClr val="7030A0"/>
+            </a:solidFill>
+          </a:ln>
+          <a:effectLst/>
+        </p:spPr>
+        <p:style>
+          <a:lnRef idx="1">
+            <a:schemeClr val="accent4"/>
+          </a:lnRef>
+          <a:fillRef idx="2">
+            <a:schemeClr val="accent4"/>
+          </a:fillRef>
+          <a:effectRef idx="1">
+            <a:schemeClr val="accent4"/>
+          </a:effectRef>
+          <a:fontRef idx="minor">
+            <a:schemeClr val="dk1"/>
+          </a:fontRef>
+        </p:style>
+        <p:txBody>
+          <a:bodyPr rtlCol="0" anchor="ctr"/>
+          <a:lstStyle/>
+          <a:p>
+            <a:pPr algn="ctr"/>
+            <a:r>
+              <a:rPr lang="en-US" sz="1050" dirty="0">
+                <a:solidFill>
+                  <a:srgbClr val="7030A0"/>
+                </a:solidFill>
+              </a:rPr>
+              <a:t>Category</a:t>
+            </a:r>
+            <a:endParaRPr lang="en-SG" sz="1050" dirty="0">
+              <a:solidFill>
+                <a:srgbClr val="7030A0"/>
+              </a:solidFill>
+            </a:endParaRPr>
+          </a:p>
+        </p:txBody>
+      </p:sp>
+      <p:cxnSp>
+        <p:nvCxnSpPr>
+          <p:cNvPr id="77" name="Elbow Connector 85">
+            <a:extLst>
+              <a:ext uri="{FF2B5EF4-FFF2-40B4-BE49-F238E27FC236}">
+                <a16:creationId xmlns:a16="http://schemas.microsoft.com/office/drawing/2014/main" id="{D757AF11-EA73-4DB8-AF46-0AE832070B43}"/>
+              </a:ext>
+            </a:extLst>
+          </p:cNvPr>
+          <p:cNvCxnSpPr>
+            <a:cxnSpLocks/>
+            <a:stCxn id="166" idx="3"/>
+            <a:endCxn id="74" idx="1"/>
+          </p:cNvCxnSpPr>
+          <p:nvPr/>
+        </p:nvCxnSpPr>
+        <p:spPr>
+          <a:xfrm>
+            <a:off x="7376137" y="4638495"/>
+            <a:ext cx="448942" cy="489576"/>
+          </a:xfrm>
+          <a:prstGeom prst="bentConnector3">
+            <a:avLst>
+              <a:gd name="adj1" fmla="val 50000"/>
+            </a:avLst>
+          </a:prstGeom>
+          <a:ln w="19050">
+            <a:solidFill>
+              <a:srgbClr val="7030A0"/>
+            </a:solidFill>
+            <a:headEnd type="none" w="med" len="med"/>
+            <a:tailEnd type="arrow" w="med" len="med"/>
+          </a:ln>
+          <a:effectLst/>
+        </p:spPr>
+        <p:style>
+          <a:lnRef idx="1">
+            <a:schemeClr val="accent2"/>
+          </a:lnRef>
+          <a:fillRef idx="2">
+            <a:schemeClr val="accent2"/>
+          </a:fillRef>
+          <a:effectRef idx="1">
+            <a:schemeClr val="accent2"/>
+          </a:effectRef>
+          <a:fontRef idx="minor">
+            <a:schemeClr val="dk1"/>
+          </a:fontRef>
+        </p:style>
+      </p:cxnSp>
     </p:spTree>
     <p:extLst>
       <p:ext uri="{BB962C8B-B14F-4D97-AF65-F5344CB8AC3E}">

</xml_diff>

<commit_message>
Update Model Class Diagram with group in dev guide
</commit_message>
<xml_diff>
--- a/docs/diagrams/ModelComponentClassDiagram.pptx
+++ b/docs/diagrams/ModelComponentClassDiagram.pptx
@@ -208,7 +208,7 @@
           <a:p>
             <a:fld id="{F5CC4B3F-88C1-4FFA-B1B6-F41C21DC6924}" type="datetimeFigureOut">
               <a:rPr lang="en-US" smtClean="0"/>
-              <a:t>6/27/2018</a:t>
+              <a:t>10/29/2018</a:t>
             </a:fld>
             <a:endParaRPr lang="en-US"/>
           </a:p>
@@ -654,7 +654,7 @@
           <a:p>
             <a:fld id="{78C97017-6FC3-485B-9764-EAC9E56C1D49}" type="datetimeFigureOut">
               <a:rPr lang="en-US" smtClean="0"/>
-              <a:t>6/27/2018</a:t>
+              <a:t>10/29/2018</a:t>
             </a:fld>
             <a:endParaRPr lang="en-US"/>
           </a:p>
@@ -822,7 +822,7 @@
           <a:p>
             <a:fld id="{78C97017-6FC3-485B-9764-EAC9E56C1D49}" type="datetimeFigureOut">
               <a:rPr lang="en-US" smtClean="0"/>
-              <a:t>6/27/2018</a:t>
+              <a:t>10/29/2018</a:t>
             </a:fld>
             <a:endParaRPr lang="en-US"/>
           </a:p>
@@ -1000,7 +1000,7 @@
           <a:p>
             <a:fld id="{78C97017-6FC3-485B-9764-EAC9E56C1D49}" type="datetimeFigureOut">
               <a:rPr lang="en-US" smtClean="0"/>
-              <a:t>6/27/2018</a:t>
+              <a:t>10/29/2018</a:t>
             </a:fld>
             <a:endParaRPr lang="en-US"/>
           </a:p>
@@ -1168,7 +1168,7 @@
           <a:p>
             <a:fld id="{78C97017-6FC3-485B-9764-EAC9E56C1D49}" type="datetimeFigureOut">
               <a:rPr lang="en-US" smtClean="0"/>
-              <a:t>6/27/2018</a:t>
+              <a:t>10/29/2018</a:t>
             </a:fld>
             <a:endParaRPr lang="en-US"/>
           </a:p>
@@ -1413,7 +1413,7 @@
           <a:p>
             <a:fld id="{78C97017-6FC3-485B-9764-EAC9E56C1D49}" type="datetimeFigureOut">
               <a:rPr lang="en-US" smtClean="0"/>
-              <a:t>6/27/2018</a:t>
+              <a:t>10/29/2018</a:t>
             </a:fld>
             <a:endParaRPr lang="en-US"/>
           </a:p>
@@ -1698,7 +1698,7 @@
           <a:p>
             <a:fld id="{78C97017-6FC3-485B-9764-EAC9E56C1D49}" type="datetimeFigureOut">
               <a:rPr lang="en-US" smtClean="0"/>
-              <a:t>6/27/2018</a:t>
+              <a:t>10/29/2018</a:t>
             </a:fld>
             <a:endParaRPr lang="en-US"/>
           </a:p>
@@ -2117,7 +2117,7 @@
           <a:p>
             <a:fld id="{78C97017-6FC3-485B-9764-EAC9E56C1D49}" type="datetimeFigureOut">
               <a:rPr lang="en-US" smtClean="0"/>
-              <a:t>6/27/2018</a:t>
+              <a:t>10/29/2018</a:t>
             </a:fld>
             <a:endParaRPr lang="en-US"/>
           </a:p>
@@ -2234,7 +2234,7 @@
           <a:p>
             <a:fld id="{78C97017-6FC3-485B-9764-EAC9E56C1D49}" type="datetimeFigureOut">
               <a:rPr lang="en-US" smtClean="0"/>
-              <a:t>6/27/2018</a:t>
+              <a:t>10/29/2018</a:t>
             </a:fld>
             <a:endParaRPr lang="en-US"/>
           </a:p>
@@ -2329,7 +2329,7 @@
           <a:p>
             <a:fld id="{78C97017-6FC3-485B-9764-EAC9E56C1D49}" type="datetimeFigureOut">
               <a:rPr lang="en-US" smtClean="0"/>
-              <a:t>6/27/2018</a:t>
+              <a:t>10/29/2018</a:t>
             </a:fld>
             <a:endParaRPr lang="en-US"/>
           </a:p>
@@ -2604,7 +2604,7 @@
           <a:p>
             <a:fld id="{78C97017-6FC3-485B-9764-EAC9E56C1D49}" type="datetimeFigureOut">
               <a:rPr lang="en-US" smtClean="0"/>
-              <a:t>6/27/2018</a:t>
+              <a:t>10/29/2018</a:t>
             </a:fld>
             <a:endParaRPr lang="en-US"/>
           </a:p>
@@ -2856,7 +2856,7 @@
           <a:p>
             <a:fld id="{78C97017-6FC3-485B-9764-EAC9E56C1D49}" type="datetimeFigureOut">
               <a:rPr lang="en-US" smtClean="0"/>
-              <a:t>6/27/2018</a:t>
+              <a:t>10/29/2018</a:t>
             </a:fld>
             <a:endParaRPr lang="en-US"/>
           </a:p>
@@ -3067,7 +3067,7 @@
           <a:p>
             <a:fld id="{78C97017-6FC3-485B-9764-EAC9E56C1D49}" type="datetimeFigureOut">
               <a:rPr lang="en-US" smtClean="0"/>
-              <a:t>6/27/2018</a:t>
+              <a:t>10/29/2018</a:t>
             </a:fld>
             <a:endParaRPr lang="en-US"/>
           </a:p>
@@ -3451,7 +3451,7 @@
         <p:spPr>
           <a:xfrm>
             <a:off x="1119865" y="1600200"/>
-            <a:ext cx="7490735" cy="3124200"/>
+            <a:ext cx="7643135" cy="3880480"/>
           </a:xfrm>
           <a:prstGeom prst="roundRect">
             <a:avLst>
@@ -3547,7 +3547,7 @@
           <a:p>
             <a:pPr algn="ctr"/>
             <a:r>
-              <a:rPr lang="en-US" sz="1050" dirty="0" err="1">
+              <a:rPr lang="en-US" sz="1050" dirty="0">
                 <a:solidFill>
                   <a:schemeClr val="bg1"/>
                 </a:solidFill>
@@ -3606,7 +3606,7 @@
           <a:p>
             <a:pPr algn="ctr"/>
             <a:r>
-              <a:rPr lang="en-US" sz="1050" dirty="0" err="1">
+              <a:rPr lang="en-US" sz="1050" dirty="0">
                 <a:solidFill>
                   <a:schemeClr val="bg1"/>
                 </a:solidFill>
@@ -3633,12 +3633,12 @@
         </p:nvCxnSpPr>
         <p:spPr>
           <a:xfrm rot="5400000" flipH="1" flipV="1">
-            <a:off x="4131507" y="1281685"/>
-            <a:ext cx="613122" cy="4459404"/>
+            <a:off x="4154923" y="1094612"/>
+            <a:ext cx="776779" cy="4669894"/>
           </a:xfrm>
           <a:prstGeom prst="bentConnector3">
             <a:avLst>
-              <a:gd name="adj1" fmla="val -26668"/>
+              <a:gd name="adj1" fmla="val -22498"/>
             </a:avLst>
           </a:prstGeom>
           <a:ln w="19050">
@@ -3962,7 +3962,7 @@
         <p:spPr>
           <a:xfrm>
             <a:off x="2825280" y="2846162"/>
-            <a:ext cx="1490560" cy="334856"/>
+            <a:ext cx="1490560" cy="548598"/>
           </a:xfrm>
           <a:prstGeom prst="rect">
             <a:avLst/>
@@ -3994,7 +3994,7 @@
           <a:p>
             <a:pPr algn="ctr"/>
             <a:r>
-              <a:rPr lang="en-US" sz="1050" dirty="0" err="1" smtClean="0">
+              <a:rPr lang="en-US" sz="1050" dirty="0">
                 <a:solidFill>
                   <a:srgbClr val="7030A0"/>
                 </a:solidFill>
@@ -4013,6 +4013,7 @@
         <p:nvCxnSpPr>
           <p:cNvPr id="47" name="Straight Arrow Connector 46"/>
           <p:cNvCxnSpPr>
+            <a:cxnSpLocks/>
             <a:stCxn id="48" idx="3"/>
             <a:endCxn id="46" idx="1"/>
           </p:cNvCxnSpPr>
@@ -4020,8 +4021,8 @@
         </p:nvCxnSpPr>
         <p:spPr>
           <a:xfrm>
-            <a:off x="2624360" y="3003033"/>
-            <a:ext cx="200920" cy="10557"/>
+            <a:off x="2589232" y="3119189"/>
+            <a:ext cx="236048" cy="1272"/>
           </a:xfrm>
           <a:prstGeom prst="straightConnector1">
             <a:avLst/>
@@ -4058,7 +4059,7 @@
         </p:nvSpPr>
         <p:spPr>
           <a:xfrm>
-            <a:off x="2388312" y="2916343"/>
+            <a:off x="2353184" y="3032499"/>
             <a:ext cx="236048" cy="173380"/>
           </a:xfrm>
           <a:prstGeom prst="flowChartDecision">
@@ -4103,7 +4104,7 @@
         </p:nvSpPr>
         <p:spPr>
           <a:xfrm>
-            <a:off x="4692650" y="2846162"/>
+            <a:off x="4767809" y="2570772"/>
             <a:ext cx="1156969" cy="346760"/>
           </a:xfrm>
           <a:prstGeom prst="rect">
@@ -4136,7 +4137,7 @@
           <a:p>
             <a:pPr algn="ctr"/>
             <a:r>
-              <a:rPr lang="en-US" sz="1050" dirty="0" err="1">
+              <a:rPr lang="en-US" sz="1050" dirty="0">
                 <a:solidFill>
                   <a:srgbClr val="7030A0"/>
                 </a:solidFill>
@@ -4206,7 +4207,7 @@
         </p:nvSpPr>
         <p:spPr>
           <a:xfrm>
-            <a:off x="6313677" y="2858066"/>
+            <a:off x="6524167" y="2694409"/>
             <a:ext cx="708186" cy="346760"/>
           </a:xfrm>
           <a:prstGeom prst="rect">
@@ -4262,7 +4263,7 @@
         </p:nvSpPr>
         <p:spPr>
           <a:xfrm>
-            <a:off x="5858751" y="2941676"/>
+            <a:off x="5924778" y="2637622"/>
             <a:ext cx="236048" cy="173380"/>
           </a:xfrm>
           <a:prstGeom prst="flowChartDecision">
@@ -4310,8 +4311,8 @@
         </p:nvCxnSpPr>
         <p:spPr>
           <a:xfrm>
-            <a:off x="6094799" y="3028366"/>
-            <a:ext cx="218878" cy="3080"/>
+            <a:off x="6160826" y="2724312"/>
+            <a:ext cx="363341" cy="143477"/>
           </a:xfrm>
           <a:prstGeom prst="bentConnector3">
             <a:avLst/>
@@ -4404,7 +4405,7 @@
         </p:nvSpPr>
         <p:spPr>
           <a:xfrm>
-            <a:off x="7041947" y="2948201"/>
+            <a:off x="7227991" y="2788997"/>
             <a:ext cx="236048" cy="173380"/>
           </a:xfrm>
           <a:prstGeom prst="flowChartDecision">
@@ -4448,13 +4449,14 @@
           <p:cNvPr id="79" name="Elbow Connector 78"/>
           <p:cNvCxnSpPr>
             <a:cxnSpLocks/>
+            <a:stCxn id="78" idx="3"/>
           </p:cNvCxnSpPr>
           <p:nvPr/>
         </p:nvCxnSpPr>
         <p:spPr>
           <a:xfrm flipV="1">
-            <a:off x="7277995" y="2706821"/>
-            <a:ext cx="434402" cy="327761"/>
+            <a:off x="7464039" y="2706823"/>
+            <a:ext cx="248358" cy="168864"/>
           </a:xfrm>
           <a:prstGeom prst="bentConnector3">
             <a:avLst/>
@@ -4549,9 +4551,9 @@
           <p:nvPr/>
         </p:nvCxnSpPr>
         <p:spPr>
-          <a:xfrm flipV="1">
-            <a:off x="7277995" y="3030108"/>
-            <a:ext cx="434402" cy="4783"/>
+          <a:xfrm>
+            <a:off x="7464039" y="2875687"/>
+            <a:ext cx="248358" cy="154421"/>
           </a:xfrm>
           <a:prstGeom prst="bentConnector3">
             <a:avLst/>
@@ -4647,8 +4649,8 @@
         </p:nvCxnSpPr>
         <p:spPr>
           <a:xfrm>
-            <a:off x="7277995" y="3034891"/>
-            <a:ext cx="434402" cy="318195"/>
+            <a:off x="7464039" y="2875687"/>
+            <a:ext cx="248358" cy="477399"/>
           </a:xfrm>
           <a:prstGeom prst="bentConnector3">
             <a:avLst/>
@@ -4744,8 +4746,8 @@
         </p:nvCxnSpPr>
         <p:spPr>
           <a:xfrm>
-            <a:off x="7277995" y="3034891"/>
-            <a:ext cx="434402" cy="641172"/>
+            <a:off x="7464039" y="2875687"/>
+            <a:ext cx="248358" cy="800376"/>
           </a:xfrm>
           <a:prstGeom prst="bentConnector3">
             <a:avLst/>
@@ -4921,7 +4923,7 @@
               </a:rPr>
             </a:br>
             <a:r>
-              <a:rPr lang="en-US" sz="1050" dirty="0" err="1">
+              <a:rPr lang="en-US" sz="1050" dirty="0">
                 <a:solidFill>
                   <a:srgbClr val="7030A0"/>
                 </a:solidFill>
@@ -4943,8 +4945,8 @@
           <p:nvPr/>
         </p:nvSpPr>
         <p:spPr>
-          <a:xfrm rot="16200000">
-            <a:off x="6362886" y="3586305"/>
+          <a:xfrm>
+            <a:off x="5282621" y="3718881"/>
             <a:ext cx="881018" cy="261610"/>
           </a:xfrm>
           <a:prstGeom prst="rect">
@@ -5023,23 +5025,15 @@
               </a:rPr>
               <a:t>&lt;&lt;interface&gt;&gt;</a:t>
             </a:r>
-            <a:r>
-              <a:rPr lang="en-US" sz="1050">
-                <a:solidFill>
-                  <a:srgbClr val="7030A0"/>
-                </a:solidFill>
-              </a:rPr>
-              <a:t/>
-            </a:r>
             <a:br>
-              <a:rPr lang="en-US" sz="1050">
+              <a:rPr lang="en-US" sz="1050" dirty="0">
                 <a:solidFill>
                   <a:srgbClr val="7030A0"/>
                 </a:solidFill>
               </a:rPr>
             </a:br>
             <a:r>
-              <a:rPr lang="en-US" sz="1050" dirty="0" err="1">
+              <a:rPr lang="en-US" sz="1050" dirty="0">
                 <a:solidFill>
                   <a:srgbClr val="7030A0"/>
                 </a:solidFill>
@@ -5104,7 +5098,7 @@
         </p:nvSpPr>
         <p:spPr>
           <a:xfrm>
-            <a:off x="4429979" y="3111479"/>
+            <a:off x="4447196" y="2775084"/>
             <a:ext cx="189257" cy="178683"/>
           </a:xfrm>
           <a:prstGeom prst="rect">
@@ -5143,7 +5137,7 @@
         </p:nvSpPr>
         <p:spPr>
           <a:xfrm>
-            <a:off x="6135256" y="3097917"/>
+            <a:off x="6322621" y="2654810"/>
             <a:ext cx="189257" cy="178683"/>
           </a:xfrm>
           <a:prstGeom prst="rect">
@@ -5182,7 +5176,7 @@
         </p:nvSpPr>
         <p:spPr>
           <a:xfrm>
-            <a:off x="2573394" y="2756715"/>
+            <a:off x="2537146" y="2881814"/>
             <a:ext cx="170110" cy="137542"/>
           </a:xfrm>
           <a:prstGeom prst="rect">
@@ -5260,7 +5254,7 @@
         </p:nvSpPr>
         <p:spPr>
           <a:xfrm>
-            <a:off x="6449896" y="3204826"/>
+            <a:off x="6679671" y="3090363"/>
             <a:ext cx="189257" cy="178683"/>
           </a:xfrm>
           <a:prstGeom prst="rect">
@@ -5371,8 +5365,8 @@
         </p:nvCxnSpPr>
         <p:spPr>
           <a:xfrm flipV="1">
-            <a:off x="7277995" y="2371709"/>
-            <a:ext cx="434402" cy="663182"/>
+            <a:off x="7464039" y="2371709"/>
+            <a:ext cx="248358" cy="503978"/>
           </a:xfrm>
           <a:prstGeom prst="bentConnector3">
             <a:avLst>
@@ -5489,7 +5483,7 @@
           <a:p>
             <a:pPr algn="ctr"/>
             <a:r>
-              <a:rPr lang="en-US" sz="1050" dirty="0" err="1">
+              <a:rPr lang="en-US" sz="1050" dirty="0">
                 <a:solidFill>
                   <a:srgbClr val="7030A0"/>
                 </a:solidFill>
@@ -5514,12 +5508,14 @@
           <p:nvPr/>
         </p:nvCxnSpPr>
         <p:spPr>
-          <a:xfrm>
-            <a:off x="4324972" y="3007222"/>
-            <a:ext cx="367678" cy="12320"/>
-          </a:xfrm>
-          <a:prstGeom prst="straightConnector1">
-            <a:avLst/>
+          <a:xfrm rot="10800000" flipH="1">
+            <a:off x="4324971" y="2744152"/>
+            <a:ext cx="442837" cy="263070"/>
+          </a:xfrm>
+          <a:prstGeom prst="bentConnector3">
+            <a:avLst>
+              <a:gd name="adj1" fmla="val 64652"/>
+            </a:avLst>
           </a:prstGeom>
           <a:ln w="19050">
             <a:solidFill>
@@ -5623,6 +5619,1100 @@
             <a:prstDash val="sysDot"/>
             <a:headEnd type="none" w="med" len="med"/>
             <a:tailEnd type="none" w="med" len="med"/>
+          </a:ln>
+          <a:effectLst/>
+        </p:spPr>
+        <p:style>
+          <a:lnRef idx="1">
+            <a:schemeClr val="accent2"/>
+          </a:lnRef>
+          <a:fillRef idx="2">
+            <a:schemeClr val="accent2"/>
+          </a:fillRef>
+          <a:effectRef idx="1">
+            <a:schemeClr val="accent2"/>
+          </a:effectRef>
+          <a:fontRef idx="minor">
+            <a:schemeClr val="dk1"/>
+          </a:fontRef>
+        </p:style>
+      </p:cxnSp>
+      <p:sp>
+        <p:nvSpPr>
+          <p:cNvPr id="56" name="Flowchart: Decision 96">
+            <a:extLst>
+              <a:ext uri="{FF2B5EF4-FFF2-40B4-BE49-F238E27FC236}">
+                <a16:creationId xmlns:a16="http://schemas.microsoft.com/office/drawing/2014/main" id="{AD942427-B037-4950-BB6A-8A398F111667}"/>
+              </a:ext>
+            </a:extLst>
+          </p:cNvPr>
+          <p:cNvSpPr/>
+          <p:nvPr/>
+        </p:nvSpPr>
+        <p:spPr>
+          <a:xfrm>
+            <a:off x="4344925" y="3179705"/>
+            <a:ext cx="236048" cy="173380"/>
+          </a:xfrm>
+          <a:prstGeom prst="flowChartDecision">
+            <a:avLst/>
+          </a:prstGeom>
+          <a:solidFill>
+            <a:srgbClr val="7030A0"/>
+          </a:solidFill>
+          <a:ln w="19050">
+            <a:solidFill>
+              <a:srgbClr val="7030A0"/>
+            </a:solidFill>
+          </a:ln>
+          <a:effectLst/>
+        </p:spPr>
+        <p:style>
+          <a:lnRef idx="1">
+            <a:schemeClr val="accent6"/>
+          </a:lnRef>
+          <a:fillRef idx="2">
+            <a:schemeClr val="accent6"/>
+          </a:fillRef>
+          <a:effectRef idx="1">
+            <a:schemeClr val="accent6"/>
+          </a:effectRef>
+          <a:fontRef idx="minor">
+            <a:schemeClr val="dk1"/>
+          </a:fontRef>
+        </p:style>
+        <p:txBody>
+          <a:bodyPr rtlCol="0" anchor="ctr"/>
+          <a:lstStyle/>
+          <a:p>
+            <a:pPr algn="ctr"/>
+            <a:endParaRPr lang="en-US" sz="1050"/>
+          </a:p>
+        </p:txBody>
+      </p:sp>
+      <p:cxnSp>
+        <p:nvCxnSpPr>
+          <p:cNvPr id="67" name="Straight Arrow Connector 59">
+            <a:extLst>
+              <a:ext uri="{FF2B5EF4-FFF2-40B4-BE49-F238E27FC236}">
+                <a16:creationId xmlns:a16="http://schemas.microsoft.com/office/drawing/2014/main" id="{A54CDAA1-10A6-4815-B077-C39815CFCB04}"/>
+              </a:ext>
+            </a:extLst>
+          </p:cNvPr>
+          <p:cNvCxnSpPr>
+            <a:cxnSpLocks/>
+            <a:stCxn id="56" idx="3"/>
+            <a:endCxn id="88" idx="1"/>
+          </p:cNvCxnSpPr>
+          <p:nvPr/>
+        </p:nvCxnSpPr>
+        <p:spPr>
+          <a:xfrm>
+            <a:off x="4580973" y="3266395"/>
+            <a:ext cx="304860" cy="1183466"/>
+          </a:xfrm>
+          <a:prstGeom prst="bentConnector3">
+            <a:avLst>
+              <a:gd name="adj1" fmla="val 50000"/>
+            </a:avLst>
+          </a:prstGeom>
+          <a:ln w="19050">
+            <a:solidFill>
+              <a:srgbClr val="7030A0"/>
+            </a:solidFill>
+            <a:headEnd type="none" w="med" len="med"/>
+            <a:tailEnd type="arrow" w="med" len="med"/>
+          </a:ln>
+          <a:effectLst/>
+        </p:spPr>
+        <p:style>
+          <a:lnRef idx="1">
+            <a:schemeClr val="accent2"/>
+          </a:lnRef>
+          <a:fillRef idx="2">
+            <a:schemeClr val="accent2"/>
+          </a:fillRef>
+          <a:effectRef idx="1">
+            <a:schemeClr val="accent2"/>
+          </a:effectRef>
+          <a:fontRef idx="minor">
+            <a:schemeClr val="dk1"/>
+          </a:fontRef>
+        </p:style>
+      </p:cxnSp>
+      <p:sp>
+        <p:nvSpPr>
+          <p:cNvPr id="82" name="TextBox 81">
+            <a:extLst>
+              <a:ext uri="{FF2B5EF4-FFF2-40B4-BE49-F238E27FC236}">
+                <a16:creationId xmlns:a16="http://schemas.microsoft.com/office/drawing/2014/main" id="{815FAC9A-8276-4FAD-AA8B-A6EFBEFA114E}"/>
+              </a:ext>
+            </a:extLst>
+          </p:cNvPr>
+          <p:cNvSpPr txBox="1"/>
+          <p:nvPr/>
+        </p:nvSpPr>
+        <p:spPr>
+          <a:xfrm>
+            <a:off x="4536770" y="3069503"/>
+            <a:ext cx="189257" cy="178683"/>
+          </a:xfrm>
+          <a:prstGeom prst="rect">
+            <a:avLst/>
+          </a:prstGeom>
+          <a:noFill/>
+        </p:spPr>
+        <p:txBody>
+          <a:bodyPr wrap="square" lIns="0" tIns="0" rIns="0" bIns="0" rtlCol="0">
+            <a:noAutofit/>
+          </a:bodyPr>
+          <a:lstStyle/>
+          <a:p>
+            <a:pPr algn="ctr"/>
+            <a:r>
+              <a:rPr lang="en-US" sz="1100" dirty="0">
+                <a:solidFill>
+                  <a:srgbClr val="7030A0"/>
+                </a:solidFill>
+              </a:rPr>
+              <a:t>1</a:t>
+            </a:r>
+            <a:endParaRPr lang="en-SG" sz="1100" dirty="0">
+              <a:solidFill>
+                <a:srgbClr val="7030A0"/>
+              </a:solidFill>
+            </a:endParaRPr>
+          </a:p>
+        </p:txBody>
+      </p:sp>
+      <p:sp>
+        <p:nvSpPr>
+          <p:cNvPr id="88" name="Rectangle 8">
+            <a:extLst>
+              <a:ext uri="{FF2B5EF4-FFF2-40B4-BE49-F238E27FC236}">
+                <a16:creationId xmlns:a16="http://schemas.microsoft.com/office/drawing/2014/main" id="{2BDD1E2F-7E04-405A-BE7E-54F89F47039B}"/>
+              </a:ext>
+            </a:extLst>
+          </p:cNvPr>
+          <p:cNvSpPr/>
+          <p:nvPr/>
+        </p:nvSpPr>
+        <p:spPr>
+          <a:xfrm>
+            <a:off x="4885833" y="4276481"/>
+            <a:ext cx="1156969" cy="346760"/>
+          </a:xfrm>
+          <a:prstGeom prst="rect">
+            <a:avLst/>
+          </a:prstGeom>
+          <a:ln w="19050">
+            <a:solidFill>
+              <a:srgbClr val="7030A0"/>
+            </a:solidFill>
+          </a:ln>
+          <a:effectLst/>
+        </p:spPr>
+        <p:style>
+          <a:lnRef idx="1">
+            <a:schemeClr val="accent4"/>
+          </a:lnRef>
+          <a:fillRef idx="2">
+            <a:schemeClr val="accent4"/>
+          </a:fillRef>
+          <a:effectRef idx="1">
+            <a:schemeClr val="accent4"/>
+          </a:effectRef>
+          <a:fontRef idx="minor">
+            <a:schemeClr val="dk1"/>
+          </a:fontRef>
+        </p:style>
+        <p:txBody>
+          <a:bodyPr rtlCol="0" anchor="ctr"/>
+          <a:lstStyle/>
+          <a:p>
+            <a:pPr algn="ctr"/>
+            <a:r>
+              <a:rPr lang="en-US" sz="1050" dirty="0">
+                <a:solidFill>
+                  <a:srgbClr val="7030A0"/>
+                </a:solidFill>
+              </a:rPr>
+              <a:t>UniqueGroupList</a:t>
+            </a:r>
+            <a:endParaRPr lang="en-SG" sz="1050" dirty="0">
+              <a:solidFill>
+                <a:srgbClr val="7030A0"/>
+              </a:solidFill>
+            </a:endParaRPr>
+          </a:p>
+        </p:txBody>
+      </p:sp>
+      <p:sp>
+        <p:nvSpPr>
+          <p:cNvPr id="98" name="Flowchart: Decision 96">
+            <a:extLst>
+              <a:ext uri="{FF2B5EF4-FFF2-40B4-BE49-F238E27FC236}">
+                <a16:creationId xmlns:a16="http://schemas.microsoft.com/office/drawing/2014/main" id="{368FB3D0-E277-4954-8241-B398876D05CE}"/>
+              </a:ext>
+            </a:extLst>
+          </p:cNvPr>
+          <p:cNvSpPr/>
+          <p:nvPr/>
+        </p:nvSpPr>
+        <p:spPr>
+          <a:xfrm>
+            <a:off x="6041409" y="4363171"/>
+            <a:ext cx="236048" cy="173380"/>
+          </a:xfrm>
+          <a:prstGeom prst="flowChartDecision">
+            <a:avLst/>
+          </a:prstGeom>
+          <a:noFill/>
+          <a:ln w="19050">
+            <a:solidFill>
+              <a:srgbClr val="7030A0"/>
+            </a:solidFill>
+          </a:ln>
+          <a:effectLst/>
+        </p:spPr>
+        <p:style>
+          <a:lnRef idx="1">
+            <a:schemeClr val="accent6"/>
+          </a:lnRef>
+          <a:fillRef idx="2">
+            <a:schemeClr val="accent6"/>
+          </a:fillRef>
+          <a:effectRef idx="1">
+            <a:schemeClr val="accent6"/>
+          </a:effectRef>
+          <a:fontRef idx="minor">
+            <a:schemeClr val="dk1"/>
+          </a:fontRef>
+        </p:style>
+        <p:txBody>
+          <a:bodyPr rtlCol="0" anchor="ctr"/>
+          <a:lstStyle/>
+          <a:p>
+            <a:pPr algn="ctr"/>
+            <a:endParaRPr lang="en-US" sz="1050"/>
+          </a:p>
+        </p:txBody>
+      </p:sp>
+      <p:cxnSp>
+        <p:nvCxnSpPr>
+          <p:cNvPr id="101" name="Elbow Connector 63">
+            <a:extLst>
+              <a:ext uri="{FF2B5EF4-FFF2-40B4-BE49-F238E27FC236}">
+                <a16:creationId xmlns:a16="http://schemas.microsoft.com/office/drawing/2014/main" id="{CB5757CF-4FFC-44CE-859A-415D874F92A9}"/>
+              </a:ext>
+            </a:extLst>
+          </p:cNvPr>
+          <p:cNvCxnSpPr>
+            <a:cxnSpLocks/>
+          </p:cNvCxnSpPr>
+          <p:nvPr/>
+        </p:nvCxnSpPr>
+        <p:spPr>
+          <a:xfrm>
+            <a:off x="6287099" y="4440065"/>
+            <a:ext cx="200132" cy="0"/>
+          </a:xfrm>
+          <a:prstGeom prst="straightConnector1">
+            <a:avLst/>
+          </a:prstGeom>
+          <a:ln w="19050">
+            <a:solidFill>
+              <a:srgbClr val="7030A0"/>
+            </a:solidFill>
+            <a:headEnd type="none" w="med" len="med"/>
+            <a:tailEnd type="arrow" w="med" len="med"/>
+          </a:ln>
+          <a:effectLst/>
+        </p:spPr>
+        <p:style>
+          <a:lnRef idx="1">
+            <a:schemeClr val="accent2"/>
+          </a:lnRef>
+          <a:fillRef idx="2">
+            <a:schemeClr val="accent2"/>
+          </a:fillRef>
+          <a:effectRef idx="1">
+            <a:schemeClr val="accent2"/>
+          </a:effectRef>
+          <a:fontRef idx="minor">
+            <a:schemeClr val="dk1"/>
+          </a:fontRef>
+        </p:style>
+      </p:cxnSp>
+      <p:sp>
+        <p:nvSpPr>
+          <p:cNvPr id="102" name="TextBox 101">
+            <a:extLst>
+              <a:ext uri="{FF2B5EF4-FFF2-40B4-BE49-F238E27FC236}">
+                <a16:creationId xmlns:a16="http://schemas.microsoft.com/office/drawing/2014/main" id="{64EC9B50-DDC8-4E86-A384-1D4E015D7BC4}"/>
+              </a:ext>
+            </a:extLst>
+          </p:cNvPr>
+          <p:cNvSpPr txBox="1"/>
+          <p:nvPr/>
+        </p:nvSpPr>
+        <p:spPr>
+          <a:xfrm>
+            <a:off x="6263829" y="4253905"/>
+            <a:ext cx="189257" cy="178683"/>
+          </a:xfrm>
+          <a:prstGeom prst="rect">
+            <a:avLst/>
+          </a:prstGeom>
+          <a:noFill/>
+        </p:spPr>
+        <p:txBody>
+          <a:bodyPr wrap="square" lIns="0" tIns="0" rIns="0" bIns="0" rtlCol="0">
+            <a:noAutofit/>
+          </a:bodyPr>
+          <a:lstStyle/>
+          <a:p>
+            <a:pPr algn="ctr"/>
+            <a:r>
+              <a:rPr lang="en-US" sz="1100" dirty="0">
+                <a:solidFill>
+                  <a:srgbClr val="7030A0"/>
+                </a:solidFill>
+              </a:rPr>
+              <a:t>*</a:t>
+            </a:r>
+            <a:endParaRPr lang="en-SG" sz="1100" dirty="0">
+              <a:solidFill>
+                <a:srgbClr val="7030A0"/>
+              </a:solidFill>
+            </a:endParaRPr>
+          </a:p>
+        </p:txBody>
+      </p:sp>
+      <p:sp>
+        <p:nvSpPr>
+          <p:cNvPr id="103" name="Rectangle 8">
+            <a:extLst>
+              <a:ext uri="{FF2B5EF4-FFF2-40B4-BE49-F238E27FC236}">
+                <a16:creationId xmlns:a16="http://schemas.microsoft.com/office/drawing/2014/main" id="{47C467E5-FE35-4DC1-9DA6-879A4DEBBD99}"/>
+              </a:ext>
+            </a:extLst>
+          </p:cNvPr>
+          <p:cNvSpPr/>
+          <p:nvPr/>
+        </p:nvSpPr>
+        <p:spPr>
+          <a:xfrm>
+            <a:off x="6490192" y="4266685"/>
+            <a:ext cx="708186" cy="346760"/>
+          </a:xfrm>
+          <a:prstGeom prst="rect">
+            <a:avLst/>
+          </a:prstGeom>
+          <a:ln w="19050">
+            <a:solidFill>
+              <a:srgbClr val="7030A0"/>
+            </a:solidFill>
+          </a:ln>
+          <a:effectLst/>
+        </p:spPr>
+        <p:style>
+          <a:lnRef idx="1">
+            <a:schemeClr val="accent4"/>
+          </a:lnRef>
+          <a:fillRef idx="2">
+            <a:schemeClr val="accent4"/>
+          </a:fillRef>
+          <a:effectRef idx="1">
+            <a:schemeClr val="accent4"/>
+          </a:effectRef>
+          <a:fontRef idx="minor">
+            <a:schemeClr val="dk1"/>
+          </a:fontRef>
+        </p:style>
+        <p:txBody>
+          <a:bodyPr rtlCol="0" anchor="ctr"/>
+          <a:lstStyle/>
+          <a:p>
+            <a:pPr algn="ctr"/>
+            <a:r>
+              <a:rPr lang="en-US" sz="1050" dirty="0">
+                <a:solidFill>
+                  <a:srgbClr val="7030A0"/>
+                </a:solidFill>
+              </a:rPr>
+              <a:t>Group</a:t>
+            </a:r>
+            <a:endParaRPr lang="en-SG" sz="1050" dirty="0">
+              <a:solidFill>
+                <a:srgbClr val="7030A0"/>
+              </a:solidFill>
+            </a:endParaRPr>
+          </a:p>
+        </p:txBody>
+      </p:sp>
+      <p:sp>
+        <p:nvSpPr>
+          <p:cNvPr id="104" name="Flowchart: Decision 96">
+            <a:extLst>
+              <a:ext uri="{FF2B5EF4-FFF2-40B4-BE49-F238E27FC236}">
+                <a16:creationId xmlns:a16="http://schemas.microsoft.com/office/drawing/2014/main" id="{D228881C-F0D1-40B7-A294-C2E20AE2FFC6}"/>
+              </a:ext>
+            </a:extLst>
+          </p:cNvPr>
+          <p:cNvSpPr/>
+          <p:nvPr/>
+        </p:nvSpPr>
+        <p:spPr>
+          <a:xfrm>
+            <a:off x="7214115" y="4369564"/>
+            <a:ext cx="236048" cy="173380"/>
+          </a:xfrm>
+          <a:prstGeom prst="flowChartDecision">
+            <a:avLst/>
+          </a:prstGeom>
+          <a:solidFill>
+            <a:srgbClr val="7030A0"/>
+          </a:solidFill>
+          <a:ln w="19050">
+            <a:solidFill>
+              <a:srgbClr val="7030A0"/>
+            </a:solidFill>
+          </a:ln>
+          <a:effectLst/>
+        </p:spPr>
+        <p:style>
+          <a:lnRef idx="1">
+            <a:schemeClr val="accent6"/>
+          </a:lnRef>
+          <a:fillRef idx="2">
+            <a:schemeClr val="accent6"/>
+          </a:fillRef>
+          <a:effectRef idx="1">
+            <a:schemeClr val="accent6"/>
+          </a:effectRef>
+          <a:fontRef idx="minor">
+            <a:schemeClr val="dk1"/>
+          </a:fontRef>
+        </p:style>
+        <p:txBody>
+          <a:bodyPr rtlCol="0" anchor="ctr"/>
+          <a:lstStyle/>
+          <a:p>
+            <a:pPr algn="ctr"/>
+            <a:endParaRPr lang="en-US" sz="1050"/>
+          </a:p>
+        </p:txBody>
+      </p:sp>
+      <p:cxnSp>
+        <p:nvCxnSpPr>
+          <p:cNvPr id="105" name="Elbow Connector 85">
+            <a:extLst>
+              <a:ext uri="{FF2B5EF4-FFF2-40B4-BE49-F238E27FC236}">
+                <a16:creationId xmlns:a16="http://schemas.microsoft.com/office/drawing/2014/main" id="{4491426D-04C4-4BE3-9FFE-03E2CA827D29}"/>
+              </a:ext>
+            </a:extLst>
+          </p:cNvPr>
+          <p:cNvCxnSpPr>
+            <a:cxnSpLocks/>
+            <a:stCxn id="104" idx="3"/>
+            <a:endCxn id="121" idx="1"/>
+          </p:cNvCxnSpPr>
+          <p:nvPr/>
+        </p:nvCxnSpPr>
+        <p:spPr>
+          <a:xfrm>
+            <a:off x="7450163" y="4456254"/>
+            <a:ext cx="256734" cy="333249"/>
+          </a:xfrm>
+          <a:prstGeom prst="bentConnector3">
+            <a:avLst>
+              <a:gd name="adj1" fmla="val 50000"/>
+            </a:avLst>
+          </a:prstGeom>
+          <a:ln w="19050">
+            <a:solidFill>
+              <a:srgbClr val="7030A0"/>
+            </a:solidFill>
+            <a:headEnd type="none" w="med" len="med"/>
+            <a:tailEnd type="arrow" w="med" len="med"/>
+          </a:ln>
+          <a:effectLst/>
+        </p:spPr>
+        <p:style>
+          <a:lnRef idx="1">
+            <a:schemeClr val="accent2"/>
+          </a:lnRef>
+          <a:fillRef idx="2">
+            <a:schemeClr val="accent2"/>
+          </a:fillRef>
+          <a:effectRef idx="1">
+            <a:schemeClr val="accent2"/>
+          </a:effectRef>
+          <a:fontRef idx="minor">
+            <a:schemeClr val="dk1"/>
+          </a:fontRef>
+        </p:style>
+      </p:cxnSp>
+      <p:cxnSp>
+        <p:nvCxnSpPr>
+          <p:cNvPr id="106" name="Elbow Connector 78">
+            <a:extLst>
+              <a:ext uri="{FF2B5EF4-FFF2-40B4-BE49-F238E27FC236}">
+                <a16:creationId xmlns:a16="http://schemas.microsoft.com/office/drawing/2014/main" id="{9E762DB8-C2A4-4BFF-8FDE-30943AED8763}"/>
+              </a:ext>
+            </a:extLst>
+          </p:cNvPr>
+          <p:cNvCxnSpPr>
+            <a:cxnSpLocks/>
+            <a:stCxn id="104" idx="3"/>
+            <a:endCxn id="108" idx="1"/>
+          </p:cNvCxnSpPr>
+          <p:nvPr/>
+        </p:nvCxnSpPr>
+        <p:spPr>
+          <a:xfrm flipV="1">
+            <a:off x="7450163" y="4066158"/>
+            <a:ext cx="256734" cy="390096"/>
+          </a:xfrm>
+          <a:prstGeom prst="bentConnector3">
+            <a:avLst>
+              <a:gd name="adj1" fmla="val 50000"/>
+            </a:avLst>
+          </a:prstGeom>
+          <a:ln w="19050">
+            <a:solidFill>
+              <a:srgbClr val="7030A0"/>
+            </a:solidFill>
+            <a:headEnd type="none" w="med" len="med"/>
+            <a:tailEnd type="arrow" w="med" len="med"/>
+          </a:ln>
+          <a:effectLst/>
+        </p:spPr>
+        <p:style>
+          <a:lnRef idx="1">
+            <a:schemeClr val="accent2"/>
+          </a:lnRef>
+          <a:fillRef idx="2">
+            <a:schemeClr val="accent2"/>
+          </a:fillRef>
+          <a:effectRef idx="1">
+            <a:schemeClr val="accent2"/>
+          </a:effectRef>
+          <a:fontRef idx="minor">
+            <a:schemeClr val="dk1"/>
+          </a:fontRef>
+        </p:style>
+      </p:cxnSp>
+      <p:sp>
+        <p:nvSpPr>
+          <p:cNvPr id="108" name="Rectangle 8">
+            <a:extLst>
+              <a:ext uri="{FF2B5EF4-FFF2-40B4-BE49-F238E27FC236}">
+                <a16:creationId xmlns:a16="http://schemas.microsoft.com/office/drawing/2014/main" id="{BEA635A1-2943-44DE-BBE9-766EDFAEFADA}"/>
+              </a:ext>
+            </a:extLst>
+          </p:cNvPr>
+          <p:cNvSpPr/>
+          <p:nvPr/>
+        </p:nvSpPr>
+        <p:spPr>
+          <a:xfrm>
+            <a:off x="7706897" y="3923266"/>
+            <a:ext cx="708186" cy="285783"/>
+          </a:xfrm>
+          <a:prstGeom prst="rect">
+            <a:avLst/>
+          </a:prstGeom>
+          <a:ln w="19050">
+            <a:solidFill>
+              <a:srgbClr val="7030A0"/>
+            </a:solidFill>
+          </a:ln>
+          <a:effectLst/>
+        </p:spPr>
+        <p:style>
+          <a:lnRef idx="1">
+            <a:schemeClr val="accent4"/>
+          </a:lnRef>
+          <a:fillRef idx="2">
+            <a:schemeClr val="accent4"/>
+          </a:fillRef>
+          <a:effectRef idx="1">
+            <a:schemeClr val="accent4"/>
+          </a:effectRef>
+          <a:fontRef idx="minor">
+            <a:schemeClr val="dk1"/>
+          </a:fontRef>
+        </p:style>
+        <p:txBody>
+          <a:bodyPr rtlCol="0" anchor="ctr"/>
+          <a:lstStyle/>
+          <a:p>
+            <a:pPr algn="ctr"/>
+            <a:r>
+              <a:rPr lang="en-US" sz="1050" dirty="0">
+                <a:solidFill>
+                  <a:srgbClr val="7030A0"/>
+                </a:solidFill>
+              </a:rPr>
+              <a:t>Person</a:t>
+            </a:r>
+            <a:endParaRPr lang="en-SG" sz="1050" dirty="0">
+              <a:solidFill>
+                <a:srgbClr val="7030A0"/>
+              </a:solidFill>
+            </a:endParaRPr>
+          </a:p>
+        </p:txBody>
+      </p:sp>
+      <p:sp>
+        <p:nvSpPr>
+          <p:cNvPr id="113" name="Rectangle 8">
+            <a:extLst>
+              <a:ext uri="{FF2B5EF4-FFF2-40B4-BE49-F238E27FC236}">
+                <a16:creationId xmlns:a16="http://schemas.microsoft.com/office/drawing/2014/main" id="{A56A6644-43F8-4067-92F1-B5434BA2A943}"/>
+              </a:ext>
+            </a:extLst>
+          </p:cNvPr>
+          <p:cNvSpPr/>
+          <p:nvPr/>
+        </p:nvSpPr>
+        <p:spPr>
+          <a:xfrm>
+            <a:off x="7712397" y="4276481"/>
+            <a:ext cx="708186" cy="285783"/>
+          </a:xfrm>
+          <a:prstGeom prst="rect">
+            <a:avLst/>
+          </a:prstGeom>
+          <a:ln w="19050">
+            <a:solidFill>
+              <a:srgbClr val="7030A0"/>
+            </a:solidFill>
+          </a:ln>
+          <a:effectLst/>
+        </p:spPr>
+        <p:style>
+          <a:lnRef idx="1">
+            <a:schemeClr val="accent4"/>
+          </a:lnRef>
+          <a:fillRef idx="2">
+            <a:schemeClr val="accent4"/>
+          </a:fillRef>
+          <a:effectRef idx="1">
+            <a:schemeClr val="accent4"/>
+          </a:effectRef>
+          <a:fontRef idx="minor">
+            <a:schemeClr val="dk1"/>
+          </a:fontRef>
+        </p:style>
+        <p:txBody>
+          <a:bodyPr rtlCol="0" anchor="ctr"/>
+          <a:lstStyle/>
+          <a:p>
+            <a:pPr algn="ctr"/>
+            <a:r>
+              <a:rPr lang="en-US" sz="1050" dirty="0">
+                <a:solidFill>
+                  <a:srgbClr val="7030A0"/>
+                </a:solidFill>
+              </a:rPr>
+              <a:t>Tag</a:t>
+            </a:r>
+            <a:endParaRPr lang="en-SG" sz="1050" dirty="0">
+              <a:solidFill>
+                <a:srgbClr val="7030A0"/>
+              </a:solidFill>
+            </a:endParaRPr>
+          </a:p>
+        </p:txBody>
+      </p:sp>
+      <p:cxnSp>
+        <p:nvCxnSpPr>
+          <p:cNvPr id="115" name="Elbow Connector 78">
+            <a:extLst>
+              <a:ext uri="{FF2B5EF4-FFF2-40B4-BE49-F238E27FC236}">
+                <a16:creationId xmlns:a16="http://schemas.microsoft.com/office/drawing/2014/main" id="{30C8B651-47E8-4B88-A6C0-398C3D16828A}"/>
+              </a:ext>
+            </a:extLst>
+          </p:cNvPr>
+          <p:cNvCxnSpPr>
+            <a:cxnSpLocks/>
+            <a:stCxn id="104" idx="3"/>
+            <a:endCxn id="113" idx="1"/>
+          </p:cNvCxnSpPr>
+          <p:nvPr/>
+        </p:nvCxnSpPr>
+        <p:spPr>
+          <a:xfrm flipV="1">
+            <a:off x="7450163" y="4419373"/>
+            <a:ext cx="262234" cy="36881"/>
+          </a:xfrm>
+          <a:prstGeom prst="bentConnector3">
+            <a:avLst>
+              <a:gd name="adj1" fmla="val 50000"/>
+            </a:avLst>
+          </a:prstGeom>
+          <a:ln w="19050">
+            <a:solidFill>
+              <a:srgbClr val="7030A0"/>
+            </a:solidFill>
+            <a:headEnd type="none" w="med" len="med"/>
+            <a:tailEnd type="arrow" w="med" len="med"/>
+          </a:ln>
+          <a:effectLst/>
+        </p:spPr>
+        <p:style>
+          <a:lnRef idx="1">
+            <a:schemeClr val="accent2"/>
+          </a:lnRef>
+          <a:fillRef idx="2">
+            <a:schemeClr val="accent2"/>
+          </a:fillRef>
+          <a:effectRef idx="1">
+            <a:schemeClr val="accent2"/>
+          </a:effectRef>
+          <a:fontRef idx="minor">
+            <a:schemeClr val="dk1"/>
+          </a:fontRef>
+        </p:style>
+      </p:cxnSp>
+      <p:sp>
+        <p:nvSpPr>
+          <p:cNvPr id="121" name="Rectangle 8">
+            <a:extLst>
+              <a:ext uri="{FF2B5EF4-FFF2-40B4-BE49-F238E27FC236}">
+                <a16:creationId xmlns:a16="http://schemas.microsoft.com/office/drawing/2014/main" id="{BA277858-16BF-4963-BE12-82E1546F86BF}"/>
+              </a:ext>
+            </a:extLst>
+          </p:cNvPr>
+          <p:cNvSpPr/>
+          <p:nvPr/>
+        </p:nvSpPr>
+        <p:spPr>
+          <a:xfrm>
+            <a:off x="7706897" y="4646611"/>
+            <a:ext cx="708186" cy="285783"/>
+          </a:xfrm>
+          <a:prstGeom prst="rect">
+            <a:avLst/>
+          </a:prstGeom>
+          <a:ln w="19050">
+            <a:solidFill>
+              <a:srgbClr val="7030A0"/>
+            </a:solidFill>
+          </a:ln>
+          <a:effectLst/>
+        </p:spPr>
+        <p:style>
+          <a:lnRef idx="1">
+            <a:schemeClr val="accent4"/>
+          </a:lnRef>
+          <a:fillRef idx="2">
+            <a:schemeClr val="accent4"/>
+          </a:fillRef>
+          <a:effectRef idx="1">
+            <a:schemeClr val="accent4"/>
+          </a:effectRef>
+          <a:fontRef idx="minor">
+            <a:schemeClr val="dk1"/>
+          </a:fontRef>
+        </p:style>
+        <p:txBody>
+          <a:bodyPr rtlCol="0" anchor="ctr"/>
+          <a:lstStyle/>
+          <a:p>
+            <a:pPr algn="ctr"/>
+            <a:r>
+              <a:rPr lang="en-US" sz="1050" dirty="0">
+                <a:solidFill>
+                  <a:srgbClr val="7030A0"/>
+                </a:solidFill>
+              </a:rPr>
+              <a:t>Location</a:t>
+            </a:r>
+            <a:endParaRPr lang="en-SG" sz="1050" dirty="0">
+              <a:solidFill>
+                <a:srgbClr val="7030A0"/>
+              </a:solidFill>
+            </a:endParaRPr>
+          </a:p>
+        </p:txBody>
+      </p:sp>
+      <p:sp>
+        <p:nvSpPr>
+          <p:cNvPr id="123" name="Rectangle 8">
+            <a:extLst>
+              <a:ext uri="{FF2B5EF4-FFF2-40B4-BE49-F238E27FC236}">
+                <a16:creationId xmlns:a16="http://schemas.microsoft.com/office/drawing/2014/main" id="{93BCEC57-5E81-41D7-B55C-D5ED58121453}"/>
+              </a:ext>
+            </a:extLst>
+          </p:cNvPr>
+          <p:cNvSpPr/>
+          <p:nvPr/>
+        </p:nvSpPr>
+        <p:spPr>
+          <a:xfrm>
+            <a:off x="7706897" y="5042382"/>
+            <a:ext cx="708186" cy="285783"/>
+          </a:xfrm>
+          <a:prstGeom prst="rect">
+            <a:avLst/>
+          </a:prstGeom>
+          <a:ln w="19050">
+            <a:solidFill>
+              <a:srgbClr val="7030A0"/>
+            </a:solidFill>
+          </a:ln>
+          <a:effectLst/>
+        </p:spPr>
+        <p:style>
+          <a:lnRef idx="1">
+            <a:schemeClr val="accent4"/>
+          </a:lnRef>
+          <a:fillRef idx="2">
+            <a:schemeClr val="accent4"/>
+          </a:fillRef>
+          <a:effectRef idx="1">
+            <a:schemeClr val="accent4"/>
+          </a:effectRef>
+          <a:fontRef idx="minor">
+            <a:schemeClr val="dk1"/>
+          </a:fontRef>
+        </p:style>
+        <p:txBody>
+          <a:bodyPr rtlCol="0" anchor="ctr"/>
+          <a:lstStyle/>
+          <a:p>
+            <a:pPr algn="ctr"/>
+            <a:r>
+              <a:rPr lang="en-US" sz="1050" dirty="0">
+                <a:solidFill>
+                  <a:srgbClr val="7030A0"/>
+                </a:solidFill>
+              </a:rPr>
+              <a:t>Name</a:t>
+            </a:r>
+            <a:endParaRPr lang="en-SG" sz="1050" dirty="0">
+              <a:solidFill>
+                <a:srgbClr val="7030A0"/>
+              </a:solidFill>
+            </a:endParaRPr>
+          </a:p>
+        </p:txBody>
+      </p:sp>
+      <p:cxnSp>
+        <p:nvCxnSpPr>
+          <p:cNvPr id="125" name="Elbow Connector 85">
+            <a:extLst>
+              <a:ext uri="{FF2B5EF4-FFF2-40B4-BE49-F238E27FC236}">
+                <a16:creationId xmlns:a16="http://schemas.microsoft.com/office/drawing/2014/main" id="{80A2F7F9-FF29-4ECE-A2D2-97C5731496C1}"/>
+              </a:ext>
+            </a:extLst>
+          </p:cNvPr>
+          <p:cNvCxnSpPr>
+            <a:cxnSpLocks/>
+            <a:stCxn id="104" idx="3"/>
+            <a:endCxn id="123" idx="1"/>
+          </p:cNvCxnSpPr>
+          <p:nvPr/>
+        </p:nvCxnSpPr>
+        <p:spPr>
+          <a:xfrm>
+            <a:off x="7450163" y="4456254"/>
+            <a:ext cx="256734" cy="729020"/>
+          </a:xfrm>
+          <a:prstGeom prst="bentConnector3">
+            <a:avLst/>
+          </a:prstGeom>
+          <a:ln w="19050">
+            <a:solidFill>
+              <a:srgbClr val="7030A0"/>
+            </a:solidFill>
+            <a:headEnd type="none" w="med" len="med"/>
+            <a:tailEnd type="arrow" w="med" len="med"/>
+          </a:ln>
+          <a:effectLst/>
+        </p:spPr>
+        <p:style>
+          <a:lnRef idx="1">
+            <a:schemeClr val="accent2"/>
+          </a:lnRef>
+          <a:fillRef idx="2">
+            <a:schemeClr val="accent2"/>
+          </a:fillRef>
+          <a:effectRef idx="1">
+            <a:schemeClr val="accent2"/>
+          </a:effectRef>
+          <a:fontRef idx="minor">
+            <a:schemeClr val="dk1"/>
+          </a:fontRef>
+        </p:style>
+      </p:cxnSp>
+      <p:sp>
+        <p:nvSpPr>
+          <p:cNvPr id="127" name="TextBox 126">
+            <a:extLst>
+              <a:ext uri="{FF2B5EF4-FFF2-40B4-BE49-F238E27FC236}">
+                <a16:creationId xmlns:a16="http://schemas.microsoft.com/office/drawing/2014/main" id="{37FBCD33-7E9C-4192-9F55-44B9B0C13BD5}"/>
+              </a:ext>
+            </a:extLst>
+          </p:cNvPr>
+          <p:cNvSpPr txBox="1"/>
+          <p:nvPr/>
+        </p:nvSpPr>
+        <p:spPr>
+          <a:xfrm>
+            <a:off x="7535102" y="3869034"/>
+            <a:ext cx="189257" cy="178683"/>
+          </a:xfrm>
+          <a:prstGeom prst="rect">
+            <a:avLst/>
+          </a:prstGeom>
+          <a:noFill/>
+        </p:spPr>
+        <p:txBody>
+          <a:bodyPr wrap="square" lIns="0" tIns="0" rIns="0" bIns="0" rtlCol="0">
+            <a:noAutofit/>
+          </a:bodyPr>
+          <a:lstStyle/>
+          <a:p>
+            <a:pPr algn="ctr"/>
+            <a:r>
+              <a:rPr lang="en-US" sz="1100" dirty="0">
+                <a:solidFill>
+                  <a:srgbClr val="7030A0"/>
+                </a:solidFill>
+              </a:rPr>
+              <a:t>*</a:t>
+            </a:r>
+            <a:endParaRPr lang="en-SG" sz="1100" dirty="0">
+              <a:solidFill>
+                <a:srgbClr val="7030A0"/>
+              </a:solidFill>
+            </a:endParaRPr>
+          </a:p>
+        </p:txBody>
+      </p:sp>
+      <p:sp>
+        <p:nvSpPr>
+          <p:cNvPr id="128" name="TextBox 127">
+            <a:extLst>
+              <a:ext uri="{FF2B5EF4-FFF2-40B4-BE49-F238E27FC236}">
+                <a16:creationId xmlns:a16="http://schemas.microsoft.com/office/drawing/2014/main" id="{74365617-AC94-4133-AB44-1039D08B2199}"/>
+              </a:ext>
+            </a:extLst>
+          </p:cNvPr>
+          <p:cNvSpPr txBox="1"/>
+          <p:nvPr/>
+        </p:nvSpPr>
+        <p:spPr>
+          <a:xfrm>
+            <a:off x="7537635" y="4245930"/>
+            <a:ext cx="189257" cy="178683"/>
+          </a:xfrm>
+          <a:prstGeom prst="rect">
+            <a:avLst/>
+          </a:prstGeom>
+          <a:noFill/>
+        </p:spPr>
+        <p:txBody>
+          <a:bodyPr wrap="square" lIns="0" tIns="0" rIns="0" bIns="0" rtlCol="0">
+            <a:noAutofit/>
+          </a:bodyPr>
+          <a:lstStyle/>
+          <a:p>
+            <a:pPr algn="ctr"/>
+            <a:r>
+              <a:rPr lang="en-US" sz="1100" dirty="0">
+                <a:solidFill>
+                  <a:srgbClr val="7030A0"/>
+                </a:solidFill>
+              </a:rPr>
+              <a:t>*</a:t>
+            </a:r>
+            <a:endParaRPr lang="en-SG" sz="1100" dirty="0">
+              <a:solidFill>
+                <a:srgbClr val="7030A0"/>
+              </a:solidFill>
+            </a:endParaRPr>
+          </a:p>
+        </p:txBody>
+      </p:sp>
+      <p:sp>
+        <p:nvSpPr>
+          <p:cNvPr id="147" name="TextBox 146">
+            <a:extLst>
+              <a:ext uri="{FF2B5EF4-FFF2-40B4-BE49-F238E27FC236}">
+                <a16:creationId xmlns:a16="http://schemas.microsoft.com/office/drawing/2014/main" id="{2D2EC995-DD44-4299-99C8-C60BA385BCF4}"/>
+              </a:ext>
+            </a:extLst>
+          </p:cNvPr>
+          <p:cNvSpPr txBox="1"/>
+          <p:nvPr/>
+        </p:nvSpPr>
+        <p:spPr>
+          <a:xfrm>
+            <a:off x="6656214" y="4030366"/>
+            <a:ext cx="189257" cy="178683"/>
+          </a:xfrm>
+          <a:prstGeom prst="rect">
+            <a:avLst/>
+          </a:prstGeom>
+          <a:noFill/>
+        </p:spPr>
+        <p:txBody>
+          <a:bodyPr wrap="square" lIns="0" tIns="0" rIns="0" bIns="0" rtlCol="0">
+            <a:noAutofit/>
+          </a:bodyPr>
+          <a:lstStyle/>
+          <a:p>
+            <a:pPr algn="ctr"/>
+            <a:r>
+              <a:rPr lang="en-US" sz="1100" dirty="0">
+                <a:solidFill>
+                  <a:srgbClr val="7030A0"/>
+                </a:solidFill>
+              </a:rPr>
+              <a:t>1</a:t>
+            </a:r>
+            <a:endParaRPr lang="en-SG" sz="1100" dirty="0">
+              <a:solidFill>
+                <a:srgbClr val="7030A0"/>
+              </a:solidFill>
+            </a:endParaRPr>
+          </a:p>
+        </p:txBody>
+      </p:sp>
+      <p:cxnSp>
+        <p:nvCxnSpPr>
+          <p:cNvPr id="148" name="Elbow Connector 63">
+            <a:extLst>
+              <a:ext uri="{FF2B5EF4-FFF2-40B4-BE49-F238E27FC236}">
+                <a16:creationId xmlns:a16="http://schemas.microsoft.com/office/drawing/2014/main" id="{7A437043-6AF4-4FEC-B031-121B4FAACBD8}"/>
+              </a:ext>
+            </a:extLst>
+          </p:cNvPr>
+          <p:cNvCxnSpPr>
+            <a:cxnSpLocks/>
+          </p:cNvCxnSpPr>
+          <p:nvPr/>
+        </p:nvCxnSpPr>
+        <p:spPr>
+          <a:xfrm>
+            <a:off x="6878260" y="3991920"/>
+            <a:ext cx="0" cy="275356"/>
+          </a:xfrm>
+          <a:prstGeom prst="straightConnector1">
+            <a:avLst/>
+          </a:prstGeom>
+          <a:ln w="19050">
+            <a:solidFill>
+              <a:srgbClr val="7030A0"/>
+            </a:solidFill>
+            <a:headEnd type="none" w="med" len="med"/>
+            <a:tailEnd type="arrow" w="med" len="med"/>
           </a:ln>
           <a:effectLst/>
         </p:spPr>

</xml_diff>

<commit_message>
dev guide diagram updated - model
</commit_message>
<xml_diff>
--- a/docs/diagrams/ModelComponentClassDiagram.pptx
+++ b/docs/diagrams/ModelComponentClassDiagram.pptx
@@ -208,7 +208,7 @@
           <a:p>
             <a:fld id="{F5CC4B3F-88C1-4FFA-B1B6-F41C21DC6924}" type="datetimeFigureOut">
               <a:rPr lang="en-US" smtClean="0"/>
-              <a:t>6/27/2018</a:t>
+              <a:t>11/11/18</a:t>
             </a:fld>
             <a:endParaRPr lang="en-US"/>
           </a:p>
@@ -654,7 +654,7 @@
           <a:p>
             <a:fld id="{78C97017-6FC3-485B-9764-EAC9E56C1D49}" type="datetimeFigureOut">
               <a:rPr lang="en-US" smtClean="0"/>
-              <a:t>6/27/2018</a:t>
+              <a:t>11/11/18</a:t>
             </a:fld>
             <a:endParaRPr lang="en-US"/>
           </a:p>
@@ -822,7 +822,7 @@
           <a:p>
             <a:fld id="{78C97017-6FC3-485B-9764-EAC9E56C1D49}" type="datetimeFigureOut">
               <a:rPr lang="en-US" smtClean="0"/>
-              <a:t>6/27/2018</a:t>
+              <a:t>11/11/18</a:t>
             </a:fld>
             <a:endParaRPr lang="en-US"/>
           </a:p>
@@ -1000,7 +1000,7 @@
           <a:p>
             <a:fld id="{78C97017-6FC3-485B-9764-EAC9E56C1D49}" type="datetimeFigureOut">
               <a:rPr lang="en-US" smtClean="0"/>
-              <a:t>6/27/2018</a:t>
+              <a:t>11/11/18</a:t>
             </a:fld>
             <a:endParaRPr lang="en-US"/>
           </a:p>
@@ -1168,7 +1168,7 @@
           <a:p>
             <a:fld id="{78C97017-6FC3-485B-9764-EAC9E56C1D49}" type="datetimeFigureOut">
               <a:rPr lang="en-US" smtClean="0"/>
-              <a:t>6/27/2018</a:t>
+              <a:t>11/11/18</a:t>
             </a:fld>
             <a:endParaRPr lang="en-US"/>
           </a:p>
@@ -1413,7 +1413,7 @@
           <a:p>
             <a:fld id="{78C97017-6FC3-485B-9764-EAC9E56C1D49}" type="datetimeFigureOut">
               <a:rPr lang="en-US" smtClean="0"/>
-              <a:t>6/27/2018</a:t>
+              <a:t>11/11/18</a:t>
             </a:fld>
             <a:endParaRPr lang="en-US"/>
           </a:p>
@@ -1698,7 +1698,7 @@
           <a:p>
             <a:fld id="{78C97017-6FC3-485B-9764-EAC9E56C1D49}" type="datetimeFigureOut">
               <a:rPr lang="en-US" smtClean="0"/>
-              <a:t>6/27/2018</a:t>
+              <a:t>11/11/18</a:t>
             </a:fld>
             <a:endParaRPr lang="en-US"/>
           </a:p>
@@ -2117,7 +2117,7 @@
           <a:p>
             <a:fld id="{78C97017-6FC3-485B-9764-EAC9E56C1D49}" type="datetimeFigureOut">
               <a:rPr lang="en-US" smtClean="0"/>
-              <a:t>6/27/2018</a:t>
+              <a:t>11/11/18</a:t>
             </a:fld>
             <a:endParaRPr lang="en-US"/>
           </a:p>
@@ -2234,7 +2234,7 @@
           <a:p>
             <a:fld id="{78C97017-6FC3-485B-9764-EAC9E56C1D49}" type="datetimeFigureOut">
               <a:rPr lang="en-US" smtClean="0"/>
-              <a:t>6/27/2018</a:t>
+              <a:t>11/11/18</a:t>
             </a:fld>
             <a:endParaRPr lang="en-US"/>
           </a:p>
@@ -2329,7 +2329,7 @@
           <a:p>
             <a:fld id="{78C97017-6FC3-485B-9764-EAC9E56C1D49}" type="datetimeFigureOut">
               <a:rPr lang="en-US" smtClean="0"/>
-              <a:t>6/27/2018</a:t>
+              <a:t>11/11/18</a:t>
             </a:fld>
             <a:endParaRPr lang="en-US"/>
           </a:p>
@@ -2604,7 +2604,7 @@
           <a:p>
             <a:fld id="{78C97017-6FC3-485B-9764-EAC9E56C1D49}" type="datetimeFigureOut">
               <a:rPr lang="en-US" smtClean="0"/>
-              <a:t>6/27/2018</a:t>
+              <a:t>11/11/18</a:t>
             </a:fld>
             <a:endParaRPr lang="en-US"/>
           </a:p>
@@ -2856,7 +2856,7 @@
           <a:p>
             <a:fld id="{78C97017-6FC3-485B-9764-EAC9E56C1D49}" type="datetimeFigureOut">
               <a:rPr lang="en-US" smtClean="0"/>
-              <a:t>6/27/2018</a:t>
+              <a:t>11/11/18</a:t>
             </a:fld>
             <a:endParaRPr lang="en-US"/>
           </a:p>
@@ -3067,7 +3067,7 @@
           <a:p>
             <a:fld id="{78C97017-6FC3-485B-9764-EAC9E56C1D49}" type="datetimeFigureOut">
               <a:rPr lang="en-US" smtClean="0"/>
-              <a:t>6/27/2018</a:t>
+              <a:t>11/11/18</a:t>
             </a:fld>
             <a:endParaRPr lang="en-US"/>
           </a:p>
@@ -3442,2205 +3442,42 @@
           <a:chExt cx="0" cy="0"/>
         </a:xfrm>
       </p:grpSpPr>
-      <p:sp>
-        <p:nvSpPr>
-          <p:cNvPr id="118" name="Rectangle 65"/>
-          <p:cNvSpPr/>
+      <p:pic>
+        <p:nvPicPr>
+          <p:cNvPr id="4" name="Picture 3">
+            <a:extLst>
+              <a:ext uri="{FF2B5EF4-FFF2-40B4-BE49-F238E27FC236}">
+                <a16:creationId xmlns:a16="http://schemas.microsoft.com/office/drawing/2014/main" id="{C9CBA285-0640-5E4A-AF09-6F7C7CB81216}"/>
+              </a:ext>
+            </a:extLst>
+          </p:cNvPr>
+          <p:cNvPicPr>
+            <a:picLocks noChangeAspect="1"/>
+          </p:cNvPicPr>
           <p:nvPr/>
-        </p:nvSpPr>
+        </p:nvPicPr>
+        <p:blipFill>
+          <a:blip r:embed="rId2">
+            <a:extLst>
+              <a:ext uri="{28A0092B-C50C-407E-A947-70E740481C1C}">
+                <a14:useLocalDpi xmlns:a14="http://schemas.microsoft.com/office/drawing/2010/main" val="0"/>
+              </a:ext>
+            </a:extLst>
+          </a:blip>
+          <a:stretch>
+            <a:fillRect/>
+          </a:stretch>
+        </p:blipFill>
         <p:spPr>
           <a:xfrm>
-            <a:off x="1119865" y="1600200"/>
-            <a:ext cx="7490735" cy="3124200"/>
-          </a:xfrm>
-          <a:prstGeom prst="roundRect">
-            <a:avLst>
-              <a:gd name="adj" fmla="val 3484"/>
-            </a:avLst>
-          </a:prstGeom>
-          <a:solidFill>
-            <a:schemeClr val="accent4">
-              <a:lumMod val="20000"/>
-              <a:lumOff val="80000"/>
-            </a:schemeClr>
-          </a:solidFill>
-          <a:ln w="19050">
-            <a:noFill/>
-          </a:ln>
-          <a:effectLst/>
-        </p:spPr>
-        <p:style>
-          <a:lnRef idx="1">
-            <a:schemeClr val="accent2"/>
-          </a:lnRef>
-          <a:fillRef idx="2">
-            <a:schemeClr val="accent2"/>
-          </a:fillRef>
-          <a:effectRef idx="1">
-            <a:schemeClr val="accent2"/>
-          </a:effectRef>
-          <a:fontRef idx="minor">
-            <a:schemeClr val="dk1"/>
-          </a:fontRef>
-        </p:style>
-        <p:txBody>
-          <a:bodyPr rtlCol="0" anchor="t"/>
-          <a:lstStyle/>
-          <a:p>
-            <a:r>
-              <a:rPr lang="en-US" sz="1200" b="1" dirty="0">
-                <a:solidFill>
-                  <a:srgbClr val="7030A0"/>
-                </a:solidFill>
-              </a:rPr>
-              <a:t>Model</a:t>
-            </a:r>
-            <a:endParaRPr lang="en-SG" sz="1200" b="1" dirty="0">
-              <a:solidFill>
-                <a:srgbClr val="7030A0"/>
-              </a:solidFill>
-            </a:endParaRPr>
-          </a:p>
-        </p:txBody>
-      </p:sp>
-      <p:sp>
-        <p:nvSpPr>
-          <p:cNvPr id="2" name="Rectangle 8"/>
-          <p:cNvSpPr/>
-          <p:nvPr/>
-        </p:nvSpPr>
-        <p:spPr>
-          <a:xfrm>
-            <a:off x="2877180" y="3463240"/>
-            <a:ext cx="1093635" cy="346760"/>
+            <a:off x="766884" y="282575"/>
+            <a:ext cx="7610232" cy="6292850"/>
           </a:xfrm>
           <a:prstGeom prst="rect">
             <a:avLst/>
           </a:prstGeom>
-          <a:solidFill>
-            <a:srgbClr val="7030A0"/>
-          </a:solidFill>
-          <a:ln w="19050">
-            <a:solidFill>
-              <a:srgbClr val="7030A0"/>
-            </a:solidFill>
-          </a:ln>
-          <a:effectLst/>
         </p:spPr>
-        <p:style>
-          <a:lnRef idx="1">
-            <a:schemeClr val="accent2"/>
-          </a:lnRef>
-          <a:fillRef idx="2">
-            <a:schemeClr val="accent2"/>
-          </a:fillRef>
-          <a:effectRef idx="1">
-            <a:schemeClr val="accent2"/>
-          </a:effectRef>
-          <a:fontRef idx="minor">
-            <a:schemeClr val="dk1"/>
-          </a:fontRef>
-        </p:style>
-        <p:txBody>
-          <a:bodyPr rtlCol="0" anchor="ctr"/>
-          <a:lstStyle/>
-          <a:p>
-            <a:pPr algn="ctr"/>
-            <a:r>
-              <a:rPr lang="en-US" sz="1050" dirty="0" err="1">
-                <a:solidFill>
-                  <a:schemeClr val="bg1"/>
-                </a:solidFill>
-              </a:rPr>
-              <a:t>UserPref</a:t>
-            </a:r>
-            <a:endParaRPr lang="en-SG" sz="1050" dirty="0">
-              <a:solidFill>
-                <a:schemeClr val="bg1"/>
-              </a:solidFill>
-            </a:endParaRPr>
-          </a:p>
-        </p:txBody>
-      </p:sp>
-      <p:sp>
-        <p:nvSpPr>
-          <p:cNvPr id="9" name="Rectangle 62"/>
-          <p:cNvSpPr/>
-          <p:nvPr/>
-        </p:nvSpPr>
-        <p:spPr>
-          <a:xfrm rot="16200000">
-            <a:off x="1661548" y="3097750"/>
-            <a:ext cx="1093635" cy="346760"/>
-          </a:xfrm>
-          <a:prstGeom prst="rect">
-            <a:avLst/>
-          </a:prstGeom>
-          <a:solidFill>
-            <a:srgbClr val="7030A0"/>
-          </a:solidFill>
-          <a:ln w="19050">
-            <a:solidFill>
-              <a:srgbClr val="7030A0"/>
-            </a:solidFill>
-          </a:ln>
-          <a:effectLst/>
-        </p:spPr>
-        <p:style>
-          <a:lnRef idx="1">
-            <a:schemeClr val="accent2"/>
-          </a:lnRef>
-          <a:fillRef idx="2">
-            <a:schemeClr val="accent2"/>
-          </a:fillRef>
-          <a:effectRef idx="1">
-            <a:schemeClr val="accent2"/>
-          </a:effectRef>
-          <a:fontRef idx="minor">
-            <a:schemeClr val="dk1"/>
-          </a:fontRef>
-        </p:style>
-        <p:txBody>
-          <a:bodyPr rtlCol="0" anchor="ctr"/>
-          <a:lstStyle/>
-          <a:p>
-            <a:pPr algn="ctr"/>
-            <a:r>
-              <a:rPr lang="en-US" sz="1050" dirty="0" err="1">
-                <a:solidFill>
-                  <a:schemeClr val="bg1"/>
-                </a:solidFill>
-              </a:rPr>
-              <a:t>ModelManager</a:t>
-            </a:r>
-            <a:endParaRPr lang="en-SG" sz="1050" dirty="0">
-              <a:solidFill>
-                <a:schemeClr val="bg1"/>
-              </a:solidFill>
-            </a:endParaRPr>
-          </a:p>
-        </p:txBody>
-      </p:sp>
-      <p:cxnSp>
-        <p:nvCxnSpPr>
-          <p:cNvPr id="107" name="Elbow Connector 106"/>
-          <p:cNvCxnSpPr>
-            <a:cxnSpLocks/>
-            <a:stCxn id="9" idx="1"/>
-            <a:endCxn id="62" idx="2"/>
-          </p:cNvCxnSpPr>
-          <p:nvPr/>
-        </p:nvCxnSpPr>
-        <p:spPr>
-          <a:xfrm rot="5400000" flipH="1" flipV="1">
-            <a:off x="4131507" y="1281685"/>
-            <a:ext cx="613122" cy="4459404"/>
-          </a:xfrm>
-          <a:prstGeom prst="bentConnector3">
-            <a:avLst>
-              <a:gd name="adj1" fmla="val -26668"/>
-            </a:avLst>
-          </a:prstGeom>
-          <a:ln w="19050">
-            <a:solidFill>
-              <a:srgbClr val="7030A0"/>
-            </a:solidFill>
-            <a:prstDash val="solid"/>
-            <a:headEnd type="none" w="med" len="med"/>
-            <a:tailEnd type="arrow" w="med" len="med"/>
-          </a:ln>
-          <a:effectLst/>
-        </p:spPr>
-        <p:style>
-          <a:lnRef idx="1">
-            <a:schemeClr val="accent2"/>
-          </a:lnRef>
-          <a:fillRef idx="2">
-            <a:schemeClr val="accent2"/>
-          </a:fillRef>
-          <a:effectRef idx="1">
-            <a:schemeClr val="accent2"/>
-          </a:effectRef>
-          <a:fontRef idx="minor">
-            <a:schemeClr val="dk1"/>
-          </a:fontRef>
-        </p:style>
-      </p:cxnSp>
-      <p:sp>
-        <p:nvSpPr>
-          <p:cNvPr id="119" name="Rectangle 62"/>
-          <p:cNvSpPr/>
-          <p:nvPr/>
-        </p:nvSpPr>
-        <p:spPr>
-          <a:xfrm rot="16200000">
-            <a:off x="956202" y="2861202"/>
-            <a:ext cx="1093635" cy="346760"/>
-          </a:xfrm>
-          <a:prstGeom prst="rect">
-            <a:avLst/>
-          </a:prstGeom>
-          <a:solidFill>
-            <a:srgbClr val="7030A0"/>
-          </a:solidFill>
-          <a:ln w="19050">
-            <a:solidFill>
-              <a:srgbClr val="7030A0"/>
-            </a:solidFill>
-          </a:ln>
-          <a:effectLst/>
-        </p:spPr>
-        <p:style>
-          <a:lnRef idx="1">
-            <a:schemeClr val="accent2"/>
-          </a:lnRef>
-          <a:fillRef idx="2">
-            <a:schemeClr val="accent2"/>
-          </a:fillRef>
-          <a:effectRef idx="1">
-            <a:schemeClr val="accent2"/>
-          </a:effectRef>
-          <a:fontRef idx="minor">
-            <a:schemeClr val="dk1"/>
-          </a:fontRef>
-        </p:style>
-        <p:txBody>
-          <a:bodyPr rtlCol="0" anchor="ctr"/>
-          <a:lstStyle/>
-          <a:p>
-            <a:pPr algn="ctr"/>
-            <a:r>
-              <a:rPr lang="en-US" sz="1050" dirty="0">
-                <a:solidFill>
-                  <a:schemeClr val="bg1"/>
-                </a:solidFill>
-              </a:rPr>
-              <a:t>&lt;&lt;interface&gt;&gt;</a:t>
-            </a:r>
-          </a:p>
-          <a:p>
-            <a:pPr algn="ctr"/>
-            <a:r>
-              <a:rPr lang="en-US" sz="1050" dirty="0">
-                <a:solidFill>
-                  <a:schemeClr val="bg1"/>
-                </a:solidFill>
-              </a:rPr>
-              <a:t>Model</a:t>
-            </a:r>
-            <a:endParaRPr lang="en-SG" sz="1050" dirty="0">
-              <a:solidFill>
-                <a:schemeClr val="bg1"/>
-              </a:solidFill>
-            </a:endParaRPr>
-          </a:p>
-        </p:txBody>
-      </p:sp>
-      <p:sp>
-        <p:nvSpPr>
-          <p:cNvPr id="120" name="Isosceles Triangle 102"/>
-          <p:cNvSpPr/>
-          <p:nvPr/>
-        </p:nvSpPr>
-        <p:spPr>
-          <a:xfrm rot="16200000">
-            <a:off x="1626910" y="2952291"/>
-            <a:ext cx="270504" cy="175523"/>
-          </a:xfrm>
-          <a:prstGeom prst="triangle">
-            <a:avLst/>
-          </a:prstGeom>
-          <a:solidFill>
-            <a:srgbClr val="7030A0"/>
-          </a:solidFill>
-          <a:ln w="19050">
-            <a:solidFill>
-              <a:srgbClr val="7030A0"/>
-            </a:solidFill>
-          </a:ln>
-          <a:effectLst/>
-        </p:spPr>
-        <p:style>
-          <a:lnRef idx="1">
-            <a:schemeClr val="accent6"/>
-          </a:lnRef>
-          <a:fillRef idx="2">
-            <a:schemeClr val="accent6"/>
-          </a:fillRef>
-          <a:effectRef idx="1">
-            <a:schemeClr val="accent6"/>
-          </a:effectRef>
-          <a:fontRef idx="minor">
-            <a:schemeClr val="dk1"/>
-          </a:fontRef>
-        </p:style>
-        <p:txBody>
-          <a:bodyPr rtlCol="0" anchor="ctr"/>
-          <a:lstStyle/>
-          <a:p>
-            <a:pPr algn="ctr"/>
-            <a:endParaRPr lang="en-SG" sz="1050"/>
-          </a:p>
-        </p:txBody>
-      </p:sp>
-      <p:cxnSp>
-        <p:nvCxnSpPr>
-          <p:cNvPr id="58" name="Straight Arrow Connector 57"/>
-          <p:cNvCxnSpPr>
-            <a:stCxn id="42" idx="3"/>
-            <a:endCxn id="2" idx="1"/>
-          </p:cNvCxnSpPr>
-          <p:nvPr/>
-        </p:nvCxnSpPr>
-        <p:spPr>
-          <a:xfrm>
-            <a:off x="2609828" y="3636620"/>
-            <a:ext cx="267352" cy="0"/>
-          </a:xfrm>
-          <a:prstGeom prst="straightConnector1">
-            <a:avLst/>
-          </a:prstGeom>
-          <a:ln w="19050">
-            <a:solidFill>
-              <a:srgbClr val="7030A0"/>
-            </a:solidFill>
-            <a:headEnd type="none" w="med" len="med"/>
-            <a:tailEnd type="arrow" w="med" len="med"/>
-          </a:ln>
-          <a:effectLst/>
-        </p:spPr>
-        <p:style>
-          <a:lnRef idx="1">
-            <a:schemeClr val="accent2"/>
-          </a:lnRef>
-          <a:fillRef idx="2">
-            <a:schemeClr val="accent2"/>
-          </a:fillRef>
-          <a:effectRef idx="1">
-            <a:schemeClr val="accent2"/>
-          </a:effectRef>
-          <a:fontRef idx="minor">
-            <a:schemeClr val="dk1"/>
-          </a:fontRef>
-        </p:style>
-      </p:cxnSp>
-      <p:cxnSp>
-        <p:nvCxnSpPr>
-          <p:cNvPr id="75" name="Elbow Connector 122"/>
-          <p:cNvCxnSpPr/>
-          <p:nvPr/>
-        </p:nvCxnSpPr>
-        <p:spPr>
-          <a:xfrm>
-            <a:off x="910091" y="3040053"/>
-            <a:ext cx="419548" cy="2860"/>
-          </a:xfrm>
-          <a:prstGeom prst="bentConnector3">
-            <a:avLst>
-              <a:gd name="adj1" fmla="val 50000"/>
-            </a:avLst>
-          </a:prstGeom>
-          <a:ln w="19050">
-            <a:solidFill>
-              <a:schemeClr val="bg1">
-                <a:lumMod val="75000"/>
-              </a:schemeClr>
-            </a:solidFill>
-            <a:prstDash val="sysDot"/>
-            <a:headEnd type="none" w="med" len="med"/>
-            <a:tailEnd type="arrow" w="med" len="med"/>
-          </a:ln>
-          <a:effectLst/>
-        </p:spPr>
-        <p:style>
-          <a:lnRef idx="1">
-            <a:schemeClr val="accent2"/>
-          </a:lnRef>
-          <a:fillRef idx="2">
-            <a:schemeClr val="accent2"/>
-          </a:fillRef>
-          <a:effectRef idx="1">
-            <a:schemeClr val="accent2"/>
-          </a:effectRef>
-          <a:fontRef idx="minor">
-            <a:schemeClr val="dk1"/>
-          </a:fontRef>
-        </p:style>
-      </p:cxnSp>
-      <p:cxnSp>
-        <p:nvCxnSpPr>
-          <p:cNvPr id="21" name="Straight Connector 20"/>
-          <p:cNvCxnSpPr>
-            <a:stCxn id="120" idx="3"/>
-          </p:cNvCxnSpPr>
-          <p:nvPr/>
-        </p:nvCxnSpPr>
-        <p:spPr>
-          <a:xfrm flipV="1">
-            <a:off x="1849924" y="3040052"/>
-            <a:ext cx="216105" cy="1"/>
-          </a:xfrm>
-          <a:prstGeom prst="line">
-            <a:avLst/>
-          </a:prstGeom>
-          <a:ln w="19050">
-            <a:solidFill>
-              <a:srgbClr val="7030A0"/>
-            </a:solidFill>
-            <a:prstDash val="sysDot"/>
-            <a:headEnd type="none" w="med" len="med"/>
-            <a:tailEnd type="none" w="med" len="med"/>
-          </a:ln>
-          <a:effectLst/>
-        </p:spPr>
-        <p:style>
-          <a:lnRef idx="1">
-            <a:schemeClr val="accent2"/>
-          </a:lnRef>
-          <a:fillRef idx="2">
-            <a:schemeClr val="accent2"/>
-          </a:fillRef>
-          <a:effectRef idx="1">
-            <a:schemeClr val="accent2"/>
-          </a:effectRef>
-          <a:fontRef idx="minor">
-            <a:schemeClr val="dk1"/>
-          </a:fontRef>
-        </p:style>
-      </p:cxnSp>
-      <p:sp>
-        <p:nvSpPr>
-          <p:cNvPr id="42" name="Flowchart: Decision 96"/>
-          <p:cNvSpPr/>
-          <p:nvPr/>
-        </p:nvSpPr>
-        <p:spPr>
-          <a:xfrm>
-            <a:off x="2373780" y="3549930"/>
-            <a:ext cx="236048" cy="173380"/>
-          </a:xfrm>
-          <a:prstGeom prst="flowChartDecision">
-            <a:avLst/>
-          </a:prstGeom>
-          <a:noFill/>
-          <a:ln w="19050">
-            <a:solidFill>
-              <a:srgbClr val="7030A0"/>
-            </a:solidFill>
-          </a:ln>
-          <a:effectLst/>
-        </p:spPr>
-        <p:style>
-          <a:lnRef idx="1">
-            <a:schemeClr val="accent6"/>
-          </a:lnRef>
-          <a:fillRef idx="2">
-            <a:schemeClr val="accent6"/>
-          </a:fillRef>
-          <a:effectRef idx="1">
-            <a:schemeClr val="accent6"/>
-          </a:effectRef>
-          <a:fontRef idx="minor">
-            <a:schemeClr val="dk1"/>
-          </a:fontRef>
-        </p:style>
-        <p:txBody>
-          <a:bodyPr rtlCol="0" anchor="ctr"/>
-          <a:lstStyle/>
-          <a:p>
-            <a:pPr algn="ctr"/>
-            <a:endParaRPr lang="en-US" sz="1050"/>
-          </a:p>
-        </p:txBody>
-      </p:sp>
-      <p:sp>
-        <p:nvSpPr>
-          <p:cNvPr id="46" name="Rectangle 8"/>
-          <p:cNvSpPr/>
-          <p:nvPr/>
-        </p:nvSpPr>
-        <p:spPr>
-          <a:xfrm>
-            <a:off x="2825280" y="2846162"/>
-            <a:ext cx="1490560" cy="334856"/>
-          </a:xfrm>
-          <a:prstGeom prst="rect">
-            <a:avLst/>
-          </a:prstGeom>
-          <a:ln w="19050">
-            <a:solidFill>
-              <a:srgbClr val="7030A0"/>
-            </a:solidFill>
-          </a:ln>
-          <a:effectLst/>
-        </p:spPr>
-        <p:style>
-          <a:lnRef idx="1">
-            <a:schemeClr val="accent4"/>
-          </a:lnRef>
-          <a:fillRef idx="2">
-            <a:schemeClr val="accent4"/>
-          </a:fillRef>
-          <a:effectRef idx="1">
-            <a:schemeClr val="accent4"/>
-          </a:effectRef>
-          <a:fontRef idx="minor">
-            <a:schemeClr val="dk1"/>
-          </a:fontRef>
-        </p:style>
-        <p:txBody>
-          <a:bodyPr rtlCol="0" anchor="ctr"/>
-          <a:lstStyle/>
-          <a:p>
-            <a:pPr algn="ctr"/>
-            <a:r>
-              <a:rPr lang="en-US" sz="1050" dirty="0" err="1" smtClean="0">
-                <a:solidFill>
-                  <a:srgbClr val="7030A0"/>
-                </a:solidFill>
-              </a:rPr>
-              <a:t>VersionedAddressBook</a:t>
-            </a:r>
-            <a:endParaRPr lang="en-SG" sz="1050" dirty="0">
-              <a:solidFill>
-                <a:srgbClr val="7030A0"/>
-              </a:solidFill>
-            </a:endParaRPr>
-          </a:p>
-        </p:txBody>
-      </p:sp>
-      <p:cxnSp>
-        <p:nvCxnSpPr>
-          <p:cNvPr id="47" name="Straight Arrow Connector 46"/>
-          <p:cNvCxnSpPr>
-            <a:stCxn id="48" idx="3"/>
-            <a:endCxn id="46" idx="1"/>
-          </p:cNvCxnSpPr>
-          <p:nvPr/>
-        </p:nvCxnSpPr>
-        <p:spPr>
-          <a:xfrm>
-            <a:off x="2624360" y="3003033"/>
-            <a:ext cx="200920" cy="10557"/>
-          </a:xfrm>
-          <a:prstGeom prst="straightConnector1">
-            <a:avLst/>
-          </a:prstGeom>
-          <a:ln w="19050">
-            <a:solidFill>
-              <a:srgbClr val="7030A0"/>
-            </a:solidFill>
-            <a:headEnd type="none" w="med" len="med"/>
-            <a:tailEnd type="arrow" w="med" len="med"/>
-          </a:ln>
-          <a:effectLst/>
-        </p:spPr>
-        <p:style>
-          <a:lnRef idx="1">
-            <a:schemeClr val="accent2"/>
-          </a:lnRef>
-          <a:fillRef idx="2">
-            <a:schemeClr val="accent2"/>
-          </a:fillRef>
-          <a:effectRef idx="1">
-            <a:schemeClr val="accent2"/>
-          </a:effectRef>
-          <a:fontRef idx="minor">
-            <a:schemeClr val="dk1"/>
-          </a:fontRef>
-        </p:style>
-      </p:cxnSp>
-      <p:sp>
-        <p:nvSpPr>
-          <p:cNvPr id="48" name="Flowchart: Decision 96"/>
-          <p:cNvSpPr/>
-          <p:nvPr/>
-        </p:nvSpPr>
-        <p:spPr>
-          <a:xfrm>
-            <a:off x="2388312" y="2916343"/>
-            <a:ext cx="236048" cy="173380"/>
-          </a:xfrm>
-          <a:prstGeom prst="flowChartDecision">
-            <a:avLst/>
-          </a:prstGeom>
-          <a:noFill/>
-          <a:ln w="19050">
-            <a:solidFill>
-              <a:srgbClr val="7030A0"/>
-            </a:solidFill>
-          </a:ln>
-          <a:effectLst/>
-        </p:spPr>
-        <p:style>
-          <a:lnRef idx="1">
-            <a:schemeClr val="accent6"/>
-          </a:lnRef>
-          <a:fillRef idx="2">
-            <a:schemeClr val="accent6"/>
-          </a:fillRef>
-          <a:effectRef idx="1">
-            <a:schemeClr val="accent6"/>
-          </a:effectRef>
-          <a:fontRef idx="minor">
-            <a:schemeClr val="dk1"/>
-          </a:fontRef>
-        </p:style>
-        <p:txBody>
-          <a:bodyPr rtlCol="0" anchor="ctr"/>
-          <a:lstStyle/>
-          <a:p>
-            <a:pPr algn="ctr"/>
-            <a:endParaRPr lang="en-US" sz="1050"/>
-          </a:p>
-        </p:txBody>
-      </p:sp>
-      <p:sp>
-        <p:nvSpPr>
-          <p:cNvPr id="49" name="Rectangle 8"/>
-          <p:cNvSpPr/>
-          <p:nvPr/>
-        </p:nvSpPr>
-        <p:spPr>
-          <a:xfrm>
-            <a:off x="4692650" y="2846162"/>
-            <a:ext cx="1156969" cy="346760"/>
-          </a:xfrm>
-          <a:prstGeom prst="rect">
-            <a:avLst/>
-          </a:prstGeom>
-          <a:ln w="19050">
-            <a:solidFill>
-              <a:srgbClr val="7030A0"/>
-            </a:solidFill>
-          </a:ln>
-          <a:effectLst/>
-        </p:spPr>
-        <p:style>
-          <a:lnRef idx="1">
-            <a:schemeClr val="accent4"/>
-          </a:lnRef>
-          <a:fillRef idx="2">
-            <a:schemeClr val="accent4"/>
-          </a:fillRef>
-          <a:effectRef idx="1">
-            <a:schemeClr val="accent4"/>
-          </a:effectRef>
-          <a:fontRef idx="minor">
-            <a:schemeClr val="dk1"/>
-          </a:fontRef>
-        </p:style>
-        <p:txBody>
-          <a:bodyPr rtlCol="0" anchor="ctr"/>
-          <a:lstStyle/>
-          <a:p>
-            <a:pPr algn="ctr"/>
-            <a:r>
-              <a:rPr lang="en-US" sz="1050" dirty="0" err="1">
-                <a:solidFill>
-                  <a:srgbClr val="7030A0"/>
-                </a:solidFill>
-              </a:rPr>
-              <a:t>UniquePersonList</a:t>
-            </a:r>
-            <a:endParaRPr lang="en-SG" sz="1050" dirty="0">
-              <a:solidFill>
-                <a:srgbClr val="7030A0"/>
-              </a:solidFill>
-            </a:endParaRPr>
-          </a:p>
-        </p:txBody>
-      </p:sp>
-      <p:sp>
-        <p:nvSpPr>
-          <p:cNvPr id="51" name="Flowchart: Decision 96"/>
-          <p:cNvSpPr/>
-          <p:nvPr/>
-        </p:nvSpPr>
-        <p:spPr>
-          <a:xfrm>
-            <a:off x="4324972" y="2920532"/>
-            <a:ext cx="236048" cy="173380"/>
-          </a:xfrm>
-          <a:prstGeom prst="flowChartDecision">
-            <a:avLst/>
-          </a:prstGeom>
-          <a:solidFill>
-            <a:srgbClr val="7030A0"/>
-          </a:solidFill>
-          <a:ln w="19050">
-            <a:solidFill>
-              <a:srgbClr val="7030A0"/>
-            </a:solidFill>
-          </a:ln>
-          <a:effectLst/>
-        </p:spPr>
-        <p:style>
-          <a:lnRef idx="1">
-            <a:schemeClr val="accent6"/>
-          </a:lnRef>
-          <a:fillRef idx="2">
-            <a:schemeClr val="accent6"/>
-          </a:fillRef>
-          <a:effectRef idx="1">
-            <a:schemeClr val="accent6"/>
-          </a:effectRef>
-          <a:fontRef idx="minor">
-            <a:schemeClr val="dk1"/>
-          </a:fontRef>
-        </p:style>
-        <p:txBody>
-          <a:bodyPr rtlCol="0" anchor="ctr"/>
-          <a:lstStyle/>
-          <a:p>
-            <a:pPr algn="ctr"/>
-            <a:endParaRPr lang="en-US" sz="1050"/>
-          </a:p>
-        </p:txBody>
-      </p:sp>
-      <p:sp>
-        <p:nvSpPr>
-          <p:cNvPr id="62" name="Rectangle 8"/>
-          <p:cNvSpPr/>
-          <p:nvPr/>
-        </p:nvSpPr>
-        <p:spPr>
-          <a:xfrm>
-            <a:off x="6313677" y="2858066"/>
-            <a:ext cx="708186" cy="346760"/>
-          </a:xfrm>
-          <a:prstGeom prst="rect">
-            <a:avLst/>
-          </a:prstGeom>
-          <a:ln w="19050">
-            <a:solidFill>
-              <a:srgbClr val="7030A0"/>
-            </a:solidFill>
-          </a:ln>
-          <a:effectLst/>
-        </p:spPr>
-        <p:style>
-          <a:lnRef idx="1">
-            <a:schemeClr val="accent4"/>
-          </a:lnRef>
-          <a:fillRef idx="2">
-            <a:schemeClr val="accent4"/>
-          </a:fillRef>
-          <a:effectRef idx="1">
-            <a:schemeClr val="accent4"/>
-          </a:effectRef>
-          <a:fontRef idx="minor">
-            <a:schemeClr val="dk1"/>
-          </a:fontRef>
-        </p:style>
-        <p:txBody>
-          <a:bodyPr rtlCol="0" anchor="ctr"/>
-          <a:lstStyle/>
-          <a:p>
-            <a:pPr algn="ctr"/>
-            <a:r>
-              <a:rPr lang="en-US" sz="1050" dirty="0">
-                <a:solidFill>
-                  <a:srgbClr val="7030A0"/>
-                </a:solidFill>
-              </a:rPr>
-              <a:t>Person</a:t>
-            </a:r>
-            <a:endParaRPr lang="en-SG" sz="1050" dirty="0">
-              <a:solidFill>
-                <a:srgbClr val="7030A0"/>
-              </a:solidFill>
-            </a:endParaRPr>
-          </a:p>
-        </p:txBody>
-      </p:sp>
-      <p:sp>
-        <p:nvSpPr>
-          <p:cNvPr id="63" name="Flowchart: Decision 96"/>
-          <p:cNvSpPr/>
-          <p:nvPr/>
-        </p:nvSpPr>
-        <p:spPr>
-          <a:xfrm>
-            <a:off x="5858751" y="2941676"/>
-            <a:ext cx="236048" cy="173380"/>
-          </a:xfrm>
-          <a:prstGeom prst="flowChartDecision">
-            <a:avLst/>
-          </a:prstGeom>
-          <a:noFill/>
-          <a:ln w="19050">
-            <a:solidFill>
-              <a:srgbClr val="7030A0"/>
-            </a:solidFill>
-          </a:ln>
-          <a:effectLst/>
-        </p:spPr>
-        <p:style>
-          <a:lnRef idx="1">
-            <a:schemeClr val="accent6"/>
-          </a:lnRef>
-          <a:fillRef idx="2">
-            <a:schemeClr val="accent6"/>
-          </a:fillRef>
-          <a:effectRef idx="1">
-            <a:schemeClr val="accent6"/>
-          </a:effectRef>
-          <a:fontRef idx="minor">
-            <a:schemeClr val="dk1"/>
-          </a:fontRef>
-        </p:style>
-        <p:txBody>
-          <a:bodyPr rtlCol="0" anchor="ctr"/>
-          <a:lstStyle/>
-          <a:p>
-            <a:pPr algn="ctr"/>
-            <a:endParaRPr lang="en-US" sz="1050"/>
-          </a:p>
-        </p:txBody>
-      </p:sp>
-      <p:cxnSp>
-        <p:nvCxnSpPr>
-          <p:cNvPr id="64" name="Elbow Connector 63"/>
-          <p:cNvCxnSpPr>
-            <a:stCxn id="63" idx="3"/>
-            <a:endCxn id="62" idx="1"/>
-          </p:cNvCxnSpPr>
-          <p:nvPr/>
-        </p:nvCxnSpPr>
-        <p:spPr>
-          <a:xfrm>
-            <a:off x="6094799" y="3028366"/>
-            <a:ext cx="218878" cy="3080"/>
-          </a:xfrm>
-          <a:prstGeom prst="bentConnector3">
-            <a:avLst/>
-          </a:prstGeom>
-          <a:ln w="19050">
-            <a:solidFill>
-              <a:srgbClr val="7030A0"/>
-            </a:solidFill>
-            <a:headEnd type="none" w="med" len="med"/>
-            <a:tailEnd type="arrow" w="med" len="med"/>
-          </a:ln>
-          <a:effectLst/>
-        </p:spPr>
-        <p:style>
-          <a:lnRef idx="1">
-            <a:schemeClr val="accent2"/>
-          </a:lnRef>
-          <a:fillRef idx="2">
-            <a:schemeClr val="accent2"/>
-          </a:fillRef>
-          <a:effectRef idx="1">
-            <a:schemeClr val="accent2"/>
-          </a:effectRef>
-          <a:fontRef idx="minor">
-            <a:schemeClr val="dk1"/>
-          </a:fontRef>
-        </p:style>
-      </p:cxnSp>
-      <p:sp>
-        <p:nvSpPr>
-          <p:cNvPr id="76" name="Rectangle 8"/>
-          <p:cNvSpPr/>
-          <p:nvPr/>
-        </p:nvSpPr>
-        <p:spPr>
-          <a:xfrm>
-            <a:off x="7712397" y="2564238"/>
-            <a:ext cx="708186" cy="285783"/>
-          </a:xfrm>
-          <a:prstGeom prst="rect">
-            <a:avLst/>
-          </a:prstGeom>
-          <a:ln w="19050">
-            <a:solidFill>
-              <a:srgbClr val="7030A0"/>
-            </a:solidFill>
-          </a:ln>
-          <a:effectLst/>
-        </p:spPr>
-        <p:style>
-          <a:lnRef idx="1">
-            <a:schemeClr val="accent4"/>
-          </a:lnRef>
-          <a:fillRef idx="2">
-            <a:schemeClr val="accent4"/>
-          </a:fillRef>
-          <a:effectRef idx="1">
-            <a:schemeClr val="accent4"/>
-          </a:effectRef>
-          <a:fontRef idx="minor">
-            <a:schemeClr val="dk1"/>
-          </a:fontRef>
-        </p:style>
-        <p:txBody>
-          <a:bodyPr rtlCol="0" anchor="ctr"/>
-          <a:lstStyle/>
-          <a:p>
-            <a:pPr algn="ctr"/>
-            <a:r>
-              <a:rPr lang="en-US" sz="1050" dirty="0">
-                <a:solidFill>
-                  <a:srgbClr val="7030A0"/>
-                </a:solidFill>
-              </a:rPr>
-              <a:t>Name</a:t>
-            </a:r>
-            <a:endParaRPr lang="en-SG" sz="1050" dirty="0">
-              <a:solidFill>
-                <a:srgbClr val="7030A0"/>
-              </a:solidFill>
-            </a:endParaRPr>
-          </a:p>
-        </p:txBody>
-      </p:sp>
-      <p:sp>
-        <p:nvSpPr>
-          <p:cNvPr id="78" name="Flowchart: Decision 96"/>
-          <p:cNvSpPr/>
-          <p:nvPr/>
-        </p:nvSpPr>
-        <p:spPr>
-          <a:xfrm>
-            <a:off x="7041947" y="2948201"/>
-            <a:ext cx="236048" cy="173380"/>
-          </a:xfrm>
-          <a:prstGeom prst="flowChartDecision">
-            <a:avLst/>
-          </a:prstGeom>
-          <a:solidFill>
-            <a:srgbClr val="7030A0"/>
-          </a:solidFill>
-          <a:ln w="19050">
-            <a:solidFill>
-              <a:srgbClr val="7030A0"/>
-            </a:solidFill>
-          </a:ln>
-          <a:effectLst/>
-        </p:spPr>
-        <p:style>
-          <a:lnRef idx="1">
-            <a:schemeClr val="accent6"/>
-          </a:lnRef>
-          <a:fillRef idx="2">
-            <a:schemeClr val="accent6"/>
-          </a:fillRef>
-          <a:effectRef idx="1">
-            <a:schemeClr val="accent6"/>
-          </a:effectRef>
-          <a:fontRef idx="minor">
-            <a:schemeClr val="dk1"/>
-          </a:fontRef>
-        </p:style>
-        <p:txBody>
-          <a:bodyPr rtlCol="0" anchor="ctr"/>
-          <a:lstStyle/>
-          <a:p>
-            <a:pPr algn="ctr"/>
-            <a:endParaRPr lang="en-US" sz="1050"/>
-          </a:p>
-        </p:txBody>
-      </p:sp>
-      <p:cxnSp>
-        <p:nvCxnSpPr>
-          <p:cNvPr id="79" name="Elbow Connector 78"/>
-          <p:cNvCxnSpPr>
-            <a:cxnSpLocks/>
-          </p:cNvCxnSpPr>
-          <p:nvPr/>
-        </p:nvCxnSpPr>
-        <p:spPr>
-          <a:xfrm flipV="1">
-            <a:off x="7277995" y="2706821"/>
-            <a:ext cx="434402" cy="327761"/>
-          </a:xfrm>
-          <a:prstGeom prst="bentConnector3">
-            <a:avLst/>
-          </a:prstGeom>
-          <a:ln w="19050">
-            <a:solidFill>
-              <a:srgbClr val="7030A0"/>
-            </a:solidFill>
-            <a:headEnd type="none" w="med" len="med"/>
-            <a:tailEnd type="arrow" w="med" len="med"/>
-          </a:ln>
-          <a:effectLst/>
-        </p:spPr>
-        <p:style>
-          <a:lnRef idx="1">
-            <a:schemeClr val="accent2"/>
-          </a:lnRef>
-          <a:fillRef idx="2">
-            <a:schemeClr val="accent2"/>
-          </a:fillRef>
-          <a:effectRef idx="1">
-            <a:schemeClr val="accent2"/>
-          </a:effectRef>
-          <a:fontRef idx="minor">
-            <a:schemeClr val="dk1"/>
-          </a:fontRef>
-        </p:style>
-      </p:cxnSp>
-      <p:sp>
-        <p:nvSpPr>
-          <p:cNvPr id="80" name="Rectangle 8"/>
-          <p:cNvSpPr/>
-          <p:nvPr/>
-        </p:nvSpPr>
-        <p:spPr>
-          <a:xfrm>
-            <a:off x="7712397" y="2887216"/>
-            <a:ext cx="708186" cy="285783"/>
-          </a:xfrm>
-          <a:prstGeom prst="rect">
-            <a:avLst/>
-          </a:prstGeom>
-          <a:ln w="19050">
-            <a:solidFill>
-              <a:srgbClr val="7030A0"/>
-            </a:solidFill>
-          </a:ln>
-          <a:effectLst/>
-        </p:spPr>
-        <p:style>
-          <a:lnRef idx="1">
-            <a:schemeClr val="accent4"/>
-          </a:lnRef>
-          <a:fillRef idx="2">
-            <a:schemeClr val="accent4"/>
-          </a:fillRef>
-          <a:effectRef idx="1">
-            <a:schemeClr val="accent4"/>
-          </a:effectRef>
-          <a:fontRef idx="minor">
-            <a:schemeClr val="dk1"/>
-          </a:fontRef>
-        </p:style>
-        <p:txBody>
-          <a:bodyPr rtlCol="0" anchor="ctr"/>
-          <a:lstStyle/>
-          <a:p>
-            <a:pPr algn="ctr"/>
-            <a:r>
-              <a:rPr lang="en-US" sz="1050" dirty="0">
-                <a:solidFill>
-                  <a:srgbClr val="7030A0"/>
-                </a:solidFill>
-              </a:rPr>
-              <a:t>Phone</a:t>
-            </a:r>
-            <a:endParaRPr lang="en-SG" sz="1050" dirty="0">
-              <a:solidFill>
-                <a:srgbClr val="7030A0"/>
-              </a:solidFill>
-            </a:endParaRPr>
-          </a:p>
-        </p:txBody>
-      </p:sp>
-      <p:cxnSp>
-        <p:nvCxnSpPr>
-          <p:cNvPr id="81" name="Elbow Connector 80"/>
-          <p:cNvCxnSpPr>
-            <a:stCxn id="78" idx="3"/>
-            <a:endCxn id="80" idx="1"/>
-          </p:cNvCxnSpPr>
-          <p:nvPr/>
-        </p:nvCxnSpPr>
-        <p:spPr>
-          <a:xfrm flipV="1">
-            <a:off x="7277995" y="3030108"/>
-            <a:ext cx="434402" cy="4783"/>
-          </a:xfrm>
-          <a:prstGeom prst="bentConnector3">
-            <a:avLst/>
-          </a:prstGeom>
-          <a:ln w="19050">
-            <a:solidFill>
-              <a:srgbClr val="7030A0"/>
-            </a:solidFill>
-            <a:headEnd type="none" w="med" len="med"/>
-            <a:tailEnd type="arrow" w="med" len="med"/>
-          </a:ln>
-          <a:effectLst/>
-        </p:spPr>
-        <p:style>
-          <a:lnRef idx="1">
-            <a:schemeClr val="accent2"/>
-          </a:lnRef>
-          <a:fillRef idx="2">
-            <a:schemeClr val="accent2"/>
-          </a:fillRef>
-          <a:effectRef idx="1">
-            <a:schemeClr val="accent2"/>
-          </a:effectRef>
-          <a:fontRef idx="minor">
-            <a:schemeClr val="dk1"/>
-          </a:fontRef>
-        </p:style>
-      </p:cxnSp>
-      <p:sp>
-        <p:nvSpPr>
-          <p:cNvPr id="83" name="Rectangle 8"/>
-          <p:cNvSpPr/>
-          <p:nvPr/>
-        </p:nvSpPr>
-        <p:spPr>
-          <a:xfrm>
-            <a:off x="7712397" y="3210194"/>
-            <a:ext cx="708186" cy="285783"/>
-          </a:xfrm>
-          <a:prstGeom prst="rect">
-            <a:avLst/>
-          </a:prstGeom>
-          <a:ln w="19050">
-            <a:solidFill>
-              <a:srgbClr val="7030A0"/>
-            </a:solidFill>
-          </a:ln>
-          <a:effectLst/>
-        </p:spPr>
-        <p:style>
-          <a:lnRef idx="1">
-            <a:schemeClr val="accent4"/>
-          </a:lnRef>
-          <a:fillRef idx="2">
-            <a:schemeClr val="accent4"/>
-          </a:fillRef>
-          <a:effectRef idx="1">
-            <a:schemeClr val="accent4"/>
-          </a:effectRef>
-          <a:fontRef idx="minor">
-            <a:schemeClr val="dk1"/>
-          </a:fontRef>
-        </p:style>
-        <p:txBody>
-          <a:bodyPr rtlCol="0" anchor="ctr"/>
-          <a:lstStyle/>
-          <a:p>
-            <a:pPr algn="ctr"/>
-            <a:r>
-              <a:rPr lang="en-US" sz="1050" dirty="0">
-                <a:solidFill>
-                  <a:srgbClr val="7030A0"/>
-                </a:solidFill>
-              </a:rPr>
-              <a:t>Email</a:t>
-            </a:r>
-            <a:endParaRPr lang="en-SG" sz="1050" dirty="0">
-              <a:solidFill>
-                <a:srgbClr val="7030A0"/>
-              </a:solidFill>
-            </a:endParaRPr>
-          </a:p>
-        </p:txBody>
-      </p:sp>
-      <p:cxnSp>
-        <p:nvCxnSpPr>
-          <p:cNvPr id="84" name="Elbow Connector 83"/>
-          <p:cNvCxnSpPr>
-            <a:stCxn id="78" idx="3"/>
-            <a:endCxn id="83" idx="1"/>
-          </p:cNvCxnSpPr>
-          <p:nvPr/>
-        </p:nvCxnSpPr>
-        <p:spPr>
-          <a:xfrm>
-            <a:off x="7277995" y="3034891"/>
-            <a:ext cx="434402" cy="318195"/>
-          </a:xfrm>
-          <a:prstGeom prst="bentConnector3">
-            <a:avLst/>
-          </a:prstGeom>
-          <a:ln w="19050">
-            <a:solidFill>
-              <a:srgbClr val="7030A0"/>
-            </a:solidFill>
-            <a:headEnd type="none" w="med" len="med"/>
-            <a:tailEnd type="arrow" w="med" len="med"/>
-          </a:ln>
-          <a:effectLst/>
-        </p:spPr>
-        <p:style>
-          <a:lnRef idx="1">
-            <a:schemeClr val="accent2"/>
-          </a:lnRef>
-          <a:fillRef idx="2">
-            <a:schemeClr val="accent2"/>
-          </a:fillRef>
-          <a:effectRef idx="1">
-            <a:schemeClr val="accent2"/>
-          </a:effectRef>
-          <a:fontRef idx="minor">
-            <a:schemeClr val="dk1"/>
-          </a:fontRef>
-        </p:style>
-      </p:cxnSp>
-      <p:sp>
-        <p:nvSpPr>
-          <p:cNvPr id="85" name="Rectangle 8"/>
-          <p:cNvSpPr/>
-          <p:nvPr/>
-        </p:nvSpPr>
-        <p:spPr>
-          <a:xfrm>
-            <a:off x="7712397" y="3533171"/>
-            <a:ext cx="708186" cy="285783"/>
-          </a:xfrm>
-          <a:prstGeom prst="rect">
-            <a:avLst/>
-          </a:prstGeom>
-          <a:ln w="19050">
-            <a:solidFill>
-              <a:srgbClr val="7030A0"/>
-            </a:solidFill>
-          </a:ln>
-          <a:effectLst/>
-        </p:spPr>
-        <p:style>
-          <a:lnRef idx="1">
-            <a:schemeClr val="accent4"/>
-          </a:lnRef>
-          <a:fillRef idx="2">
-            <a:schemeClr val="accent4"/>
-          </a:fillRef>
-          <a:effectRef idx="1">
-            <a:schemeClr val="accent4"/>
-          </a:effectRef>
-          <a:fontRef idx="minor">
-            <a:schemeClr val="dk1"/>
-          </a:fontRef>
-        </p:style>
-        <p:txBody>
-          <a:bodyPr rtlCol="0" anchor="ctr"/>
-          <a:lstStyle/>
-          <a:p>
-            <a:pPr algn="ctr"/>
-            <a:r>
-              <a:rPr lang="en-US" sz="1050" dirty="0">
-                <a:solidFill>
-                  <a:srgbClr val="7030A0"/>
-                </a:solidFill>
-              </a:rPr>
-              <a:t>Address</a:t>
-            </a:r>
-            <a:endParaRPr lang="en-SG" sz="1050" dirty="0">
-              <a:solidFill>
-                <a:srgbClr val="7030A0"/>
-              </a:solidFill>
-            </a:endParaRPr>
-          </a:p>
-        </p:txBody>
-      </p:sp>
-      <p:cxnSp>
-        <p:nvCxnSpPr>
-          <p:cNvPr id="86" name="Elbow Connector 85"/>
-          <p:cNvCxnSpPr>
-            <a:stCxn id="78" idx="3"/>
-            <a:endCxn id="85" idx="1"/>
-          </p:cNvCxnSpPr>
-          <p:nvPr/>
-        </p:nvCxnSpPr>
-        <p:spPr>
-          <a:xfrm>
-            <a:off x="7277995" y="3034891"/>
-            <a:ext cx="434402" cy="641172"/>
-          </a:xfrm>
-          <a:prstGeom prst="bentConnector3">
-            <a:avLst/>
-          </a:prstGeom>
-          <a:ln w="19050">
-            <a:solidFill>
-              <a:srgbClr val="7030A0"/>
-            </a:solidFill>
-            <a:headEnd type="none" w="med" len="med"/>
-            <a:tailEnd type="arrow" w="med" len="med"/>
-          </a:ln>
-          <a:effectLst/>
-        </p:spPr>
-        <p:style>
-          <a:lnRef idx="1">
-            <a:schemeClr val="accent2"/>
-          </a:lnRef>
-          <a:fillRef idx="2">
-            <a:schemeClr val="accent2"/>
-          </a:fillRef>
-          <a:effectRef idx="1">
-            <a:schemeClr val="accent2"/>
-          </a:effectRef>
-          <a:fontRef idx="minor">
-            <a:schemeClr val="dk1"/>
-          </a:fontRef>
-        </p:style>
-      </p:cxnSp>
-      <p:cxnSp>
-        <p:nvCxnSpPr>
-          <p:cNvPr id="97" name="Elbow Connector 63"/>
-          <p:cNvCxnSpPr>
-            <a:stCxn id="99" idx="3"/>
-          </p:cNvCxnSpPr>
-          <p:nvPr/>
-        </p:nvCxnSpPr>
-        <p:spPr>
-          <a:xfrm rot="5400000">
-            <a:off x="3553611" y="2687559"/>
-            <a:ext cx="293825" cy="5938"/>
-          </a:xfrm>
-          <a:prstGeom prst="bentConnector3">
-            <a:avLst>
-              <a:gd name="adj1" fmla="val 50000"/>
-            </a:avLst>
-          </a:prstGeom>
-          <a:ln w="19050">
-            <a:solidFill>
-              <a:srgbClr val="7030A0"/>
-            </a:solidFill>
-            <a:prstDash val="sysDot"/>
-            <a:headEnd type="none" w="med" len="med"/>
-            <a:tailEnd type="none" w="med" len="med"/>
-          </a:ln>
-          <a:effectLst/>
-        </p:spPr>
-        <p:style>
-          <a:lnRef idx="1">
-            <a:schemeClr val="accent2"/>
-          </a:lnRef>
-          <a:fillRef idx="2">
-            <a:schemeClr val="accent2"/>
-          </a:fillRef>
-          <a:effectRef idx="1">
-            <a:schemeClr val="accent2"/>
-          </a:effectRef>
-          <a:fontRef idx="minor">
-            <a:schemeClr val="dk1"/>
-          </a:fontRef>
-        </p:style>
-      </p:cxnSp>
-      <p:sp>
-        <p:nvSpPr>
-          <p:cNvPr id="99" name="Isosceles Triangle 102"/>
-          <p:cNvSpPr/>
-          <p:nvPr/>
-        </p:nvSpPr>
-        <p:spPr>
-          <a:xfrm rot="10800000" flipV="1">
-            <a:off x="3562299" y="2386554"/>
-            <a:ext cx="282387" cy="157062"/>
-          </a:xfrm>
-          <a:prstGeom prst="triangle">
-            <a:avLst/>
-          </a:prstGeom>
-          <a:ln w="19050">
-            <a:solidFill>
-              <a:srgbClr val="7030A0"/>
-            </a:solidFill>
-          </a:ln>
-          <a:effectLst/>
-        </p:spPr>
-        <p:style>
-          <a:lnRef idx="1">
-            <a:schemeClr val="accent4"/>
-          </a:lnRef>
-          <a:fillRef idx="2">
-            <a:schemeClr val="accent4"/>
-          </a:fillRef>
-          <a:effectRef idx="1">
-            <a:schemeClr val="accent4"/>
-          </a:effectRef>
-          <a:fontRef idx="minor">
-            <a:schemeClr val="dk1"/>
-          </a:fontRef>
-        </p:style>
-        <p:txBody>
-          <a:bodyPr rtlCol="0" anchor="ctr"/>
-          <a:lstStyle/>
-          <a:p>
-            <a:pPr algn="ctr"/>
-            <a:endParaRPr lang="en-SG" sz="1050" b="1">
-              <a:solidFill>
-                <a:srgbClr val="92D050"/>
-              </a:solidFill>
-            </a:endParaRPr>
-          </a:p>
-        </p:txBody>
-      </p:sp>
-      <p:sp>
-        <p:nvSpPr>
-          <p:cNvPr id="100" name="Rectangle 8"/>
-          <p:cNvSpPr/>
-          <p:nvPr/>
-        </p:nvSpPr>
-        <p:spPr>
-          <a:xfrm>
-            <a:off x="1260922" y="1998350"/>
-            <a:ext cx="1443661" cy="364396"/>
-          </a:xfrm>
-          <a:prstGeom prst="rect">
-            <a:avLst/>
-          </a:prstGeom>
-          <a:ln w="19050">
-            <a:solidFill>
-              <a:srgbClr val="7030A0"/>
-            </a:solidFill>
-          </a:ln>
-          <a:effectLst/>
-        </p:spPr>
-        <p:style>
-          <a:lnRef idx="1">
-            <a:schemeClr val="accent4"/>
-          </a:lnRef>
-          <a:fillRef idx="2">
-            <a:schemeClr val="accent4"/>
-          </a:fillRef>
-          <a:effectRef idx="1">
-            <a:schemeClr val="accent4"/>
-          </a:effectRef>
-          <a:fontRef idx="minor">
-            <a:schemeClr val="dk1"/>
-          </a:fontRef>
-        </p:style>
-        <p:txBody>
-          <a:bodyPr rtlCol="0" anchor="ctr"/>
-          <a:lstStyle/>
-          <a:p>
-            <a:pPr algn="ctr"/>
-            <a:r>
-              <a:rPr lang="en-US" sz="1050" dirty="0">
-                <a:solidFill>
-                  <a:srgbClr val="7030A0"/>
-                </a:solidFill>
-              </a:rPr>
-              <a:t>&lt;&lt;interface&gt;&gt;</a:t>
-            </a:r>
-            <a:br>
-              <a:rPr lang="en-US" sz="1050" dirty="0">
-                <a:solidFill>
-                  <a:srgbClr val="7030A0"/>
-                </a:solidFill>
-              </a:rPr>
-            </a:br>
-            <a:r>
-              <a:rPr lang="en-US" sz="1050" dirty="0" err="1">
-                <a:solidFill>
-                  <a:srgbClr val="7030A0"/>
-                </a:solidFill>
-              </a:rPr>
-              <a:t>ReadOnlyAddressBook</a:t>
-            </a:r>
-            <a:endParaRPr lang="en-SG" sz="1050" dirty="0">
-              <a:solidFill>
-                <a:srgbClr val="7030A0"/>
-              </a:solidFill>
-            </a:endParaRPr>
-          </a:p>
-        </p:txBody>
-      </p:sp>
-      <p:sp>
-        <p:nvSpPr>
-          <p:cNvPr id="114" name="TextBox 113"/>
-          <p:cNvSpPr txBox="1"/>
-          <p:nvPr/>
-        </p:nvSpPr>
-        <p:spPr>
-          <a:xfrm rot="16200000">
-            <a:off x="6362886" y="3586305"/>
-            <a:ext cx="881018" cy="261610"/>
-          </a:xfrm>
-          <a:prstGeom prst="rect">
-            <a:avLst/>
-          </a:prstGeom>
-          <a:noFill/>
-        </p:spPr>
-        <p:txBody>
-          <a:bodyPr wrap="square" rtlCol="0">
-            <a:spAutoFit/>
-          </a:bodyPr>
-          <a:lstStyle/>
-          <a:p>
-            <a:pPr algn="r"/>
-            <a:r>
-              <a:rPr lang="en-US" sz="1100" dirty="0">
-                <a:solidFill>
-                  <a:srgbClr val="7030A0"/>
-                </a:solidFill>
-              </a:rPr>
-              <a:t>filtered list</a:t>
-            </a:r>
-            <a:endParaRPr lang="en-SG" sz="1100" dirty="0">
-              <a:solidFill>
-                <a:srgbClr val="7030A0"/>
-              </a:solidFill>
-            </a:endParaRPr>
-          </a:p>
-        </p:txBody>
-      </p:sp>
-      <p:sp>
-        <p:nvSpPr>
-          <p:cNvPr id="122" name="Rectangle 8"/>
-          <p:cNvSpPr/>
-          <p:nvPr/>
-        </p:nvSpPr>
-        <p:spPr>
-          <a:xfrm>
-            <a:off x="2057401" y="4239491"/>
-            <a:ext cx="1066800" cy="346760"/>
-          </a:xfrm>
-          <a:prstGeom prst="rect">
-            <a:avLst/>
-          </a:prstGeom>
-          <a:ln w="19050">
-            <a:solidFill>
-              <a:srgbClr val="7030A0"/>
-            </a:solidFill>
-          </a:ln>
-          <a:effectLst/>
-        </p:spPr>
-        <p:style>
-          <a:lnRef idx="1">
-            <a:schemeClr val="accent4"/>
-          </a:lnRef>
-          <a:fillRef idx="2">
-            <a:schemeClr val="accent4"/>
-          </a:fillRef>
-          <a:effectRef idx="1">
-            <a:schemeClr val="accent4"/>
-          </a:effectRef>
-          <a:fontRef idx="minor">
-            <a:schemeClr val="dk1"/>
-          </a:fontRef>
-        </p:style>
-        <p:txBody>
-          <a:bodyPr rtlCol="0" anchor="ctr"/>
-          <a:lstStyle/>
-          <a:p>
-            <a:pPr algn="ctr"/>
-            <a:r>
-              <a:rPr lang="en-US" sz="1050" dirty="0">
-                <a:solidFill>
-                  <a:srgbClr val="7030A0"/>
-                </a:solidFill>
-              </a:rPr>
-              <a:t>&lt;&lt;interface&gt;&gt;</a:t>
-            </a:r>
-            <a:r>
-              <a:rPr lang="en-US" sz="1050">
-                <a:solidFill>
-                  <a:srgbClr val="7030A0"/>
-                </a:solidFill>
-              </a:rPr>
-              <a:t/>
-            </a:r>
-            <a:br>
-              <a:rPr lang="en-US" sz="1050">
-                <a:solidFill>
-                  <a:srgbClr val="7030A0"/>
-                </a:solidFill>
-              </a:rPr>
-            </a:br>
-            <a:r>
-              <a:rPr lang="en-US" sz="1050" dirty="0" err="1">
-                <a:solidFill>
-                  <a:srgbClr val="7030A0"/>
-                </a:solidFill>
-              </a:rPr>
-              <a:t>ObservableList</a:t>
-            </a:r>
-            <a:endParaRPr lang="en-SG" sz="1050" dirty="0">
-              <a:solidFill>
-                <a:srgbClr val="7030A0"/>
-              </a:solidFill>
-            </a:endParaRPr>
-          </a:p>
-        </p:txBody>
-      </p:sp>
-      <p:cxnSp>
-        <p:nvCxnSpPr>
-          <p:cNvPr id="124" name="Elbow Connector 122"/>
-          <p:cNvCxnSpPr>
-            <a:stCxn id="119" idx="1"/>
-            <a:endCxn id="122" idx="1"/>
-          </p:cNvCxnSpPr>
-          <p:nvPr/>
-        </p:nvCxnSpPr>
-        <p:spPr>
-          <a:xfrm rot="16200000" flipH="1">
-            <a:off x="1364475" y="3719944"/>
-            <a:ext cx="831471" cy="554381"/>
-          </a:xfrm>
-          <a:prstGeom prst="bentConnector2">
-            <a:avLst/>
-          </a:prstGeom>
-          <a:ln w="19050">
-            <a:solidFill>
-              <a:srgbClr val="7030A0"/>
-            </a:solidFill>
-            <a:prstDash val="sysDot"/>
-            <a:headEnd type="none" w="med" len="med"/>
-            <a:tailEnd type="arrow" w="med" len="med"/>
-          </a:ln>
-          <a:effectLst/>
-        </p:spPr>
-        <p:style>
-          <a:lnRef idx="1">
-            <a:schemeClr val="accent2"/>
-          </a:lnRef>
-          <a:fillRef idx="2">
-            <a:schemeClr val="accent2"/>
-          </a:fillRef>
-          <a:effectRef idx="1">
-            <a:schemeClr val="accent2"/>
-          </a:effectRef>
-          <a:fontRef idx="minor">
-            <a:schemeClr val="dk1"/>
-          </a:fontRef>
-        </p:style>
-      </p:cxnSp>
-      <p:sp>
-        <p:nvSpPr>
-          <p:cNvPr id="54" name="TextBox 53"/>
-          <p:cNvSpPr txBox="1"/>
-          <p:nvPr/>
-        </p:nvSpPr>
-        <p:spPr>
-          <a:xfrm>
-            <a:off x="4429979" y="3111479"/>
-            <a:ext cx="189257" cy="178683"/>
-          </a:xfrm>
-          <a:prstGeom prst="rect">
-            <a:avLst/>
-          </a:prstGeom>
-          <a:noFill/>
-        </p:spPr>
-        <p:txBody>
-          <a:bodyPr wrap="square" lIns="0" tIns="0" rIns="0" bIns="0" rtlCol="0">
-            <a:noAutofit/>
-          </a:bodyPr>
-          <a:lstStyle/>
-          <a:p>
-            <a:pPr algn="ctr"/>
-            <a:r>
-              <a:rPr lang="en-US" sz="1100" dirty="0">
-                <a:solidFill>
-                  <a:srgbClr val="7030A0"/>
-                </a:solidFill>
-              </a:rPr>
-              <a:t>1</a:t>
-            </a:r>
-            <a:endParaRPr lang="en-SG" sz="1100" dirty="0">
-              <a:solidFill>
-                <a:srgbClr val="7030A0"/>
-              </a:solidFill>
-            </a:endParaRPr>
-          </a:p>
-        </p:txBody>
-      </p:sp>
-      <p:sp>
-        <p:nvSpPr>
-          <p:cNvPr id="61" name="TextBox 60"/>
-          <p:cNvSpPr txBox="1"/>
-          <p:nvPr/>
-        </p:nvSpPr>
-        <p:spPr>
-          <a:xfrm>
-            <a:off x="6135256" y="3097917"/>
-            <a:ext cx="189257" cy="178683"/>
-          </a:xfrm>
-          <a:prstGeom prst="rect">
-            <a:avLst/>
-          </a:prstGeom>
-          <a:noFill/>
-        </p:spPr>
-        <p:txBody>
-          <a:bodyPr wrap="square" lIns="0" tIns="0" rIns="0" bIns="0" rtlCol="0">
-            <a:noAutofit/>
-          </a:bodyPr>
-          <a:lstStyle/>
-          <a:p>
-            <a:pPr algn="ctr"/>
-            <a:r>
-              <a:rPr lang="en-US" sz="1100" dirty="0">
-                <a:solidFill>
-                  <a:srgbClr val="7030A0"/>
-                </a:solidFill>
-              </a:rPr>
-              <a:t>*</a:t>
-            </a:r>
-            <a:endParaRPr lang="en-SG" sz="1100" dirty="0">
-              <a:solidFill>
-                <a:srgbClr val="7030A0"/>
-              </a:solidFill>
-            </a:endParaRPr>
-          </a:p>
-        </p:txBody>
-      </p:sp>
-      <p:sp>
-        <p:nvSpPr>
-          <p:cNvPr id="65" name="TextBox 64"/>
-          <p:cNvSpPr txBox="1"/>
-          <p:nvPr/>
-        </p:nvSpPr>
-        <p:spPr>
-          <a:xfrm>
-            <a:off x="2573394" y="2756715"/>
-            <a:ext cx="170110" cy="137542"/>
-          </a:xfrm>
-          <a:prstGeom prst="rect">
-            <a:avLst/>
-          </a:prstGeom>
-          <a:noFill/>
-        </p:spPr>
-        <p:txBody>
-          <a:bodyPr wrap="square" lIns="0" tIns="0" rIns="0" bIns="0" rtlCol="0">
-            <a:noAutofit/>
-          </a:bodyPr>
-          <a:lstStyle/>
-          <a:p>
-            <a:pPr algn="ctr"/>
-            <a:r>
-              <a:rPr lang="en-US" sz="1100" dirty="0">
-                <a:solidFill>
-                  <a:srgbClr val="7030A0"/>
-                </a:solidFill>
-              </a:rPr>
-              <a:t>1</a:t>
-            </a:r>
-            <a:endParaRPr lang="en-SG" sz="1100" dirty="0">
-              <a:solidFill>
-                <a:srgbClr val="7030A0"/>
-              </a:solidFill>
-            </a:endParaRPr>
-          </a:p>
-        </p:txBody>
-      </p:sp>
-      <p:sp>
-        <p:nvSpPr>
-          <p:cNvPr id="66" name="TextBox 65"/>
-          <p:cNvSpPr txBox="1"/>
-          <p:nvPr/>
-        </p:nvSpPr>
-        <p:spPr>
-          <a:xfrm>
-            <a:off x="2707070" y="3667737"/>
-            <a:ext cx="189257" cy="178683"/>
-          </a:xfrm>
-          <a:prstGeom prst="rect">
-            <a:avLst/>
-          </a:prstGeom>
-          <a:noFill/>
-        </p:spPr>
-        <p:txBody>
-          <a:bodyPr wrap="square" lIns="0" tIns="0" rIns="0" bIns="0" rtlCol="0">
-            <a:noAutofit/>
-          </a:bodyPr>
-          <a:lstStyle/>
-          <a:p>
-            <a:pPr algn="ctr"/>
-            <a:r>
-              <a:rPr lang="en-US" sz="1100" dirty="0">
-                <a:solidFill>
-                  <a:srgbClr val="7030A0"/>
-                </a:solidFill>
-              </a:rPr>
-              <a:t>1</a:t>
-            </a:r>
-            <a:endParaRPr lang="en-SG" sz="1100" dirty="0">
-              <a:solidFill>
-                <a:srgbClr val="7030A0"/>
-              </a:solidFill>
-            </a:endParaRPr>
-          </a:p>
-        </p:txBody>
-      </p:sp>
-      <p:sp>
-        <p:nvSpPr>
-          <p:cNvPr id="70" name="TextBox 69"/>
-          <p:cNvSpPr txBox="1"/>
-          <p:nvPr/>
-        </p:nvSpPr>
-        <p:spPr>
-          <a:xfrm>
-            <a:off x="6449896" y="3204826"/>
-            <a:ext cx="189257" cy="178683"/>
-          </a:xfrm>
-          <a:prstGeom prst="rect">
-            <a:avLst/>
-          </a:prstGeom>
-          <a:noFill/>
-        </p:spPr>
-        <p:txBody>
-          <a:bodyPr wrap="square" lIns="0" tIns="0" rIns="0" bIns="0" rtlCol="0">
-            <a:noAutofit/>
-          </a:bodyPr>
-          <a:lstStyle/>
-          <a:p>
-            <a:pPr algn="ctr"/>
-            <a:r>
-              <a:rPr lang="en-US" sz="1100" dirty="0">
-                <a:solidFill>
-                  <a:srgbClr val="7030A0"/>
-                </a:solidFill>
-              </a:rPr>
-              <a:t>1</a:t>
-            </a:r>
-            <a:endParaRPr lang="en-SG" sz="1100" dirty="0">
-              <a:solidFill>
-                <a:srgbClr val="7030A0"/>
-              </a:solidFill>
-            </a:endParaRPr>
-          </a:p>
-        </p:txBody>
-      </p:sp>
-      <p:sp>
-        <p:nvSpPr>
-          <p:cNvPr id="52" name="Rectangle 8">
-            <a:extLst>
-              <a:ext uri="{FF2B5EF4-FFF2-40B4-BE49-F238E27FC236}">
-                <a16:creationId xmlns:a16="http://schemas.microsoft.com/office/drawing/2014/main" id="{ABDCDBD2-131A-4B66-A2F2-43BBEE82C773}"/>
-              </a:ext>
-            </a:extLst>
-          </p:cNvPr>
-          <p:cNvSpPr/>
-          <p:nvPr/>
-        </p:nvSpPr>
-        <p:spPr>
-          <a:xfrm>
-            <a:off x="7712397" y="2228817"/>
-            <a:ext cx="708186" cy="285783"/>
-          </a:xfrm>
-          <a:prstGeom prst="rect">
-            <a:avLst/>
-          </a:prstGeom>
-          <a:ln w="19050">
-            <a:solidFill>
-              <a:srgbClr val="7030A0"/>
-            </a:solidFill>
-          </a:ln>
-          <a:effectLst/>
-        </p:spPr>
-        <p:style>
-          <a:lnRef idx="1">
-            <a:schemeClr val="accent4"/>
-          </a:lnRef>
-          <a:fillRef idx="2">
-            <a:schemeClr val="accent4"/>
-          </a:fillRef>
-          <a:effectRef idx="1">
-            <a:schemeClr val="accent4"/>
-          </a:effectRef>
-          <a:fontRef idx="minor">
-            <a:schemeClr val="dk1"/>
-          </a:fontRef>
-        </p:style>
-        <p:txBody>
-          <a:bodyPr rtlCol="0" anchor="ctr"/>
-          <a:lstStyle/>
-          <a:p>
-            <a:pPr algn="ctr"/>
-            <a:r>
-              <a:rPr lang="en-US" sz="1050" dirty="0">
-                <a:solidFill>
-                  <a:srgbClr val="7030A0"/>
-                </a:solidFill>
-              </a:rPr>
-              <a:t>Tag</a:t>
-            </a:r>
-            <a:endParaRPr lang="en-SG" sz="1050" dirty="0">
-              <a:solidFill>
-                <a:srgbClr val="7030A0"/>
-              </a:solidFill>
-            </a:endParaRPr>
-          </a:p>
-        </p:txBody>
-      </p:sp>
-      <p:cxnSp>
-        <p:nvCxnSpPr>
-          <p:cNvPr id="53" name="Elbow Connector 78">
-            <a:extLst>
-              <a:ext uri="{FF2B5EF4-FFF2-40B4-BE49-F238E27FC236}">
-                <a16:creationId xmlns:a16="http://schemas.microsoft.com/office/drawing/2014/main" id="{B97967F8-618A-448B-81FD-CDFD4AF0EC64}"/>
-              </a:ext>
-            </a:extLst>
-          </p:cNvPr>
-          <p:cNvCxnSpPr>
-            <a:cxnSpLocks/>
-            <a:stCxn id="78" idx="3"/>
-            <a:endCxn id="52" idx="1"/>
-          </p:cNvCxnSpPr>
-          <p:nvPr/>
-        </p:nvCxnSpPr>
-        <p:spPr>
-          <a:xfrm flipV="1">
-            <a:off x="7277995" y="2371709"/>
-            <a:ext cx="434402" cy="663182"/>
-          </a:xfrm>
-          <a:prstGeom prst="bentConnector3">
-            <a:avLst>
-              <a:gd name="adj1" fmla="val 50000"/>
-            </a:avLst>
-          </a:prstGeom>
-          <a:ln w="19050">
-            <a:solidFill>
-              <a:srgbClr val="7030A0"/>
-            </a:solidFill>
-            <a:headEnd type="none" w="med" len="med"/>
-            <a:tailEnd type="arrow" w="med" len="med"/>
-          </a:ln>
-          <a:effectLst/>
-        </p:spPr>
-        <p:style>
-          <a:lnRef idx="1">
-            <a:schemeClr val="accent2"/>
-          </a:lnRef>
-          <a:fillRef idx="2">
-            <a:schemeClr val="accent2"/>
-          </a:fillRef>
-          <a:effectRef idx="1">
-            <a:schemeClr val="accent2"/>
-          </a:effectRef>
-          <a:fontRef idx="minor">
-            <a:schemeClr val="dk1"/>
-          </a:fontRef>
-        </p:style>
-      </p:cxnSp>
-      <p:sp>
-        <p:nvSpPr>
-          <p:cNvPr id="50" name="TextBox 49">
-            <a:extLst>
-              <a:ext uri="{FF2B5EF4-FFF2-40B4-BE49-F238E27FC236}">
-                <a16:creationId xmlns:a16="http://schemas.microsoft.com/office/drawing/2014/main" id="{B3FA9D57-880F-49C4-AD0B-A64E30D6F403}"/>
-              </a:ext>
-            </a:extLst>
-          </p:cNvPr>
-          <p:cNvSpPr txBox="1"/>
-          <p:nvPr/>
-        </p:nvSpPr>
-        <p:spPr>
-          <a:xfrm>
-            <a:off x="7466243" y="2255711"/>
-            <a:ext cx="189257" cy="178683"/>
-          </a:xfrm>
-          <a:prstGeom prst="rect">
-            <a:avLst/>
-          </a:prstGeom>
-          <a:noFill/>
-        </p:spPr>
-        <p:txBody>
-          <a:bodyPr wrap="square" lIns="0" tIns="0" rIns="0" bIns="0" rtlCol="0">
-            <a:noAutofit/>
-          </a:bodyPr>
-          <a:lstStyle/>
-          <a:p>
-            <a:pPr algn="ctr"/>
-            <a:r>
-              <a:rPr lang="en-US" sz="1100" dirty="0">
-                <a:solidFill>
-                  <a:srgbClr val="7030A0"/>
-                </a:solidFill>
-              </a:rPr>
-              <a:t>*</a:t>
-            </a:r>
-            <a:endParaRPr lang="en-SG" sz="1100" dirty="0">
-              <a:solidFill>
-                <a:srgbClr val="7030A0"/>
-              </a:solidFill>
-            </a:endParaRPr>
-          </a:p>
-        </p:txBody>
-      </p:sp>
-      <p:sp>
-        <p:nvSpPr>
-          <p:cNvPr id="55" name="Rectangle 8"/>
-          <p:cNvSpPr/>
-          <p:nvPr/>
-        </p:nvSpPr>
-        <p:spPr>
-          <a:xfrm>
-            <a:off x="3170181" y="1998350"/>
-            <a:ext cx="1060683" cy="364396"/>
-          </a:xfrm>
-          <a:prstGeom prst="rect">
-            <a:avLst/>
-          </a:prstGeom>
-          <a:ln w="19050">
-            <a:solidFill>
-              <a:srgbClr val="7030A0"/>
-            </a:solidFill>
-          </a:ln>
-          <a:effectLst/>
-        </p:spPr>
-        <p:style>
-          <a:lnRef idx="1">
-            <a:schemeClr val="accent4"/>
-          </a:lnRef>
-          <a:fillRef idx="2">
-            <a:schemeClr val="accent4"/>
-          </a:fillRef>
-          <a:effectRef idx="1">
-            <a:schemeClr val="accent4"/>
-          </a:effectRef>
-          <a:fontRef idx="minor">
-            <a:schemeClr val="dk1"/>
-          </a:fontRef>
-        </p:style>
-        <p:txBody>
-          <a:bodyPr rtlCol="0" anchor="ctr"/>
-          <a:lstStyle/>
-          <a:p>
-            <a:pPr algn="ctr"/>
-            <a:r>
-              <a:rPr lang="en-US" sz="1050" dirty="0" err="1">
-                <a:solidFill>
-                  <a:srgbClr val="7030A0"/>
-                </a:solidFill>
-              </a:rPr>
-              <a:t>AddressBook</a:t>
-            </a:r>
-            <a:endParaRPr lang="en-SG" sz="1050" dirty="0">
-              <a:solidFill>
-                <a:srgbClr val="7030A0"/>
-              </a:solidFill>
-            </a:endParaRPr>
-          </a:p>
-        </p:txBody>
-      </p:sp>
-      <p:cxnSp>
-        <p:nvCxnSpPr>
-          <p:cNvPr id="60" name="Straight Arrow Connector 59"/>
-          <p:cNvCxnSpPr>
-            <a:stCxn id="51" idx="1"/>
-            <a:endCxn id="49" idx="1"/>
-          </p:cNvCxnSpPr>
-          <p:nvPr/>
-        </p:nvCxnSpPr>
-        <p:spPr>
-          <a:xfrm>
-            <a:off x="4324972" y="3007222"/>
-            <a:ext cx="367678" cy="12320"/>
-          </a:xfrm>
-          <a:prstGeom prst="straightConnector1">
-            <a:avLst/>
-          </a:prstGeom>
-          <a:ln w="19050">
-            <a:solidFill>
-              <a:srgbClr val="7030A0"/>
-            </a:solidFill>
-            <a:headEnd type="none" w="med" len="med"/>
-            <a:tailEnd type="arrow" w="med" len="med"/>
-          </a:ln>
-          <a:effectLst/>
-        </p:spPr>
-        <p:style>
-          <a:lnRef idx="1">
-            <a:schemeClr val="accent2"/>
-          </a:lnRef>
-          <a:fillRef idx="2">
-            <a:schemeClr val="accent2"/>
-          </a:fillRef>
-          <a:effectRef idx="1">
-            <a:schemeClr val="accent2"/>
-          </a:effectRef>
-          <a:fontRef idx="minor">
-            <a:schemeClr val="dk1"/>
-          </a:fontRef>
-        </p:style>
-      </p:cxnSp>
-      <p:sp>
-        <p:nvSpPr>
-          <p:cNvPr id="68" name="Isosceles Triangle 102"/>
-          <p:cNvSpPr/>
-          <p:nvPr/>
-        </p:nvSpPr>
-        <p:spPr>
-          <a:xfrm rot="16200000">
-            <a:off x="2669073" y="2069158"/>
-            <a:ext cx="271014" cy="187417"/>
-          </a:xfrm>
-          <a:prstGeom prst="triangle">
-            <a:avLst>
-              <a:gd name="adj" fmla="val 44517"/>
-            </a:avLst>
-          </a:prstGeom>
-          <a:solidFill>
-            <a:schemeClr val="accent4">
-              <a:lumMod val="20000"/>
-              <a:lumOff val="80000"/>
-            </a:schemeClr>
-          </a:solidFill>
-          <a:ln w="19050">
-            <a:solidFill>
-              <a:srgbClr val="7030A0"/>
-            </a:solidFill>
-          </a:ln>
-          <a:effectLst/>
-        </p:spPr>
-        <p:style>
-          <a:lnRef idx="1">
-            <a:schemeClr val="accent6"/>
-          </a:lnRef>
-          <a:fillRef idx="2">
-            <a:schemeClr val="accent6"/>
-          </a:fillRef>
-          <a:effectRef idx="1">
-            <a:schemeClr val="accent6"/>
-          </a:effectRef>
-          <a:fontRef idx="minor">
-            <a:schemeClr val="dk1"/>
-          </a:fontRef>
-        </p:style>
-        <p:txBody>
-          <a:bodyPr rtlCol="0" anchor="ctr"/>
-          <a:lstStyle/>
-          <a:p>
-            <a:pPr algn="ctr"/>
-            <a:endParaRPr lang="en-SG" sz="1050"/>
-          </a:p>
-        </p:txBody>
-      </p:sp>
-      <p:cxnSp>
-        <p:nvCxnSpPr>
-          <p:cNvPr id="69" name="Elbow Connector 63"/>
-          <p:cNvCxnSpPr>
-            <a:stCxn id="68" idx="3"/>
-            <a:endCxn id="55" idx="1"/>
-          </p:cNvCxnSpPr>
-          <p:nvPr/>
-        </p:nvCxnSpPr>
-        <p:spPr>
-          <a:xfrm>
-            <a:off x="2898289" y="2177727"/>
-            <a:ext cx="271892" cy="2821"/>
-          </a:xfrm>
-          <a:prstGeom prst="bentConnector3">
-            <a:avLst>
-              <a:gd name="adj1" fmla="val 50000"/>
-            </a:avLst>
-          </a:prstGeom>
-          <a:ln w="19050">
-            <a:solidFill>
-              <a:srgbClr val="7030A0"/>
-            </a:solidFill>
-            <a:prstDash val="sysDot"/>
-            <a:headEnd type="none" w="med" len="med"/>
-            <a:tailEnd type="none" w="med" len="med"/>
-          </a:ln>
-          <a:effectLst/>
-        </p:spPr>
-        <p:style>
-          <a:lnRef idx="1">
-            <a:schemeClr val="accent2"/>
-          </a:lnRef>
-          <a:fillRef idx="2">
-            <a:schemeClr val="accent2"/>
-          </a:fillRef>
-          <a:effectRef idx="1">
-            <a:schemeClr val="accent2"/>
-          </a:effectRef>
-          <a:fontRef idx="minor">
-            <a:schemeClr val="dk1"/>
-          </a:fontRef>
-        </p:style>
-      </p:cxnSp>
+      </p:pic>
     </p:spTree>
     <p:extLst>
       <p:ext uri="{BB962C8B-B14F-4D97-AF65-F5344CB8AC3E}">

</xml_diff>

<commit_message>
Changes to UGDG and some minor code changes
</commit_message>
<xml_diff>
--- a/docs/diagrams/ModelComponentClassDiagram.pptx
+++ b/docs/diagrams/ModelComponentClassDiagram.pptx
@@ -208,7 +208,7 @@
           <a:p>
             <a:fld id="{F5CC4B3F-88C1-4FFA-B1B6-F41C21DC6924}" type="datetimeFigureOut">
               <a:rPr lang="en-US" smtClean="0"/>
-              <a:t>11/10/2018</a:t>
+              <a:t>11/12/2018</a:t>
             </a:fld>
             <a:endParaRPr lang="en-US"/>
           </a:p>
@@ -654,7 +654,7 @@
           <a:p>
             <a:fld id="{78C97017-6FC3-485B-9764-EAC9E56C1D49}" type="datetimeFigureOut">
               <a:rPr lang="en-US" smtClean="0"/>
-              <a:t>11/10/2018</a:t>
+              <a:t>11/12/2018</a:t>
             </a:fld>
             <a:endParaRPr lang="en-US"/>
           </a:p>
@@ -822,7 +822,7 @@
           <a:p>
             <a:fld id="{78C97017-6FC3-485B-9764-EAC9E56C1D49}" type="datetimeFigureOut">
               <a:rPr lang="en-US" smtClean="0"/>
-              <a:t>11/10/2018</a:t>
+              <a:t>11/12/2018</a:t>
             </a:fld>
             <a:endParaRPr lang="en-US"/>
           </a:p>
@@ -1000,7 +1000,7 @@
           <a:p>
             <a:fld id="{78C97017-6FC3-485B-9764-EAC9E56C1D49}" type="datetimeFigureOut">
               <a:rPr lang="en-US" smtClean="0"/>
-              <a:t>11/10/2018</a:t>
+              <a:t>11/12/2018</a:t>
             </a:fld>
             <a:endParaRPr lang="en-US"/>
           </a:p>
@@ -1168,7 +1168,7 @@
           <a:p>
             <a:fld id="{78C97017-6FC3-485B-9764-EAC9E56C1D49}" type="datetimeFigureOut">
               <a:rPr lang="en-US" smtClean="0"/>
-              <a:t>11/10/2018</a:t>
+              <a:t>11/12/2018</a:t>
             </a:fld>
             <a:endParaRPr lang="en-US"/>
           </a:p>
@@ -1413,7 +1413,7 @@
           <a:p>
             <a:fld id="{78C97017-6FC3-485B-9764-EAC9E56C1D49}" type="datetimeFigureOut">
               <a:rPr lang="en-US" smtClean="0"/>
-              <a:t>11/10/2018</a:t>
+              <a:t>11/12/2018</a:t>
             </a:fld>
             <a:endParaRPr lang="en-US"/>
           </a:p>
@@ -1698,7 +1698,7 @@
           <a:p>
             <a:fld id="{78C97017-6FC3-485B-9764-EAC9E56C1D49}" type="datetimeFigureOut">
               <a:rPr lang="en-US" smtClean="0"/>
-              <a:t>11/10/2018</a:t>
+              <a:t>11/12/2018</a:t>
             </a:fld>
             <a:endParaRPr lang="en-US"/>
           </a:p>
@@ -2117,7 +2117,7 @@
           <a:p>
             <a:fld id="{78C97017-6FC3-485B-9764-EAC9E56C1D49}" type="datetimeFigureOut">
               <a:rPr lang="en-US" smtClean="0"/>
-              <a:t>11/10/2018</a:t>
+              <a:t>11/12/2018</a:t>
             </a:fld>
             <a:endParaRPr lang="en-US"/>
           </a:p>
@@ -2234,7 +2234,7 @@
           <a:p>
             <a:fld id="{78C97017-6FC3-485B-9764-EAC9E56C1D49}" type="datetimeFigureOut">
               <a:rPr lang="en-US" smtClean="0"/>
-              <a:t>11/10/2018</a:t>
+              <a:t>11/12/2018</a:t>
             </a:fld>
             <a:endParaRPr lang="en-US"/>
           </a:p>
@@ -2329,7 +2329,7 @@
           <a:p>
             <a:fld id="{78C97017-6FC3-485B-9764-EAC9E56C1D49}" type="datetimeFigureOut">
               <a:rPr lang="en-US" smtClean="0"/>
-              <a:t>11/10/2018</a:t>
+              <a:t>11/12/2018</a:t>
             </a:fld>
             <a:endParaRPr lang="en-US"/>
           </a:p>
@@ -2604,7 +2604,7 @@
           <a:p>
             <a:fld id="{78C97017-6FC3-485B-9764-EAC9E56C1D49}" type="datetimeFigureOut">
               <a:rPr lang="en-US" smtClean="0"/>
-              <a:t>11/10/2018</a:t>
+              <a:t>11/12/2018</a:t>
             </a:fld>
             <a:endParaRPr lang="en-US"/>
           </a:p>
@@ -2856,7 +2856,7 @@
           <a:p>
             <a:fld id="{78C97017-6FC3-485B-9764-EAC9E56C1D49}" type="datetimeFigureOut">
               <a:rPr lang="en-US" smtClean="0"/>
-              <a:t>11/10/2018</a:t>
+              <a:t>11/12/2018</a:t>
             </a:fld>
             <a:endParaRPr lang="en-US"/>
           </a:p>
@@ -3067,7 +3067,7 @@
           <a:p>
             <a:fld id="{78C97017-6FC3-485B-9764-EAC9E56C1D49}" type="datetimeFigureOut">
               <a:rPr lang="en-US" smtClean="0"/>
-              <a:t>11/10/2018</a:t>
+              <a:t>11/12/2018</a:t>
             </a:fld>
             <a:endParaRPr lang="en-US"/>
           </a:p>
@@ -3450,8 +3450,8 @@
         </p:nvSpPr>
         <p:spPr>
           <a:xfrm>
-            <a:off x="345459" y="444772"/>
-            <a:ext cx="8341341" cy="3593828"/>
+            <a:off x="152400" y="1066800"/>
+            <a:ext cx="8001000" cy="4038600"/>
           </a:xfrm>
           <a:prstGeom prst="roundRect">
             <a:avLst>
@@ -3511,7 +3511,7 @@
         </p:nvSpPr>
         <p:spPr>
           <a:xfrm>
-            <a:off x="2652167" y="2713397"/>
+            <a:off x="2306708" y="3868825"/>
             <a:ext cx="1093635" cy="346760"/>
           </a:xfrm>
           <a:prstGeom prst="rect">
@@ -3570,7 +3570,7 @@
         </p:nvSpPr>
         <p:spPr>
           <a:xfrm rot="16200000">
-            <a:off x="1436535" y="2347907"/>
+            <a:off x="1091076" y="3503335"/>
             <a:ext cx="1093635" cy="346760"/>
           </a:xfrm>
           <a:prstGeom prst="rect">
@@ -3633,7 +3633,7 @@
         </p:nvCxnSpPr>
         <p:spPr>
           <a:xfrm rot="5400000" flipH="1" flipV="1">
-            <a:off x="3906494" y="531842"/>
+            <a:off x="3561035" y="1687270"/>
             <a:ext cx="613122" cy="4459404"/>
           </a:xfrm>
           <a:prstGeom prst="bentConnector3">
@@ -3674,7 +3674,7 @@
         </p:nvSpPr>
         <p:spPr>
           <a:xfrm rot="16200000">
-            <a:off x="731189" y="2111359"/>
+            <a:off x="385730" y="3266787"/>
             <a:ext cx="1093635" cy="346760"/>
           </a:xfrm>
           <a:prstGeom prst="rect">
@@ -3744,7 +3744,7 @@
         </p:nvSpPr>
         <p:spPr>
           <a:xfrm rot="16200000">
-            <a:off x="1401897" y="2202448"/>
+            <a:off x="1056438" y="3357876"/>
             <a:ext cx="270504" cy="175523"/>
           </a:xfrm>
           <a:prstGeom prst="triangle">
@@ -3794,7 +3794,7 @@
         </p:nvCxnSpPr>
         <p:spPr>
           <a:xfrm>
-            <a:off x="2384815" y="2886777"/>
+            <a:off x="2039356" y="4042205"/>
             <a:ext cx="267352" cy="0"/>
           </a:xfrm>
           <a:prstGeom prst="straightConnector1">
@@ -3832,7 +3832,7 @@
         </p:nvCxnSpPr>
         <p:spPr>
           <a:xfrm>
-            <a:off x="685078" y="2290210"/>
+            <a:off x="339619" y="3445638"/>
             <a:ext cx="419548" cy="2860"/>
           </a:xfrm>
           <a:prstGeom prst="bentConnector3">
@@ -3877,7 +3877,7 @@
         </p:nvCxnSpPr>
         <p:spPr>
           <a:xfrm flipV="1">
-            <a:off x="1624911" y="2290209"/>
+            <a:off x="1279452" y="3445637"/>
             <a:ext cx="216105" cy="1"/>
           </a:xfrm>
           <a:prstGeom prst="line">
@@ -3916,7 +3916,7 @@
         </p:nvSpPr>
         <p:spPr>
           <a:xfrm>
-            <a:off x="2148767" y="2800087"/>
+            <a:off x="1803308" y="3955515"/>
             <a:ext cx="236048" cy="173380"/>
           </a:xfrm>
           <a:prstGeom prst="flowChartDecision">
@@ -3961,7 +3961,7 @@
         </p:nvSpPr>
         <p:spPr>
           <a:xfrm>
-            <a:off x="2590995" y="2096319"/>
+            <a:off x="2245536" y="3251747"/>
             <a:ext cx="1499832" cy="334856"/>
           </a:xfrm>
           <a:prstGeom prst="rect">
@@ -4037,7 +4037,7 @@
         </p:nvCxnSpPr>
         <p:spPr>
           <a:xfrm>
-            <a:off x="2399347" y="2253190"/>
+            <a:off x="2053888" y="3408618"/>
             <a:ext cx="191648" cy="10557"/>
           </a:xfrm>
           <a:prstGeom prst="straightConnector1">
@@ -4075,7 +4075,7 @@
         </p:nvSpPr>
         <p:spPr>
           <a:xfrm>
-            <a:off x="2163299" y="2166500"/>
+            <a:off x="1817840" y="3321928"/>
             <a:ext cx="236048" cy="173380"/>
           </a:xfrm>
           <a:prstGeom prst="flowChartDecision">
@@ -4120,7 +4120,7 @@
         </p:nvSpPr>
         <p:spPr>
           <a:xfrm>
-            <a:off x="4467637" y="2096319"/>
+            <a:off x="4122178" y="3251747"/>
             <a:ext cx="1156969" cy="346760"/>
           </a:xfrm>
           <a:prstGeom prst="rect">
@@ -4176,7 +4176,7 @@
         </p:nvSpPr>
         <p:spPr>
           <a:xfrm>
-            <a:off x="4099959" y="2170689"/>
+            <a:off x="3754500" y="3326117"/>
             <a:ext cx="236048" cy="173380"/>
           </a:xfrm>
           <a:prstGeom prst="flowChartDecision">
@@ -4223,7 +4223,7 @@
         </p:nvSpPr>
         <p:spPr>
           <a:xfrm>
-            <a:off x="6088664" y="2108223"/>
+            <a:off x="5743205" y="3263651"/>
             <a:ext cx="708186" cy="346760"/>
           </a:xfrm>
           <a:prstGeom prst="rect">
@@ -4279,7 +4279,7 @@
         </p:nvSpPr>
         <p:spPr>
           <a:xfrm>
-            <a:off x="5633738" y="2191833"/>
+            <a:off x="5288279" y="3347261"/>
             <a:ext cx="236048" cy="173380"/>
           </a:xfrm>
           <a:prstGeom prst="flowChartDecision">
@@ -4327,7 +4327,7 @@
         </p:nvCxnSpPr>
         <p:spPr>
           <a:xfrm>
-            <a:off x="5869786" y="2278523"/>
+            <a:off x="5524327" y="3433951"/>
             <a:ext cx="218878" cy="3080"/>
           </a:xfrm>
           <a:prstGeom prst="bentConnector3">
@@ -4365,7 +4365,7 @@
         </p:nvSpPr>
         <p:spPr>
           <a:xfrm>
-            <a:off x="7487383" y="1814395"/>
+            <a:off x="7141924" y="2969823"/>
             <a:ext cx="898203" cy="285783"/>
           </a:xfrm>
           <a:prstGeom prst="rect">
@@ -4421,7 +4421,7 @@
         </p:nvSpPr>
         <p:spPr>
           <a:xfrm>
-            <a:off x="6816934" y="2198358"/>
+            <a:off x="6471475" y="3353786"/>
             <a:ext cx="236048" cy="173380"/>
           </a:xfrm>
           <a:prstGeom prst="flowChartDecision">
@@ -4470,7 +4470,7 @@
         </p:nvCxnSpPr>
         <p:spPr>
           <a:xfrm flipV="1">
-            <a:off x="7052982" y="1956978"/>
+            <a:off x="6707523" y="3112406"/>
             <a:ext cx="434402" cy="327761"/>
           </a:xfrm>
           <a:prstGeom prst="bentConnector3">
@@ -4508,7 +4508,7 @@
         </p:nvSpPr>
         <p:spPr>
           <a:xfrm>
-            <a:off x="7487383" y="2137373"/>
+            <a:off x="7141924" y="3292801"/>
             <a:ext cx="898203" cy="285783"/>
           </a:xfrm>
           <a:prstGeom prst="rect">
@@ -4568,7 +4568,7 @@
         </p:nvCxnSpPr>
         <p:spPr>
           <a:xfrm flipV="1">
-            <a:off x="7052982" y="2280265"/>
+            <a:off x="6707523" y="3435693"/>
             <a:ext cx="434401" cy="4783"/>
           </a:xfrm>
           <a:prstGeom prst="bentConnector3">
@@ -4606,7 +4606,7 @@
         </p:nvSpPr>
         <p:spPr>
           <a:xfrm>
-            <a:off x="7487383" y="2460351"/>
+            <a:off x="7141924" y="3615779"/>
             <a:ext cx="898203" cy="285783"/>
           </a:xfrm>
           <a:prstGeom prst="rect">
@@ -4666,7 +4666,7 @@
         </p:nvCxnSpPr>
         <p:spPr>
           <a:xfrm>
-            <a:off x="7052982" y="2285048"/>
+            <a:off x="6707523" y="3440476"/>
             <a:ext cx="434401" cy="318195"/>
           </a:xfrm>
           <a:prstGeom prst="bentConnector3">
@@ -4707,7 +4707,7 @@
         </p:nvCxnSpPr>
         <p:spPr>
           <a:xfrm rot="16200000" flipH="1">
-            <a:off x="3118450" y="1736290"/>
+            <a:off x="2772991" y="2891718"/>
             <a:ext cx="720059" cy="1"/>
           </a:xfrm>
           <a:prstGeom prst="bentConnector3">
@@ -4748,7 +4748,7 @@
         </p:nvSpPr>
         <p:spPr>
           <a:xfrm rot="10800000" flipV="1">
-            <a:off x="3337286" y="1219200"/>
+            <a:off x="2991827" y="2374628"/>
             <a:ext cx="282387" cy="157062"/>
           </a:xfrm>
           <a:prstGeom prst="triangle">
@@ -4796,7 +4796,7 @@
         </p:nvSpPr>
         <p:spPr>
           <a:xfrm>
-            <a:off x="1032322" y="749296"/>
+            <a:off x="686863" y="1904724"/>
             <a:ext cx="1443661" cy="469904"/>
           </a:xfrm>
           <a:prstGeom prst="rect">
@@ -4883,7 +4883,7 @@
         </p:nvSpPr>
         <p:spPr>
           <a:xfrm rot="16200000">
-            <a:off x="6137873" y="2836462"/>
+            <a:off x="5792414" y="3991890"/>
             <a:ext cx="881018" cy="261610"/>
           </a:xfrm>
           <a:prstGeom prst="rect">
@@ -4922,7 +4922,7 @@
         </p:nvSpPr>
         <p:spPr>
           <a:xfrm>
-            <a:off x="1832388" y="3489648"/>
+            <a:off x="1486929" y="4645076"/>
             <a:ext cx="1066800" cy="346760"/>
           </a:xfrm>
           <a:prstGeom prst="rect">
@@ -4997,7 +4997,7 @@
         </p:nvCxnSpPr>
         <p:spPr>
           <a:xfrm rot="16200000" flipH="1">
-            <a:off x="1139462" y="2970101"/>
+            <a:off x="794003" y="4125529"/>
             <a:ext cx="831471" cy="554381"/>
           </a:xfrm>
           <a:prstGeom prst="bentConnector2">
@@ -5036,7 +5036,7 @@
         </p:nvSpPr>
         <p:spPr>
           <a:xfrm>
-            <a:off x="4204966" y="2361636"/>
+            <a:off x="3929356" y="3202890"/>
             <a:ext cx="189257" cy="178683"/>
           </a:xfrm>
           <a:prstGeom prst="rect">
@@ -5075,7 +5075,7 @@
         </p:nvSpPr>
         <p:spPr>
           <a:xfrm>
-            <a:off x="5910243" y="2348074"/>
+            <a:off x="5564784" y="3503502"/>
             <a:ext cx="189257" cy="178683"/>
           </a:xfrm>
           <a:prstGeom prst="rect">
@@ -5114,7 +5114,7 @@
         </p:nvSpPr>
         <p:spPr>
           <a:xfrm>
-            <a:off x="2348381" y="2006872"/>
+            <a:off x="2002922" y="3162300"/>
             <a:ext cx="170110" cy="137542"/>
           </a:xfrm>
           <a:prstGeom prst="rect">
@@ -5153,7 +5153,7 @@
         </p:nvSpPr>
         <p:spPr>
           <a:xfrm>
-            <a:off x="2482057" y="2917894"/>
+            <a:off x="2136598" y="4073322"/>
             <a:ext cx="189257" cy="178683"/>
           </a:xfrm>
           <a:prstGeom prst="rect">
@@ -5192,7 +5192,7 @@
         </p:nvSpPr>
         <p:spPr>
           <a:xfrm>
-            <a:off x="6224883" y="2454983"/>
+            <a:off x="5879424" y="3610411"/>
             <a:ext cx="189257" cy="178683"/>
           </a:xfrm>
           <a:prstGeom prst="rect">
@@ -5237,7 +5237,7 @@
         </p:nvSpPr>
         <p:spPr>
           <a:xfrm>
-            <a:off x="7487383" y="1478974"/>
+            <a:off x="7141924" y="2634402"/>
             <a:ext cx="898203" cy="285783"/>
           </a:xfrm>
           <a:prstGeom prst="rect">
@@ -5303,7 +5303,7 @@
         </p:nvCxnSpPr>
         <p:spPr>
           <a:xfrm flipV="1">
-            <a:off x="7052982" y="1621866"/>
+            <a:off x="6707523" y="2777294"/>
             <a:ext cx="434401" cy="663182"/>
           </a:xfrm>
           <a:prstGeom prst="bentConnector3">
@@ -5349,7 +5349,7 @@
         </p:nvSpPr>
         <p:spPr>
           <a:xfrm>
-            <a:off x="7241230" y="1505868"/>
+            <a:off x="6895771" y="2661296"/>
             <a:ext cx="189257" cy="178683"/>
           </a:xfrm>
           <a:prstGeom prst="rect">
@@ -5388,7 +5388,7 @@
         </p:nvSpPr>
         <p:spPr>
           <a:xfrm>
-            <a:off x="2895601" y="854803"/>
+            <a:off x="2550142" y="2010231"/>
             <a:ext cx="1219199" cy="364396"/>
           </a:xfrm>
           <a:prstGeom prst="rect">
@@ -5447,7 +5447,7 @@
         </p:nvCxnSpPr>
         <p:spPr>
           <a:xfrm>
-            <a:off x="4099959" y="2257379"/>
+            <a:off x="3754500" y="3412807"/>
             <a:ext cx="367678" cy="12320"/>
           </a:xfrm>
           <a:prstGeom prst="straightConnector1">
@@ -5485,7 +5485,7 @@
         </p:nvSpPr>
         <p:spPr>
           <a:xfrm rot="16200000">
-            <a:off x="2440473" y="925611"/>
+            <a:off x="2095014" y="2081039"/>
             <a:ext cx="271014" cy="187417"/>
           </a:xfrm>
           <a:prstGeom prst="triangle">
@@ -5541,7 +5541,7 @@
         </p:nvCxnSpPr>
         <p:spPr>
           <a:xfrm>
-            <a:off x="2669689" y="1034180"/>
+            <a:off x="2324230" y="2189608"/>
             <a:ext cx="225912" cy="2821"/>
           </a:xfrm>
           <a:prstGeom prst="bentConnector3">
@@ -5588,7 +5588,7 @@
         </p:nvSpPr>
         <p:spPr>
           <a:xfrm>
-            <a:off x="4447130" y="1487238"/>
+            <a:off x="4101671" y="2642666"/>
             <a:ext cx="1156969" cy="346760"/>
           </a:xfrm>
           <a:prstGeom prst="rect">
@@ -5666,7 +5666,7 @@
         </p:nvSpPr>
         <p:spPr>
           <a:xfrm>
-            <a:off x="5605798" y="1573928"/>
+            <a:off x="5260339" y="2729356"/>
             <a:ext cx="236048" cy="173380"/>
           </a:xfrm>
           <a:prstGeom prst="flowChartDecision">
@@ -5721,7 +5721,7 @@
         </p:nvCxnSpPr>
         <p:spPr>
           <a:xfrm flipV="1">
-            <a:off x="5841846" y="1659814"/>
+            <a:off x="5496387" y="2815242"/>
             <a:ext cx="222343" cy="804"/>
           </a:xfrm>
           <a:prstGeom prst="bentConnector3">
@@ -5765,7 +5765,7 @@
         </p:nvSpPr>
         <p:spPr>
           <a:xfrm>
-            <a:off x="6064189" y="1486434"/>
+            <a:off x="5718730" y="2641862"/>
             <a:ext cx="708186" cy="346760"/>
           </a:xfrm>
           <a:prstGeom prst="rect">
@@ -5831,7 +5831,7 @@
         </p:nvCxnSpPr>
         <p:spPr>
           <a:xfrm rot="5400000" flipH="1" flipV="1">
-            <a:off x="4077521" y="1801081"/>
+            <a:off x="3732062" y="2956509"/>
             <a:ext cx="510071" cy="229147"/>
           </a:xfrm>
           <a:prstGeom prst="bentConnector2">
@@ -5875,7 +5875,7 @@
         </p:nvSpPr>
         <p:spPr>
           <a:xfrm>
-            <a:off x="5858389" y="1485423"/>
+            <a:off x="5512930" y="2640851"/>
             <a:ext cx="189257" cy="178683"/>
           </a:xfrm>
           <a:prstGeom prst="rect">
@@ -5897,6 +5897,1237 @@
                 </a:solidFill>
               </a:rPr>
               <a:t>*</a:t>
+            </a:r>
+            <a:endParaRPr lang="en-SG" sz="1100" dirty="0">
+              <a:solidFill>
+                <a:srgbClr val="7030A0"/>
+              </a:solidFill>
+            </a:endParaRPr>
+          </a:p>
+        </p:txBody>
+      </p:sp>
+      <p:sp>
+        <p:nvSpPr>
+          <p:cNvPr id="57" name="Rectangle 8">
+            <a:extLst>
+              <a:ext uri="{FF2B5EF4-FFF2-40B4-BE49-F238E27FC236}">
+                <a16:creationId xmlns:a16="http://schemas.microsoft.com/office/drawing/2014/main" id="{D64CDD70-E5F3-4258-BE72-6EF5019EDE20}"/>
+              </a:ext>
+            </a:extLst>
+          </p:cNvPr>
+          <p:cNvSpPr/>
+          <p:nvPr/>
+        </p:nvSpPr>
+        <p:spPr>
+          <a:xfrm>
+            <a:off x="4058608" y="1509044"/>
+            <a:ext cx="1156969" cy="346760"/>
+          </a:xfrm>
+          <a:prstGeom prst="rect">
+            <a:avLst/>
+          </a:prstGeom>
+          <a:ln w="19050">
+            <a:solidFill>
+              <a:srgbClr val="7030A0"/>
+            </a:solidFill>
+          </a:ln>
+          <a:effectLst/>
+        </p:spPr>
+        <p:style>
+          <a:lnRef idx="1">
+            <a:schemeClr val="accent4"/>
+          </a:lnRef>
+          <a:fillRef idx="2">
+            <a:schemeClr val="accent4"/>
+          </a:fillRef>
+          <a:effectRef idx="1">
+            <a:schemeClr val="accent4"/>
+          </a:effectRef>
+          <a:fontRef idx="minor">
+            <a:schemeClr val="dk1"/>
+          </a:fontRef>
+        </p:style>
+        <p:txBody>
+          <a:bodyPr rtlCol="0" anchor="ctr"/>
+          <a:lstStyle/>
+          <a:p>
+            <a:pPr algn="ctr"/>
+            <a:r>
+              <a:rPr lang="en-US" sz="1050" dirty="0" err="1">
+                <a:solidFill>
+                  <a:srgbClr val="7030A0"/>
+                </a:solidFill>
+              </a:rPr>
+              <a:t>RecordMap</a:t>
+            </a:r>
+            <a:endParaRPr lang="en-SG" sz="1050" dirty="0">
+              <a:solidFill>
+                <a:srgbClr val="7030A0"/>
+              </a:solidFill>
+            </a:endParaRPr>
+          </a:p>
+        </p:txBody>
+      </p:sp>
+      <p:cxnSp>
+        <p:nvCxnSpPr>
+          <p:cNvPr id="74" name="Straight Arrow Connector 71">
+            <a:extLst>
+              <a:ext uri="{FF2B5EF4-FFF2-40B4-BE49-F238E27FC236}">
+                <a16:creationId xmlns:a16="http://schemas.microsoft.com/office/drawing/2014/main" id="{5106ABF4-08FD-4CE8-972F-89F75C744B71}"/>
+              </a:ext>
+            </a:extLst>
+          </p:cNvPr>
+          <p:cNvCxnSpPr>
+            <a:cxnSpLocks/>
+            <a:stCxn id="51" idx="0"/>
+            <a:endCxn id="57" idx="1"/>
+          </p:cNvCxnSpPr>
+          <p:nvPr/>
+        </p:nvCxnSpPr>
+        <p:spPr>
+          <a:xfrm rot="5400000" flipH="1" flipV="1">
+            <a:off x="3143720" y="2411229"/>
+            <a:ext cx="1643693" cy="186084"/>
+          </a:xfrm>
+          <a:prstGeom prst="bentConnector2">
+            <a:avLst/>
+          </a:prstGeom>
+          <a:ln w="19050">
+            <a:solidFill>
+              <a:srgbClr val="7030A0"/>
+            </a:solidFill>
+            <a:headEnd type="none" w="med" len="med"/>
+            <a:tailEnd type="arrow" w="med" len="med"/>
+          </a:ln>
+          <a:effectLst/>
+        </p:spPr>
+        <p:style>
+          <a:lnRef idx="1">
+            <a:schemeClr val="accent2"/>
+          </a:lnRef>
+          <a:fillRef idx="2">
+            <a:schemeClr val="accent2"/>
+          </a:fillRef>
+          <a:effectRef idx="1">
+            <a:schemeClr val="accent2"/>
+          </a:effectRef>
+          <a:fontRef idx="minor">
+            <a:schemeClr val="dk1"/>
+          </a:fontRef>
+        </p:style>
+      </p:cxnSp>
+      <p:sp>
+        <p:nvSpPr>
+          <p:cNvPr id="77" name="Rectangle 8">
+            <a:extLst>
+              <a:ext uri="{FF2B5EF4-FFF2-40B4-BE49-F238E27FC236}">
+                <a16:creationId xmlns:a16="http://schemas.microsoft.com/office/drawing/2014/main" id="{F47C1270-D620-4128-93D7-19F1BBD9A6D9}"/>
+              </a:ext>
+            </a:extLst>
+          </p:cNvPr>
+          <p:cNvSpPr/>
+          <p:nvPr/>
+        </p:nvSpPr>
+        <p:spPr>
+          <a:xfrm>
+            <a:off x="4101670" y="2001367"/>
+            <a:ext cx="1156969" cy="346760"/>
+          </a:xfrm>
+          <a:prstGeom prst="rect">
+            <a:avLst/>
+          </a:prstGeom>
+          <a:ln w="19050">
+            <a:solidFill>
+              <a:srgbClr val="7030A0"/>
+            </a:solidFill>
+          </a:ln>
+          <a:effectLst/>
+        </p:spPr>
+        <p:style>
+          <a:lnRef idx="1">
+            <a:schemeClr val="accent4"/>
+          </a:lnRef>
+          <a:fillRef idx="2">
+            <a:schemeClr val="accent4"/>
+          </a:fillRef>
+          <a:effectRef idx="1">
+            <a:schemeClr val="accent4"/>
+          </a:effectRef>
+          <a:fontRef idx="minor">
+            <a:schemeClr val="dk1"/>
+          </a:fontRef>
+        </p:style>
+        <p:txBody>
+          <a:bodyPr rtlCol="0" anchor="ctr"/>
+          <a:lstStyle/>
+          <a:p>
+            <a:pPr algn="ctr"/>
+            <a:r>
+              <a:rPr lang="en-US" sz="1050" dirty="0" err="1">
+                <a:solidFill>
+                  <a:srgbClr val="7030A0"/>
+                </a:solidFill>
+              </a:rPr>
+              <a:t>DateMap</a:t>
+            </a:r>
+            <a:endParaRPr lang="en-SG" sz="1050" dirty="0">
+              <a:solidFill>
+                <a:srgbClr val="7030A0"/>
+              </a:solidFill>
+            </a:endParaRPr>
+          </a:p>
+        </p:txBody>
+      </p:sp>
+      <p:cxnSp>
+        <p:nvCxnSpPr>
+          <p:cNvPr id="82" name="Straight Arrow Connector 71">
+            <a:extLst>
+              <a:ext uri="{FF2B5EF4-FFF2-40B4-BE49-F238E27FC236}">
+                <a16:creationId xmlns:a16="http://schemas.microsoft.com/office/drawing/2014/main" id="{64F58BFD-B465-4ABB-BB1A-C4C6CC982214}"/>
+              </a:ext>
+            </a:extLst>
+          </p:cNvPr>
+          <p:cNvCxnSpPr>
+            <a:cxnSpLocks/>
+            <a:stCxn id="51" idx="0"/>
+            <a:endCxn id="77" idx="1"/>
+          </p:cNvCxnSpPr>
+          <p:nvPr/>
+        </p:nvCxnSpPr>
+        <p:spPr>
+          <a:xfrm rot="5400000" flipH="1" flipV="1">
+            <a:off x="3411412" y="2635859"/>
+            <a:ext cx="1151370" cy="229146"/>
+          </a:xfrm>
+          <a:prstGeom prst="bentConnector2">
+            <a:avLst/>
+          </a:prstGeom>
+          <a:ln w="19050">
+            <a:solidFill>
+              <a:srgbClr val="7030A0"/>
+            </a:solidFill>
+            <a:headEnd type="none" w="med" len="med"/>
+            <a:tailEnd type="arrow" w="med" len="med"/>
+          </a:ln>
+          <a:effectLst/>
+        </p:spPr>
+        <p:style>
+          <a:lnRef idx="1">
+            <a:schemeClr val="accent2"/>
+          </a:lnRef>
+          <a:fillRef idx="2">
+            <a:schemeClr val="accent2"/>
+          </a:fillRef>
+          <a:effectRef idx="1">
+            <a:schemeClr val="accent2"/>
+          </a:effectRef>
+          <a:fontRef idx="minor">
+            <a:schemeClr val="dk1"/>
+          </a:fontRef>
+        </p:style>
+      </p:cxnSp>
+      <p:sp>
+        <p:nvSpPr>
+          <p:cNvPr id="85" name="Flowchart: Decision 96">
+            <a:extLst>
+              <a:ext uri="{FF2B5EF4-FFF2-40B4-BE49-F238E27FC236}">
+                <a16:creationId xmlns:a16="http://schemas.microsoft.com/office/drawing/2014/main" id="{0ED050EB-73E0-435D-935A-347BF2A31D25}"/>
+              </a:ext>
+            </a:extLst>
+          </p:cNvPr>
+          <p:cNvSpPr/>
+          <p:nvPr/>
+        </p:nvSpPr>
+        <p:spPr>
+          <a:xfrm>
+            <a:off x="5225617" y="1595734"/>
+            <a:ext cx="236048" cy="173380"/>
+          </a:xfrm>
+          <a:prstGeom prst="flowChartDecision">
+            <a:avLst/>
+          </a:prstGeom>
+          <a:solidFill>
+            <a:srgbClr val="7030A0"/>
+          </a:solidFill>
+          <a:ln w="19050">
+            <a:solidFill>
+              <a:srgbClr val="7030A0"/>
+            </a:solidFill>
+          </a:ln>
+          <a:effectLst/>
+        </p:spPr>
+        <p:style>
+          <a:lnRef idx="1">
+            <a:schemeClr val="accent6"/>
+          </a:lnRef>
+          <a:fillRef idx="2">
+            <a:schemeClr val="accent6"/>
+          </a:fillRef>
+          <a:effectRef idx="1">
+            <a:schemeClr val="accent6"/>
+          </a:effectRef>
+          <a:fontRef idx="minor">
+            <a:schemeClr val="dk1"/>
+          </a:fontRef>
+        </p:style>
+        <p:txBody>
+          <a:bodyPr rtlCol="0" anchor="ctr"/>
+          <a:lstStyle/>
+          <a:p>
+            <a:pPr algn="ctr"/>
+            <a:endParaRPr lang="en-US" sz="1050"/>
+          </a:p>
+        </p:txBody>
+      </p:sp>
+      <p:cxnSp>
+        <p:nvCxnSpPr>
+          <p:cNvPr id="87" name="Elbow Connector 78">
+            <a:extLst>
+              <a:ext uri="{FF2B5EF4-FFF2-40B4-BE49-F238E27FC236}">
+                <a16:creationId xmlns:a16="http://schemas.microsoft.com/office/drawing/2014/main" id="{CCF8D6A1-5CA8-4584-8444-4287393C8D8C}"/>
+              </a:ext>
+            </a:extLst>
+          </p:cNvPr>
+          <p:cNvCxnSpPr>
+            <a:cxnSpLocks/>
+            <a:stCxn id="85" idx="3"/>
+            <a:endCxn id="90" idx="1"/>
+          </p:cNvCxnSpPr>
+          <p:nvPr/>
+        </p:nvCxnSpPr>
+        <p:spPr>
+          <a:xfrm flipV="1">
+            <a:off x="5461665" y="1308064"/>
+            <a:ext cx="370819" cy="374360"/>
+          </a:xfrm>
+          <a:prstGeom prst="bentConnector3">
+            <a:avLst/>
+          </a:prstGeom>
+          <a:ln w="19050">
+            <a:solidFill>
+              <a:srgbClr val="7030A0"/>
+            </a:solidFill>
+            <a:headEnd type="none" w="med" len="med"/>
+            <a:tailEnd type="arrow" w="med" len="med"/>
+          </a:ln>
+          <a:effectLst/>
+        </p:spPr>
+        <p:style>
+          <a:lnRef idx="1">
+            <a:schemeClr val="accent2"/>
+          </a:lnRef>
+          <a:fillRef idx="2">
+            <a:schemeClr val="accent2"/>
+          </a:fillRef>
+          <a:effectRef idx="1">
+            <a:schemeClr val="accent2"/>
+          </a:effectRef>
+          <a:fontRef idx="minor">
+            <a:schemeClr val="dk1"/>
+          </a:fontRef>
+        </p:style>
+      </p:cxnSp>
+      <p:sp>
+        <p:nvSpPr>
+          <p:cNvPr id="88" name="Rectangle 8">
+            <a:extLst>
+              <a:ext uri="{FF2B5EF4-FFF2-40B4-BE49-F238E27FC236}">
+                <a16:creationId xmlns:a16="http://schemas.microsoft.com/office/drawing/2014/main" id="{8292C651-D26D-4633-8761-0FC299D2DBAE}"/>
+              </a:ext>
+            </a:extLst>
+          </p:cNvPr>
+          <p:cNvSpPr/>
+          <p:nvPr/>
+        </p:nvSpPr>
+        <p:spPr>
+          <a:xfrm>
+            <a:off x="5832485" y="1483367"/>
+            <a:ext cx="898203" cy="285783"/>
+          </a:xfrm>
+          <a:prstGeom prst="rect">
+            <a:avLst/>
+          </a:prstGeom>
+          <a:ln w="19050">
+            <a:solidFill>
+              <a:srgbClr val="7030A0"/>
+            </a:solidFill>
+          </a:ln>
+          <a:effectLst/>
+        </p:spPr>
+        <p:style>
+          <a:lnRef idx="1">
+            <a:schemeClr val="accent4"/>
+          </a:lnRef>
+          <a:fillRef idx="2">
+            <a:schemeClr val="accent4"/>
+          </a:fillRef>
+          <a:effectRef idx="1">
+            <a:schemeClr val="accent4"/>
+          </a:effectRef>
+          <a:fontRef idx="minor">
+            <a:schemeClr val="dk1"/>
+          </a:fontRef>
+        </p:style>
+        <p:txBody>
+          <a:bodyPr rtlCol="0" anchor="ctr"/>
+          <a:lstStyle/>
+          <a:p>
+            <a:pPr algn="ctr"/>
+            <a:r>
+              <a:rPr lang="en-US" sz="1050" dirty="0" err="1">
+                <a:solidFill>
+                  <a:srgbClr val="7030A0"/>
+                </a:solidFill>
+              </a:rPr>
+              <a:t>NameMap</a:t>
+            </a:r>
+            <a:endParaRPr lang="en-SG" sz="1050" dirty="0">
+              <a:solidFill>
+                <a:srgbClr val="7030A0"/>
+              </a:solidFill>
+            </a:endParaRPr>
+          </a:p>
+        </p:txBody>
+      </p:sp>
+      <p:sp>
+        <p:nvSpPr>
+          <p:cNvPr id="89" name="Rectangle 8">
+            <a:extLst>
+              <a:ext uri="{FF2B5EF4-FFF2-40B4-BE49-F238E27FC236}">
+                <a16:creationId xmlns:a16="http://schemas.microsoft.com/office/drawing/2014/main" id="{38F73566-7B04-4549-AA1F-D94DF9AA3AD7}"/>
+              </a:ext>
+            </a:extLst>
+          </p:cNvPr>
+          <p:cNvSpPr/>
+          <p:nvPr/>
+        </p:nvSpPr>
+        <p:spPr>
+          <a:xfrm>
+            <a:off x="5832483" y="1818480"/>
+            <a:ext cx="898203" cy="285783"/>
+          </a:xfrm>
+          <a:prstGeom prst="rect">
+            <a:avLst/>
+          </a:prstGeom>
+          <a:ln w="19050">
+            <a:solidFill>
+              <a:srgbClr val="7030A0"/>
+            </a:solidFill>
+          </a:ln>
+          <a:effectLst/>
+        </p:spPr>
+        <p:style>
+          <a:lnRef idx="1">
+            <a:schemeClr val="accent4"/>
+          </a:lnRef>
+          <a:fillRef idx="2">
+            <a:schemeClr val="accent4"/>
+          </a:fillRef>
+          <a:effectRef idx="1">
+            <a:schemeClr val="accent4"/>
+          </a:effectRef>
+          <a:fontRef idx="minor">
+            <a:schemeClr val="dk1"/>
+          </a:fontRef>
+        </p:style>
+        <p:txBody>
+          <a:bodyPr rtlCol="0" anchor="ctr"/>
+          <a:lstStyle/>
+          <a:p>
+            <a:pPr algn="ctr"/>
+            <a:r>
+              <a:rPr lang="en-US" sz="1050" dirty="0" err="1">
+                <a:solidFill>
+                  <a:srgbClr val="7030A0"/>
+                </a:solidFill>
+              </a:rPr>
+              <a:t>DateMap</a:t>
+            </a:r>
+            <a:endParaRPr lang="en-SG" sz="1050" dirty="0">
+              <a:solidFill>
+                <a:srgbClr val="7030A0"/>
+              </a:solidFill>
+            </a:endParaRPr>
+          </a:p>
+        </p:txBody>
+      </p:sp>
+      <p:sp>
+        <p:nvSpPr>
+          <p:cNvPr id="90" name="Rectangle 8">
+            <a:extLst>
+              <a:ext uri="{FF2B5EF4-FFF2-40B4-BE49-F238E27FC236}">
+                <a16:creationId xmlns:a16="http://schemas.microsoft.com/office/drawing/2014/main" id="{81FD96FD-E552-4437-8C74-D7253BCE1BC2}"/>
+              </a:ext>
+            </a:extLst>
+          </p:cNvPr>
+          <p:cNvSpPr/>
+          <p:nvPr/>
+        </p:nvSpPr>
+        <p:spPr>
+          <a:xfrm>
+            <a:off x="5832484" y="1165172"/>
+            <a:ext cx="898203" cy="285783"/>
+          </a:xfrm>
+          <a:prstGeom prst="rect">
+            <a:avLst/>
+          </a:prstGeom>
+          <a:ln w="19050">
+            <a:solidFill>
+              <a:srgbClr val="7030A0"/>
+            </a:solidFill>
+          </a:ln>
+          <a:effectLst/>
+        </p:spPr>
+        <p:style>
+          <a:lnRef idx="1">
+            <a:schemeClr val="accent4"/>
+          </a:lnRef>
+          <a:fillRef idx="2">
+            <a:schemeClr val="accent4"/>
+          </a:fillRef>
+          <a:effectRef idx="1">
+            <a:schemeClr val="accent4"/>
+          </a:effectRef>
+          <a:fontRef idx="minor">
+            <a:schemeClr val="dk1"/>
+          </a:fontRef>
+        </p:style>
+        <p:txBody>
+          <a:bodyPr rtlCol="0" anchor="ctr"/>
+          <a:lstStyle/>
+          <a:p>
+            <a:pPr algn="ctr"/>
+            <a:r>
+              <a:rPr lang="en-US" sz="1050" dirty="0" err="1">
+                <a:solidFill>
+                  <a:srgbClr val="7030A0"/>
+                </a:solidFill>
+              </a:rPr>
+              <a:t>TagMap</a:t>
+            </a:r>
+            <a:endParaRPr lang="en-SG" sz="1050" dirty="0">
+              <a:solidFill>
+                <a:srgbClr val="7030A0"/>
+              </a:solidFill>
+            </a:endParaRPr>
+          </a:p>
+        </p:txBody>
+      </p:sp>
+      <p:cxnSp>
+        <p:nvCxnSpPr>
+          <p:cNvPr id="91" name="Elbow Connector 78">
+            <a:extLst>
+              <a:ext uri="{FF2B5EF4-FFF2-40B4-BE49-F238E27FC236}">
+                <a16:creationId xmlns:a16="http://schemas.microsoft.com/office/drawing/2014/main" id="{B5A37C68-14C9-4D13-BBBC-A1CDE852A3FF}"/>
+              </a:ext>
+            </a:extLst>
+          </p:cNvPr>
+          <p:cNvCxnSpPr>
+            <a:cxnSpLocks/>
+            <a:stCxn id="85" idx="3"/>
+            <a:endCxn id="88" idx="1"/>
+          </p:cNvCxnSpPr>
+          <p:nvPr/>
+        </p:nvCxnSpPr>
+        <p:spPr>
+          <a:xfrm flipV="1">
+            <a:off x="5461665" y="1626259"/>
+            <a:ext cx="370820" cy="56165"/>
+          </a:xfrm>
+          <a:prstGeom prst="bentConnector3">
+            <a:avLst/>
+          </a:prstGeom>
+          <a:ln w="19050">
+            <a:solidFill>
+              <a:srgbClr val="7030A0"/>
+            </a:solidFill>
+            <a:headEnd type="none" w="med" len="med"/>
+            <a:tailEnd type="arrow" w="med" len="med"/>
+          </a:ln>
+          <a:effectLst/>
+        </p:spPr>
+        <p:style>
+          <a:lnRef idx="1">
+            <a:schemeClr val="accent2"/>
+          </a:lnRef>
+          <a:fillRef idx="2">
+            <a:schemeClr val="accent2"/>
+          </a:fillRef>
+          <a:effectRef idx="1">
+            <a:schemeClr val="accent2"/>
+          </a:effectRef>
+          <a:fontRef idx="minor">
+            <a:schemeClr val="dk1"/>
+          </a:fontRef>
+        </p:style>
+      </p:cxnSp>
+      <p:cxnSp>
+        <p:nvCxnSpPr>
+          <p:cNvPr id="92" name="Elbow Connector 78">
+            <a:extLst>
+              <a:ext uri="{FF2B5EF4-FFF2-40B4-BE49-F238E27FC236}">
+                <a16:creationId xmlns:a16="http://schemas.microsoft.com/office/drawing/2014/main" id="{452E1026-7B3D-4B0B-9BBB-1B2A634EC725}"/>
+              </a:ext>
+            </a:extLst>
+          </p:cNvPr>
+          <p:cNvCxnSpPr>
+            <a:cxnSpLocks/>
+            <a:stCxn id="85" idx="3"/>
+            <a:endCxn id="89" idx="1"/>
+          </p:cNvCxnSpPr>
+          <p:nvPr/>
+        </p:nvCxnSpPr>
+        <p:spPr>
+          <a:xfrm>
+            <a:off x="5461665" y="1682424"/>
+            <a:ext cx="370818" cy="278948"/>
+          </a:xfrm>
+          <a:prstGeom prst="bentConnector3">
+            <a:avLst>
+              <a:gd name="adj1" fmla="val 50000"/>
+            </a:avLst>
+          </a:prstGeom>
+          <a:ln w="19050">
+            <a:solidFill>
+              <a:srgbClr val="7030A0"/>
+            </a:solidFill>
+            <a:headEnd type="none" w="med" len="med"/>
+            <a:tailEnd type="arrow" w="med" len="med"/>
+          </a:ln>
+          <a:effectLst/>
+        </p:spPr>
+        <p:style>
+          <a:lnRef idx="1">
+            <a:schemeClr val="accent2"/>
+          </a:lnRef>
+          <a:fillRef idx="2">
+            <a:schemeClr val="accent2"/>
+          </a:fillRef>
+          <a:effectRef idx="1">
+            <a:schemeClr val="accent2"/>
+          </a:effectRef>
+          <a:fontRef idx="minor">
+            <a:schemeClr val="dk1"/>
+          </a:fontRef>
+        </p:style>
+      </p:cxnSp>
+      <p:sp>
+        <p:nvSpPr>
+          <p:cNvPr id="93" name="Flowchart: Decision 96">
+            <a:extLst>
+              <a:ext uri="{FF2B5EF4-FFF2-40B4-BE49-F238E27FC236}">
+                <a16:creationId xmlns:a16="http://schemas.microsoft.com/office/drawing/2014/main" id="{E2A2D9A6-6A83-4305-9EBA-1345CFDC3734}"/>
+              </a:ext>
+            </a:extLst>
+          </p:cNvPr>
+          <p:cNvSpPr/>
+          <p:nvPr/>
+        </p:nvSpPr>
+        <p:spPr>
+          <a:xfrm>
+            <a:off x="5260339" y="2099962"/>
+            <a:ext cx="236048" cy="173380"/>
+          </a:xfrm>
+          <a:prstGeom prst="flowChartDecision">
+            <a:avLst/>
+          </a:prstGeom>
+          <a:noFill/>
+          <a:ln w="19050">
+            <a:solidFill>
+              <a:srgbClr val="7030A0"/>
+            </a:solidFill>
+          </a:ln>
+          <a:effectLst/>
+        </p:spPr>
+        <p:style>
+          <a:lnRef idx="1">
+            <a:schemeClr val="accent6"/>
+          </a:lnRef>
+          <a:fillRef idx="2">
+            <a:schemeClr val="accent6"/>
+          </a:fillRef>
+          <a:effectRef idx="1">
+            <a:schemeClr val="accent6"/>
+          </a:effectRef>
+          <a:fontRef idx="minor">
+            <a:schemeClr val="dk1"/>
+          </a:fontRef>
+        </p:style>
+        <p:txBody>
+          <a:bodyPr rtlCol="0" anchor="ctr"/>
+          <a:lstStyle/>
+          <a:p>
+            <a:pPr algn="ctr"/>
+            <a:endParaRPr lang="en-US" sz="1050"/>
+          </a:p>
+        </p:txBody>
+      </p:sp>
+      <p:cxnSp>
+        <p:nvCxnSpPr>
+          <p:cNvPr id="94" name="Elbow Connector 63">
+            <a:extLst>
+              <a:ext uri="{FF2B5EF4-FFF2-40B4-BE49-F238E27FC236}">
+                <a16:creationId xmlns:a16="http://schemas.microsoft.com/office/drawing/2014/main" id="{5072F0ED-744B-42A9-AC88-DCEB5604812F}"/>
+              </a:ext>
+            </a:extLst>
+          </p:cNvPr>
+          <p:cNvCxnSpPr>
+            <a:cxnSpLocks/>
+            <a:stCxn id="93" idx="3"/>
+            <a:endCxn id="96" idx="1"/>
+          </p:cNvCxnSpPr>
+          <p:nvPr/>
+        </p:nvCxnSpPr>
+        <p:spPr>
+          <a:xfrm>
+            <a:off x="5496387" y="2186652"/>
+            <a:ext cx="1543976" cy="148645"/>
+          </a:xfrm>
+          <a:prstGeom prst="bentConnector3">
+            <a:avLst/>
+          </a:prstGeom>
+          <a:ln w="19050">
+            <a:solidFill>
+              <a:srgbClr val="7030A0"/>
+            </a:solidFill>
+            <a:headEnd type="none" w="med" len="med"/>
+            <a:tailEnd type="arrow" w="med" len="med"/>
+          </a:ln>
+          <a:effectLst/>
+        </p:spPr>
+        <p:style>
+          <a:lnRef idx="1">
+            <a:schemeClr val="accent2"/>
+          </a:lnRef>
+          <a:fillRef idx="2">
+            <a:schemeClr val="accent2"/>
+          </a:fillRef>
+          <a:effectRef idx="1">
+            <a:schemeClr val="accent2"/>
+          </a:effectRef>
+          <a:fontRef idx="minor">
+            <a:schemeClr val="dk1"/>
+          </a:fontRef>
+        </p:style>
+      </p:cxnSp>
+      <p:sp>
+        <p:nvSpPr>
+          <p:cNvPr id="95" name="TextBox 94">
+            <a:extLst>
+              <a:ext uri="{FF2B5EF4-FFF2-40B4-BE49-F238E27FC236}">
+                <a16:creationId xmlns:a16="http://schemas.microsoft.com/office/drawing/2014/main" id="{E5696A16-A721-4B15-8CA2-47698B17310A}"/>
+              </a:ext>
+            </a:extLst>
+          </p:cNvPr>
+          <p:cNvSpPr txBox="1"/>
+          <p:nvPr/>
+        </p:nvSpPr>
+        <p:spPr>
+          <a:xfrm>
+            <a:off x="6837844" y="2156768"/>
+            <a:ext cx="189257" cy="178683"/>
+          </a:xfrm>
+          <a:prstGeom prst="rect">
+            <a:avLst/>
+          </a:prstGeom>
+          <a:noFill/>
+        </p:spPr>
+        <p:txBody>
+          <a:bodyPr wrap="square" lIns="0" tIns="0" rIns="0" bIns="0" rtlCol="0">
+            <a:noAutofit/>
+          </a:bodyPr>
+          <a:lstStyle/>
+          <a:p>
+            <a:pPr algn="ctr"/>
+            <a:r>
+              <a:rPr lang="en-US" sz="1100" dirty="0">
+                <a:solidFill>
+                  <a:srgbClr val="7030A0"/>
+                </a:solidFill>
+              </a:rPr>
+              <a:t>*</a:t>
+            </a:r>
+            <a:endParaRPr lang="en-SG" sz="1100" dirty="0">
+              <a:solidFill>
+                <a:srgbClr val="7030A0"/>
+              </a:solidFill>
+            </a:endParaRPr>
+          </a:p>
+        </p:txBody>
+      </p:sp>
+      <p:sp>
+        <p:nvSpPr>
+          <p:cNvPr id="96" name="Rectangle 8">
+            <a:extLst>
+              <a:ext uri="{FF2B5EF4-FFF2-40B4-BE49-F238E27FC236}">
+                <a16:creationId xmlns:a16="http://schemas.microsoft.com/office/drawing/2014/main" id="{861ACAC4-9688-42AF-9B73-EE546C60EAC5}"/>
+              </a:ext>
+            </a:extLst>
+          </p:cNvPr>
+          <p:cNvSpPr/>
+          <p:nvPr/>
+        </p:nvSpPr>
+        <p:spPr>
+          <a:xfrm>
+            <a:off x="7040363" y="2200585"/>
+            <a:ext cx="898203" cy="269423"/>
+          </a:xfrm>
+          <a:prstGeom prst="rect">
+            <a:avLst/>
+          </a:prstGeom>
+          <a:ln w="19050">
+            <a:solidFill>
+              <a:srgbClr val="7030A0"/>
+            </a:solidFill>
+          </a:ln>
+          <a:effectLst/>
+        </p:spPr>
+        <p:style>
+          <a:lnRef idx="1">
+            <a:schemeClr val="accent4"/>
+          </a:lnRef>
+          <a:fillRef idx="2">
+            <a:schemeClr val="accent4"/>
+          </a:fillRef>
+          <a:effectRef idx="1">
+            <a:schemeClr val="accent4"/>
+          </a:effectRef>
+          <a:fontRef idx="minor">
+            <a:schemeClr val="dk1"/>
+          </a:fontRef>
+        </p:style>
+        <p:txBody>
+          <a:bodyPr rtlCol="0" anchor="ctr"/>
+          <a:lstStyle/>
+          <a:p>
+            <a:pPr algn="ctr"/>
+            <a:r>
+              <a:rPr lang="en-US" sz="1050" dirty="0">
+                <a:solidFill>
+                  <a:srgbClr val="7030A0"/>
+                </a:solidFill>
+              </a:rPr>
+              <a:t>String</a:t>
+            </a:r>
+            <a:endParaRPr lang="en-SG" sz="1050" dirty="0">
+              <a:solidFill>
+                <a:srgbClr val="7030A0"/>
+              </a:solidFill>
+            </a:endParaRPr>
+          </a:p>
+        </p:txBody>
+      </p:sp>
+      <p:cxnSp>
+        <p:nvCxnSpPr>
+          <p:cNvPr id="98" name="Elbow Connector 78">
+            <a:extLst>
+              <a:ext uri="{FF2B5EF4-FFF2-40B4-BE49-F238E27FC236}">
+                <a16:creationId xmlns:a16="http://schemas.microsoft.com/office/drawing/2014/main" id="{DD50CCA5-0FB7-4B06-8C18-130325BE6483}"/>
+              </a:ext>
+            </a:extLst>
+          </p:cNvPr>
+          <p:cNvCxnSpPr>
+            <a:cxnSpLocks/>
+            <a:stCxn id="90" idx="3"/>
+            <a:endCxn id="96" idx="1"/>
+          </p:cNvCxnSpPr>
+          <p:nvPr/>
+        </p:nvCxnSpPr>
+        <p:spPr>
+          <a:xfrm>
+            <a:off x="6730687" y="1308064"/>
+            <a:ext cx="309676" cy="1027233"/>
+          </a:xfrm>
+          <a:prstGeom prst="bentConnector3">
+            <a:avLst>
+              <a:gd name="adj1" fmla="val 50000"/>
+            </a:avLst>
+          </a:prstGeom>
+          <a:ln w="19050">
+            <a:solidFill>
+              <a:srgbClr val="7030A0"/>
+            </a:solidFill>
+            <a:headEnd type="none" w="med" len="med"/>
+            <a:tailEnd type="arrow" w="med" len="med"/>
+          </a:ln>
+          <a:effectLst/>
+        </p:spPr>
+        <p:style>
+          <a:lnRef idx="1">
+            <a:schemeClr val="accent2"/>
+          </a:lnRef>
+          <a:fillRef idx="2">
+            <a:schemeClr val="accent2"/>
+          </a:fillRef>
+          <a:effectRef idx="1">
+            <a:schemeClr val="accent2"/>
+          </a:effectRef>
+          <a:fontRef idx="minor">
+            <a:schemeClr val="dk1"/>
+          </a:fontRef>
+        </p:style>
+      </p:cxnSp>
+      <p:cxnSp>
+        <p:nvCxnSpPr>
+          <p:cNvPr id="101" name="Elbow Connector 78">
+            <a:extLst>
+              <a:ext uri="{FF2B5EF4-FFF2-40B4-BE49-F238E27FC236}">
+                <a16:creationId xmlns:a16="http://schemas.microsoft.com/office/drawing/2014/main" id="{97CB6228-BCF0-4852-B7E7-860E695D7417}"/>
+              </a:ext>
+            </a:extLst>
+          </p:cNvPr>
+          <p:cNvCxnSpPr>
+            <a:cxnSpLocks/>
+            <a:stCxn id="88" idx="3"/>
+            <a:endCxn id="96" idx="1"/>
+          </p:cNvCxnSpPr>
+          <p:nvPr/>
+        </p:nvCxnSpPr>
+        <p:spPr>
+          <a:xfrm>
+            <a:off x="6730688" y="1626259"/>
+            <a:ext cx="309675" cy="709038"/>
+          </a:xfrm>
+          <a:prstGeom prst="bentConnector3">
+            <a:avLst>
+              <a:gd name="adj1" fmla="val 50000"/>
+            </a:avLst>
+          </a:prstGeom>
+          <a:ln w="19050">
+            <a:solidFill>
+              <a:srgbClr val="7030A0"/>
+            </a:solidFill>
+            <a:headEnd type="none" w="med" len="med"/>
+            <a:tailEnd type="arrow" w="med" len="med"/>
+          </a:ln>
+          <a:effectLst/>
+        </p:spPr>
+        <p:style>
+          <a:lnRef idx="1">
+            <a:schemeClr val="accent2"/>
+          </a:lnRef>
+          <a:fillRef idx="2">
+            <a:schemeClr val="accent2"/>
+          </a:fillRef>
+          <a:effectRef idx="1">
+            <a:schemeClr val="accent2"/>
+          </a:effectRef>
+          <a:fontRef idx="minor">
+            <a:schemeClr val="dk1"/>
+          </a:fontRef>
+        </p:style>
+      </p:cxnSp>
+      <p:cxnSp>
+        <p:nvCxnSpPr>
+          <p:cNvPr id="103" name="Elbow Connector 78">
+            <a:extLst>
+              <a:ext uri="{FF2B5EF4-FFF2-40B4-BE49-F238E27FC236}">
+                <a16:creationId xmlns:a16="http://schemas.microsoft.com/office/drawing/2014/main" id="{B1AC7921-6EBB-4477-9884-94E90847D7CE}"/>
+              </a:ext>
+            </a:extLst>
+          </p:cNvPr>
+          <p:cNvCxnSpPr>
+            <a:cxnSpLocks/>
+            <a:stCxn id="89" idx="3"/>
+            <a:endCxn id="96" idx="1"/>
+          </p:cNvCxnSpPr>
+          <p:nvPr/>
+        </p:nvCxnSpPr>
+        <p:spPr>
+          <a:xfrm>
+            <a:off x="6730686" y="1961372"/>
+            <a:ext cx="309677" cy="373925"/>
+          </a:xfrm>
+          <a:prstGeom prst="bentConnector3">
+            <a:avLst>
+              <a:gd name="adj1" fmla="val 50000"/>
+            </a:avLst>
+          </a:prstGeom>
+          <a:ln w="19050">
+            <a:solidFill>
+              <a:srgbClr val="7030A0"/>
+            </a:solidFill>
+            <a:headEnd type="none" w="med" len="med"/>
+            <a:tailEnd type="arrow" w="med" len="med"/>
+          </a:ln>
+          <a:effectLst/>
+        </p:spPr>
+        <p:style>
+          <a:lnRef idx="1">
+            <a:schemeClr val="accent2"/>
+          </a:lnRef>
+          <a:fillRef idx="2">
+            <a:schemeClr val="accent2"/>
+          </a:fillRef>
+          <a:effectRef idx="1">
+            <a:schemeClr val="accent2"/>
+          </a:effectRef>
+          <a:fontRef idx="minor">
+            <a:schemeClr val="dk1"/>
+          </a:fontRef>
+        </p:style>
+      </p:cxnSp>
+      <p:sp>
+        <p:nvSpPr>
+          <p:cNvPr id="149" name="TextBox 148">
+            <a:extLst>
+              <a:ext uri="{FF2B5EF4-FFF2-40B4-BE49-F238E27FC236}">
+                <a16:creationId xmlns:a16="http://schemas.microsoft.com/office/drawing/2014/main" id="{E02DBB97-1E7A-467C-9C8A-BD76E82B92BB}"/>
+              </a:ext>
+            </a:extLst>
+          </p:cNvPr>
+          <p:cNvSpPr txBox="1"/>
+          <p:nvPr/>
+        </p:nvSpPr>
+        <p:spPr>
+          <a:xfrm>
+            <a:off x="3867393" y="2627054"/>
+            <a:ext cx="189257" cy="178683"/>
+          </a:xfrm>
+          <a:prstGeom prst="rect">
+            <a:avLst/>
+          </a:prstGeom>
+          <a:noFill/>
+        </p:spPr>
+        <p:txBody>
+          <a:bodyPr wrap="square" lIns="0" tIns="0" rIns="0" bIns="0" rtlCol="0">
+            <a:noAutofit/>
+          </a:bodyPr>
+          <a:lstStyle/>
+          <a:p>
+            <a:pPr algn="ctr"/>
+            <a:r>
+              <a:rPr lang="en-US" sz="1100" dirty="0">
+                <a:solidFill>
+                  <a:srgbClr val="7030A0"/>
+                </a:solidFill>
+              </a:rPr>
+              <a:t>1</a:t>
+            </a:r>
+            <a:endParaRPr lang="en-SG" sz="1100" dirty="0">
+              <a:solidFill>
+                <a:srgbClr val="7030A0"/>
+              </a:solidFill>
+            </a:endParaRPr>
+          </a:p>
+        </p:txBody>
+      </p:sp>
+      <p:sp>
+        <p:nvSpPr>
+          <p:cNvPr id="150" name="TextBox 149">
+            <a:extLst>
+              <a:ext uri="{FF2B5EF4-FFF2-40B4-BE49-F238E27FC236}">
+                <a16:creationId xmlns:a16="http://schemas.microsoft.com/office/drawing/2014/main" id="{63E8539C-5522-458E-9777-A0202B9E8CEB}"/>
+              </a:ext>
+            </a:extLst>
+          </p:cNvPr>
+          <p:cNvSpPr txBox="1"/>
+          <p:nvPr/>
+        </p:nvSpPr>
+        <p:spPr>
+          <a:xfrm>
+            <a:off x="3859262" y="1998716"/>
+            <a:ext cx="189257" cy="178683"/>
+          </a:xfrm>
+          <a:prstGeom prst="rect">
+            <a:avLst/>
+          </a:prstGeom>
+          <a:noFill/>
+        </p:spPr>
+        <p:txBody>
+          <a:bodyPr wrap="square" lIns="0" tIns="0" rIns="0" bIns="0" rtlCol="0">
+            <a:noAutofit/>
+          </a:bodyPr>
+          <a:lstStyle/>
+          <a:p>
+            <a:pPr algn="ctr"/>
+            <a:r>
+              <a:rPr lang="en-US" sz="1100" dirty="0">
+                <a:solidFill>
+                  <a:srgbClr val="7030A0"/>
+                </a:solidFill>
+              </a:rPr>
+              <a:t>1</a:t>
+            </a:r>
+            <a:endParaRPr lang="en-SG" sz="1100" dirty="0">
+              <a:solidFill>
+                <a:srgbClr val="7030A0"/>
+              </a:solidFill>
+            </a:endParaRPr>
+          </a:p>
+        </p:txBody>
+      </p:sp>
+      <p:sp>
+        <p:nvSpPr>
+          <p:cNvPr id="151" name="TextBox 150">
+            <a:extLst>
+              <a:ext uri="{FF2B5EF4-FFF2-40B4-BE49-F238E27FC236}">
+                <a16:creationId xmlns:a16="http://schemas.microsoft.com/office/drawing/2014/main" id="{7D707C8B-DF34-450B-9D07-ECA44F62C272}"/>
+              </a:ext>
+            </a:extLst>
+          </p:cNvPr>
+          <p:cNvSpPr txBox="1"/>
+          <p:nvPr/>
+        </p:nvSpPr>
+        <p:spPr>
+          <a:xfrm>
+            <a:off x="3826288" y="1518712"/>
+            <a:ext cx="189257" cy="178683"/>
+          </a:xfrm>
+          <a:prstGeom prst="rect">
+            <a:avLst/>
+          </a:prstGeom>
+          <a:noFill/>
+        </p:spPr>
+        <p:txBody>
+          <a:bodyPr wrap="square" lIns="0" tIns="0" rIns="0" bIns="0" rtlCol="0">
+            <a:noAutofit/>
+          </a:bodyPr>
+          <a:lstStyle/>
+          <a:p>
+            <a:pPr algn="ctr"/>
+            <a:r>
+              <a:rPr lang="en-US" sz="1100" dirty="0">
+                <a:solidFill>
+                  <a:srgbClr val="7030A0"/>
+                </a:solidFill>
+              </a:rPr>
+              <a:t>1</a:t>
+            </a:r>
+            <a:endParaRPr lang="en-SG" sz="1100" dirty="0">
+              <a:solidFill>
+                <a:srgbClr val="7030A0"/>
+              </a:solidFill>
+            </a:endParaRPr>
+          </a:p>
+        </p:txBody>
+      </p:sp>
+      <p:sp>
+        <p:nvSpPr>
+          <p:cNvPr id="152" name="TextBox 151">
+            <a:extLst>
+              <a:ext uri="{FF2B5EF4-FFF2-40B4-BE49-F238E27FC236}">
+                <a16:creationId xmlns:a16="http://schemas.microsoft.com/office/drawing/2014/main" id="{000C9DE3-F867-4EDE-9D29-15E947D8C043}"/>
+              </a:ext>
+            </a:extLst>
+          </p:cNvPr>
+          <p:cNvSpPr txBox="1"/>
+          <p:nvPr/>
+        </p:nvSpPr>
+        <p:spPr>
+          <a:xfrm>
+            <a:off x="5602171" y="1445974"/>
+            <a:ext cx="189257" cy="178683"/>
+          </a:xfrm>
+          <a:prstGeom prst="rect">
+            <a:avLst/>
+          </a:prstGeom>
+          <a:noFill/>
+        </p:spPr>
+        <p:txBody>
+          <a:bodyPr wrap="square" lIns="0" tIns="0" rIns="0" bIns="0" rtlCol="0">
+            <a:noAutofit/>
+          </a:bodyPr>
+          <a:lstStyle/>
+          <a:p>
+            <a:pPr algn="ctr"/>
+            <a:r>
+              <a:rPr lang="en-US" sz="1100" dirty="0">
+                <a:solidFill>
+                  <a:srgbClr val="7030A0"/>
+                </a:solidFill>
+              </a:rPr>
+              <a:t>1</a:t>
+            </a:r>
+            <a:endParaRPr lang="en-SG" sz="1100" dirty="0">
+              <a:solidFill>
+                <a:srgbClr val="7030A0"/>
+              </a:solidFill>
+            </a:endParaRPr>
+          </a:p>
+        </p:txBody>
+      </p:sp>
+      <p:sp>
+        <p:nvSpPr>
+          <p:cNvPr id="153" name="TextBox 152">
+            <a:extLst>
+              <a:ext uri="{FF2B5EF4-FFF2-40B4-BE49-F238E27FC236}">
+                <a16:creationId xmlns:a16="http://schemas.microsoft.com/office/drawing/2014/main" id="{DE9D0B25-832E-4958-8314-B3C66C0808CE}"/>
+              </a:ext>
+            </a:extLst>
+          </p:cNvPr>
+          <p:cNvSpPr txBox="1"/>
+          <p:nvPr/>
+        </p:nvSpPr>
+        <p:spPr>
+          <a:xfrm>
+            <a:off x="5596784" y="1792081"/>
+            <a:ext cx="189257" cy="178683"/>
+          </a:xfrm>
+          <a:prstGeom prst="rect">
+            <a:avLst/>
+          </a:prstGeom>
+          <a:noFill/>
+        </p:spPr>
+        <p:txBody>
+          <a:bodyPr wrap="square" lIns="0" tIns="0" rIns="0" bIns="0" rtlCol="0">
+            <a:noAutofit/>
+          </a:bodyPr>
+          <a:lstStyle/>
+          <a:p>
+            <a:pPr algn="ctr"/>
+            <a:r>
+              <a:rPr lang="en-US" sz="1100" dirty="0">
+                <a:solidFill>
+                  <a:srgbClr val="7030A0"/>
+                </a:solidFill>
+              </a:rPr>
+              <a:t>1</a:t>
+            </a:r>
+            <a:endParaRPr lang="en-SG" sz="1100" dirty="0">
+              <a:solidFill>
+                <a:srgbClr val="7030A0"/>
+              </a:solidFill>
+            </a:endParaRPr>
+          </a:p>
+        </p:txBody>
+      </p:sp>
+      <p:sp>
+        <p:nvSpPr>
+          <p:cNvPr id="154" name="TextBox 153">
+            <a:extLst>
+              <a:ext uri="{FF2B5EF4-FFF2-40B4-BE49-F238E27FC236}">
+                <a16:creationId xmlns:a16="http://schemas.microsoft.com/office/drawing/2014/main" id="{76F5C7C2-227B-4D75-933A-5BF3AFF135F9}"/>
+              </a:ext>
+            </a:extLst>
+          </p:cNvPr>
+          <p:cNvSpPr txBox="1"/>
+          <p:nvPr/>
+        </p:nvSpPr>
+        <p:spPr>
+          <a:xfrm>
+            <a:off x="5600291" y="1143000"/>
+            <a:ext cx="189257" cy="178683"/>
+          </a:xfrm>
+          <a:prstGeom prst="rect">
+            <a:avLst/>
+          </a:prstGeom>
+          <a:noFill/>
+        </p:spPr>
+        <p:txBody>
+          <a:bodyPr wrap="square" lIns="0" tIns="0" rIns="0" bIns="0" rtlCol="0">
+            <a:noAutofit/>
+          </a:bodyPr>
+          <a:lstStyle/>
+          <a:p>
+            <a:pPr algn="ctr"/>
+            <a:r>
+              <a:rPr lang="en-US" sz="1100" dirty="0">
+                <a:solidFill>
+                  <a:srgbClr val="7030A0"/>
+                </a:solidFill>
+              </a:rPr>
+              <a:t>1</a:t>
             </a:r>
             <a:endParaRPr lang="en-SG" sz="1100" dirty="0">
               <a:solidFill>

</xml_diff>